<commit_message>
Mockup - Buchungpage hinzugefügt
</commit_message>
<xml_diff>
--- a/Mockup.pptx
+++ b/Mockup.pptx
@@ -9,6 +9,7 @@
     <p:sldId id="257" r:id="rId3"/>
     <p:sldId id="258" r:id="rId4"/>
     <p:sldId id="259" r:id="rId5"/>
+    <p:sldId id="260" r:id="rId6"/>
   </p:sldIdLst>
   <p:sldSz cx="12192000" cy="6858000"/>
   <p:notesSz cx="6858000" cy="9144000"/>
@@ -246,7 +247,7 @@
           <a:p>
             <a:fld id="{BF127077-7699-459F-B21B-8CE1187F5A25}" type="datetimeFigureOut">
               <a:rPr lang="de-DE" smtClean="0"/>
-              <a:t>07.02.2017</a:t>
+              <a:t>08.02.2017</a:t>
             </a:fld>
             <a:endParaRPr lang="de-DE"/>
           </a:p>
@@ -416,7 +417,7 @@
           <a:p>
             <a:fld id="{BF127077-7699-459F-B21B-8CE1187F5A25}" type="datetimeFigureOut">
               <a:rPr lang="de-DE" smtClean="0"/>
-              <a:t>07.02.2017</a:t>
+              <a:t>08.02.2017</a:t>
             </a:fld>
             <a:endParaRPr lang="de-DE"/>
           </a:p>
@@ -596,7 +597,7 @@
           <a:p>
             <a:fld id="{BF127077-7699-459F-B21B-8CE1187F5A25}" type="datetimeFigureOut">
               <a:rPr lang="de-DE" smtClean="0"/>
-              <a:t>07.02.2017</a:t>
+              <a:t>08.02.2017</a:t>
             </a:fld>
             <a:endParaRPr lang="de-DE"/>
           </a:p>
@@ -766,7 +767,7 @@
           <a:p>
             <a:fld id="{BF127077-7699-459F-B21B-8CE1187F5A25}" type="datetimeFigureOut">
               <a:rPr lang="de-DE" smtClean="0"/>
-              <a:t>07.02.2017</a:t>
+              <a:t>08.02.2017</a:t>
             </a:fld>
             <a:endParaRPr lang="de-DE"/>
           </a:p>
@@ -1012,7 +1013,7 @@
           <a:p>
             <a:fld id="{BF127077-7699-459F-B21B-8CE1187F5A25}" type="datetimeFigureOut">
               <a:rPr lang="de-DE" smtClean="0"/>
-              <a:t>07.02.2017</a:t>
+              <a:t>08.02.2017</a:t>
             </a:fld>
             <a:endParaRPr lang="de-DE"/>
           </a:p>
@@ -1244,7 +1245,7 @@
           <a:p>
             <a:fld id="{BF127077-7699-459F-B21B-8CE1187F5A25}" type="datetimeFigureOut">
               <a:rPr lang="de-DE" smtClean="0"/>
-              <a:t>07.02.2017</a:t>
+              <a:t>08.02.2017</a:t>
             </a:fld>
             <a:endParaRPr lang="de-DE"/>
           </a:p>
@@ -1611,7 +1612,7 @@
           <a:p>
             <a:fld id="{BF127077-7699-459F-B21B-8CE1187F5A25}" type="datetimeFigureOut">
               <a:rPr lang="de-DE" smtClean="0"/>
-              <a:t>07.02.2017</a:t>
+              <a:t>08.02.2017</a:t>
             </a:fld>
             <a:endParaRPr lang="de-DE"/>
           </a:p>
@@ -1729,7 +1730,7 @@
           <a:p>
             <a:fld id="{BF127077-7699-459F-B21B-8CE1187F5A25}" type="datetimeFigureOut">
               <a:rPr lang="de-DE" smtClean="0"/>
-              <a:t>07.02.2017</a:t>
+              <a:t>08.02.2017</a:t>
             </a:fld>
             <a:endParaRPr lang="de-DE"/>
           </a:p>
@@ -1824,7 +1825,7 @@
           <a:p>
             <a:fld id="{BF127077-7699-459F-B21B-8CE1187F5A25}" type="datetimeFigureOut">
               <a:rPr lang="de-DE" smtClean="0"/>
-              <a:t>07.02.2017</a:t>
+              <a:t>08.02.2017</a:t>
             </a:fld>
             <a:endParaRPr lang="de-DE"/>
           </a:p>
@@ -2101,7 +2102,7 @@
           <a:p>
             <a:fld id="{BF127077-7699-459F-B21B-8CE1187F5A25}" type="datetimeFigureOut">
               <a:rPr lang="de-DE" smtClean="0"/>
-              <a:t>07.02.2017</a:t>
+              <a:t>08.02.2017</a:t>
             </a:fld>
             <a:endParaRPr lang="de-DE"/>
           </a:p>
@@ -2354,7 +2355,7 @@
           <a:p>
             <a:fld id="{BF127077-7699-459F-B21B-8CE1187F5A25}" type="datetimeFigureOut">
               <a:rPr lang="de-DE" smtClean="0"/>
-              <a:t>07.02.2017</a:t>
+              <a:t>08.02.2017</a:t>
             </a:fld>
             <a:endParaRPr lang="de-DE"/>
           </a:p>
@@ -2567,7 +2568,7 @@
           <a:p>
             <a:fld id="{BF127077-7699-459F-B21B-8CE1187F5A25}" type="datetimeFigureOut">
               <a:rPr lang="de-DE" smtClean="0"/>
-              <a:t>07.02.2017</a:t>
+              <a:t>08.02.2017</a:t>
             </a:fld>
             <a:endParaRPr lang="de-DE"/>
           </a:p>
@@ -5317,7 +5318,7 @@
         </p:nvSpPr>
         <p:spPr>
           <a:xfrm>
-            <a:off x="8295503" y="1036770"/>
+            <a:off x="8265816" y="698420"/>
             <a:ext cx="1869987" cy="271848"/>
           </a:xfrm>
           <a:prstGeom prst="roundRect">
@@ -5372,7 +5373,7 @@
         </p:nvSpPr>
         <p:spPr>
           <a:xfrm>
-            <a:off x="9106930" y="571332"/>
+            <a:off x="9072628" y="1122508"/>
             <a:ext cx="1058561" cy="271848"/>
           </a:xfrm>
           <a:prstGeom prst="roundRect">
@@ -6113,251 +6114,6 @@
                 <a:rPr lang="de-DE" sz="1600" dirty="0"/>
                 <a:t>bis</a:t>
               </a:r>
-            </a:p>
-          </p:txBody>
-        </p:sp>
-      </p:grpSp>
-      <p:grpSp>
-        <p:nvGrpSpPr>
-          <p:cNvPr id="57" name="Gruppieren 56"/>
-          <p:cNvGrpSpPr/>
-          <p:nvPr/>
-        </p:nvGrpSpPr>
-        <p:grpSpPr>
-          <a:xfrm>
-            <a:off x="2030792" y="2415700"/>
-            <a:ext cx="8086555" cy="1372497"/>
-            <a:chOff x="2038172" y="2550377"/>
-            <a:chExt cx="8134698" cy="1408670"/>
-          </a:xfrm>
-          <a:solidFill>
-            <a:schemeClr val="bg1"/>
-          </a:solidFill>
-        </p:grpSpPr>
-        <p:sp>
-          <p:nvSpPr>
-            <p:cNvPr id="45" name="Abgerundetes Rechteck 44"/>
-            <p:cNvSpPr/>
-            <p:nvPr/>
-          </p:nvSpPr>
-          <p:spPr>
-            <a:xfrm>
-              <a:off x="2038172" y="2550377"/>
-              <a:ext cx="8121374" cy="1408670"/>
-            </a:xfrm>
-            <a:prstGeom prst="roundRect">
-              <a:avLst/>
-            </a:prstGeom>
-            <a:grpFill/>
-          </p:spPr>
-          <p:style>
-            <a:lnRef idx="2">
-              <a:schemeClr val="accent1">
-                <a:shade val="50000"/>
-              </a:schemeClr>
-            </a:lnRef>
-            <a:fillRef idx="1">
-              <a:schemeClr val="accent1"/>
-            </a:fillRef>
-            <a:effectRef idx="0">
-              <a:schemeClr val="accent1"/>
-            </a:effectRef>
-            <a:fontRef idx="minor">
-              <a:schemeClr val="lt1"/>
-            </a:fontRef>
-          </p:style>
-          <p:txBody>
-            <a:bodyPr rtlCol="0" anchor="ctr"/>
-            <a:lstStyle/>
-            <a:p>
-              <a:pPr algn="ctr"/>
-              <a:endParaRPr lang="de-DE"/>
-            </a:p>
-          </p:txBody>
-        </p:sp>
-        <p:sp>
-          <p:nvSpPr>
-            <p:cNvPr id="46" name="Textfeld 45"/>
-            <p:cNvSpPr txBox="1"/>
-            <p:nvPr/>
-          </p:nvSpPr>
-          <p:spPr>
-            <a:xfrm>
-              <a:off x="2380969" y="2741427"/>
-              <a:ext cx="2067698" cy="646331"/>
-            </a:xfrm>
-            <a:prstGeom prst="rect">
-              <a:avLst/>
-            </a:prstGeom>
-            <a:grpFill/>
-          </p:spPr>
-          <p:txBody>
-            <a:bodyPr wrap="square" rtlCol="0">
-              <a:spAutoFit/>
-            </a:bodyPr>
-            <a:lstStyle/>
-            <a:p>
-              <a:r>
-                <a:rPr lang="de-DE" dirty="0" smtClean="0"/>
-                <a:t>Heller Raum mit Blick auf Donau</a:t>
-              </a:r>
-              <a:endParaRPr lang="de-DE" dirty="0"/>
-            </a:p>
-          </p:txBody>
-        </p:sp>
-        <p:sp>
-          <p:nvSpPr>
-            <p:cNvPr id="49" name="Textfeld 48"/>
-            <p:cNvSpPr txBox="1"/>
-            <p:nvPr/>
-          </p:nvSpPr>
-          <p:spPr>
-            <a:xfrm>
-              <a:off x="4605309" y="3125517"/>
-              <a:ext cx="1045577" cy="369332"/>
-            </a:xfrm>
-            <a:prstGeom prst="rect">
-              <a:avLst/>
-            </a:prstGeom>
-            <a:grpFill/>
-          </p:spPr>
-          <p:txBody>
-            <a:bodyPr wrap="square" rtlCol="0">
-              <a:spAutoFit/>
-            </a:bodyPr>
-            <a:lstStyle/>
-            <a:p>
-              <a:r>
-                <a:rPr lang="de-DE" dirty="0" smtClean="0"/>
-                <a:t>Office</a:t>
-              </a:r>
-              <a:endParaRPr lang="de-DE" dirty="0"/>
-            </a:p>
-          </p:txBody>
-        </p:sp>
-        <p:sp>
-          <p:nvSpPr>
-            <p:cNvPr id="51" name="Textfeld 50"/>
-            <p:cNvSpPr txBox="1"/>
-            <p:nvPr/>
-          </p:nvSpPr>
-          <p:spPr>
-            <a:xfrm>
-              <a:off x="6449481" y="2698133"/>
-              <a:ext cx="1980783" cy="369332"/>
-            </a:xfrm>
-            <a:prstGeom prst="rect">
-              <a:avLst/>
-            </a:prstGeom>
-            <a:grpFill/>
-          </p:spPr>
-          <p:txBody>
-            <a:bodyPr wrap="square" rtlCol="0">
-              <a:spAutoFit/>
-            </a:bodyPr>
-            <a:lstStyle/>
-            <a:p>
-              <a:r>
-                <a:rPr lang="de-DE" dirty="0" err="1" smtClean="0"/>
-                <a:t>RaumAusstattung</a:t>
-              </a:r>
-              <a:r>
-                <a:rPr lang="de-DE" dirty="0" smtClean="0"/>
-                <a:t> </a:t>
-              </a:r>
-              <a:endParaRPr lang="de-DE" dirty="0"/>
-            </a:p>
-          </p:txBody>
-        </p:sp>
-        <p:pic>
-          <p:nvPicPr>
-            <p:cNvPr id="53" name="Grafik 52"/>
-            <p:cNvPicPr>
-              <a:picLocks noChangeAspect="1"/>
-            </p:cNvPicPr>
-            <p:nvPr/>
-          </p:nvPicPr>
-          <p:blipFill>
-            <a:blip r:embed="rId3" cstate="print">
-              <a:extLst>
-                <a:ext uri="{28A0092B-C50C-407E-A947-70E740481C1C}">
-                  <a14:useLocalDpi xmlns:a14="http://schemas.microsoft.com/office/drawing/2010/main" val="0"/>
-                </a:ext>
-              </a:extLst>
-            </a:blip>
-            <a:stretch>
-              <a:fillRect/>
-            </a:stretch>
-          </p:blipFill>
-          <p:spPr>
-            <a:xfrm>
-              <a:off x="7373046" y="3189083"/>
-              <a:ext cx="315836" cy="315836"/>
-            </a:xfrm>
-            <a:prstGeom prst="rect">
-              <a:avLst/>
-            </a:prstGeom>
-            <a:grpFill/>
-          </p:spPr>
-        </p:pic>
-        <p:pic>
-          <p:nvPicPr>
-            <p:cNvPr id="54" name="Grafik 53"/>
-            <p:cNvPicPr>
-              <a:picLocks noChangeAspect="1"/>
-            </p:cNvPicPr>
-            <p:nvPr/>
-          </p:nvPicPr>
-          <p:blipFill>
-            <a:blip r:embed="rId4" cstate="print">
-              <a:extLst>
-                <a:ext uri="{28A0092B-C50C-407E-A947-70E740481C1C}">
-                  <a14:useLocalDpi xmlns:a14="http://schemas.microsoft.com/office/drawing/2010/main" val="0"/>
-                </a:ext>
-              </a:extLst>
-            </a:blip>
-            <a:stretch>
-              <a:fillRect/>
-            </a:stretch>
-          </p:blipFill>
-          <p:spPr>
-            <a:xfrm>
-              <a:off x="7801700" y="3091724"/>
-              <a:ext cx="448520" cy="448520"/>
-            </a:xfrm>
-            <a:prstGeom prst="rect">
-              <a:avLst/>
-            </a:prstGeom>
-            <a:grpFill/>
-          </p:spPr>
-        </p:pic>
-        <p:sp>
-          <p:nvSpPr>
-            <p:cNvPr id="55" name="Textfeld 54"/>
-            <p:cNvSpPr txBox="1"/>
-            <p:nvPr/>
-          </p:nvSpPr>
-          <p:spPr>
-            <a:xfrm>
-              <a:off x="9087517" y="2698258"/>
-              <a:ext cx="1085353" cy="369332"/>
-            </a:xfrm>
-            <a:prstGeom prst="rect">
-              <a:avLst/>
-            </a:prstGeom>
-            <a:grpFill/>
-          </p:spPr>
-          <p:txBody>
-            <a:bodyPr wrap="square" rtlCol="0">
-              <a:spAutoFit/>
-            </a:bodyPr>
-            <a:lstStyle/>
-            <a:p>
-              <a:r>
-                <a:rPr lang="de-DE" dirty="0" smtClean="0"/>
-                <a:t>Preis</a:t>
-              </a:r>
-              <a:endParaRPr lang="de-DE" dirty="0"/>
             </a:p>
           </p:txBody>
         </p:sp>
@@ -6587,7 +6343,7 @@
           <p:nvPr/>
         </p:nvPicPr>
         <p:blipFill>
-          <a:blip r:embed="rId5" cstate="print">
+          <a:blip r:embed="rId4" cstate="print">
             <a:extLst>
               <a:ext uri="{28A0092B-C50C-407E-A947-70E740481C1C}">
                 <a14:useLocalDpi xmlns:a14="http://schemas.microsoft.com/office/drawing/2010/main" val="0"/>
@@ -6617,7 +6373,7 @@
           <p:nvPr/>
         </p:nvPicPr>
         <p:blipFill>
-          <a:blip r:embed="rId5" cstate="print">
+          <a:blip r:embed="rId4" cstate="print">
             <a:extLst>
               <a:ext uri="{28A0092B-C50C-407E-A947-70E740481C1C}">
                 <a14:useLocalDpi xmlns:a14="http://schemas.microsoft.com/office/drawing/2010/main" val="0"/>
@@ -6647,7 +6403,7 @@
           <p:nvPr/>
         </p:nvPicPr>
         <p:blipFill>
-          <a:blip r:embed="rId6">
+          <a:blip r:embed="rId5">
             <a:extLst>
               <a:ext uri="{28A0092B-C50C-407E-A947-70E740481C1C}">
                 <a14:useLocalDpi xmlns:a14="http://schemas.microsoft.com/office/drawing/2010/main" val="0"/>
@@ -6670,14 +6426,14 @@
       </p:pic>
       <p:sp>
         <p:nvSpPr>
-          <p:cNvPr id="86" name="Textfeld 85"/>
+          <p:cNvPr id="87" name="Textfeld 86"/>
           <p:cNvSpPr txBox="1"/>
           <p:nvPr/>
         </p:nvSpPr>
         <p:spPr>
           <a:xfrm>
-            <a:off x="4564895" y="2595704"/>
-            <a:ext cx="1872657" cy="369332"/>
+            <a:off x="4570995" y="4081606"/>
+            <a:ext cx="1399991" cy="369332"/>
           </a:xfrm>
           <a:prstGeom prst="rect">
             <a:avLst/>
@@ -6702,70 +6458,345 @@
           </a:p>
         </p:txBody>
       </p:sp>
-      <p:sp>
-        <p:nvSpPr>
-          <p:cNvPr id="87" name="Textfeld 86"/>
-          <p:cNvSpPr txBox="1"/>
+      <p:grpSp>
+        <p:nvGrpSpPr>
+          <p:cNvPr id="24" name="Gruppieren 23"/>
+          <p:cNvGrpSpPr/>
           <p:nvPr/>
-        </p:nvSpPr>
-        <p:spPr>
-          <a:xfrm>
-            <a:off x="4570995" y="4081606"/>
-            <a:ext cx="1399991" cy="369332"/>
-          </a:xfrm>
-          <a:prstGeom prst="rect">
-            <a:avLst/>
-          </a:prstGeom>
-          <a:noFill/>
-        </p:spPr>
-        <p:txBody>
-          <a:bodyPr wrap="square" rtlCol="0">
-            <a:spAutoFit/>
-          </a:bodyPr>
-          <a:lstStyle/>
-          <a:p>
-            <a:r>
-              <a:rPr lang="de-DE" dirty="0" err="1" smtClean="0"/>
-              <a:t>Raumart</a:t>
-            </a:r>
-            <a:r>
-              <a:rPr lang="de-DE" dirty="0" smtClean="0"/>
-              <a:t>:</a:t>
-            </a:r>
-            <a:endParaRPr lang="de-DE" dirty="0"/>
-          </a:p>
-        </p:txBody>
-      </p:sp>
-      <p:sp>
-        <p:nvSpPr>
-          <p:cNvPr id="88" name="Textfeld 87"/>
-          <p:cNvSpPr txBox="1"/>
-          <p:nvPr/>
-        </p:nvSpPr>
-        <p:spPr>
-          <a:xfrm>
-            <a:off x="8752366" y="3086381"/>
-            <a:ext cx="1178017" cy="369332"/>
-          </a:xfrm>
-          <a:prstGeom prst="rect">
-            <a:avLst/>
-          </a:prstGeom>
-          <a:noFill/>
-        </p:spPr>
-        <p:txBody>
-          <a:bodyPr wrap="square" rtlCol="0">
-            <a:spAutoFit/>
-          </a:bodyPr>
-          <a:lstStyle/>
-          <a:p>
-            <a:r>
-              <a:rPr lang="de-DE" dirty="0" smtClean="0"/>
-              <a:t>€ 12,-/Tag</a:t>
-            </a:r>
-            <a:endParaRPr lang="de-DE" dirty="0"/>
-          </a:p>
-        </p:txBody>
-      </p:sp>
+        </p:nvGrpSpPr>
+        <p:grpSpPr>
+          <a:xfrm>
+            <a:off x="2092180" y="2358855"/>
+            <a:ext cx="8073310" cy="1372497"/>
+            <a:chOff x="2092180" y="2358855"/>
+            <a:chExt cx="8073310" cy="1372497"/>
+          </a:xfrm>
+        </p:grpSpPr>
+        <p:grpSp>
+          <p:nvGrpSpPr>
+            <p:cNvPr id="15" name="Gruppieren 14"/>
+            <p:cNvGrpSpPr/>
+            <p:nvPr/>
+          </p:nvGrpSpPr>
+          <p:grpSpPr>
+            <a:xfrm>
+              <a:off x="2092180" y="2358855"/>
+              <a:ext cx="8073310" cy="1372497"/>
+              <a:chOff x="2092180" y="2358855"/>
+              <a:chExt cx="8073310" cy="1372497"/>
+            </a:xfrm>
+          </p:grpSpPr>
+          <p:grpSp>
+            <p:nvGrpSpPr>
+              <p:cNvPr id="57" name="Gruppieren 56"/>
+              <p:cNvGrpSpPr/>
+              <p:nvPr/>
+            </p:nvGrpSpPr>
+            <p:grpSpPr>
+              <a:xfrm>
+                <a:off x="2092180" y="2358855"/>
+                <a:ext cx="8073310" cy="1372497"/>
+                <a:chOff x="2099925" y="2492034"/>
+                <a:chExt cx="8121374" cy="1408670"/>
+              </a:xfrm>
+              <a:solidFill>
+                <a:schemeClr val="bg1"/>
+              </a:solidFill>
+            </p:grpSpPr>
+            <p:sp>
+              <p:nvSpPr>
+                <p:cNvPr id="45" name="Abgerundetes Rechteck 44"/>
+                <p:cNvSpPr/>
+                <p:nvPr/>
+              </p:nvSpPr>
+              <p:spPr>
+                <a:xfrm>
+                  <a:off x="2099925" y="2492034"/>
+                  <a:ext cx="8121374" cy="1408670"/>
+                </a:xfrm>
+                <a:prstGeom prst="roundRect">
+                  <a:avLst/>
+                </a:prstGeom>
+                <a:grpFill/>
+              </p:spPr>
+              <p:style>
+                <a:lnRef idx="2">
+                  <a:schemeClr val="accent1">
+                    <a:shade val="50000"/>
+                  </a:schemeClr>
+                </a:lnRef>
+                <a:fillRef idx="1">
+                  <a:schemeClr val="accent1"/>
+                </a:fillRef>
+                <a:effectRef idx="0">
+                  <a:schemeClr val="accent1"/>
+                </a:effectRef>
+                <a:fontRef idx="minor">
+                  <a:schemeClr val="lt1"/>
+                </a:fontRef>
+              </p:style>
+              <p:txBody>
+                <a:bodyPr rtlCol="0" anchor="ctr"/>
+                <a:lstStyle/>
+                <a:p>
+                  <a:pPr algn="ctr"/>
+                  <a:endParaRPr lang="de-DE"/>
+                </a:p>
+              </p:txBody>
+            </p:sp>
+            <p:sp>
+              <p:nvSpPr>
+                <p:cNvPr id="46" name="Textfeld 45"/>
+                <p:cNvSpPr txBox="1"/>
+                <p:nvPr/>
+              </p:nvSpPr>
+              <p:spPr>
+                <a:xfrm>
+                  <a:off x="2380969" y="2741427"/>
+                  <a:ext cx="2067698" cy="646331"/>
+                </a:xfrm>
+                <a:prstGeom prst="rect">
+                  <a:avLst/>
+                </a:prstGeom>
+                <a:grpFill/>
+              </p:spPr>
+              <p:txBody>
+                <a:bodyPr wrap="square" rtlCol="0">
+                  <a:spAutoFit/>
+                </a:bodyPr>
+                <a:lstStyle/>
+                <a:p>
+                  <a:r>
+                    <a:rPr lang="de-DE" dirty="0" smtClean="0"/>
+                    <a:t>Heller Raum mit Blick auf Donau</a:t>
+                  </a:r>
+                  <a:endParaRPr lang="de-DE" dirty="0"/>
+                </a:p>
+              </p:txBody>
+            </p:sp>
+            <p:sp>
+              <p:nvSpPr>
+                <p:cNvPr id="49" name="Textfeld 48"/>
+                <p:cNvSpPr txBox="1"/>
+                <p:nvPr/>
+              </p:nvSpPr>
+              <p:spPr>
+                <a:xfrm>
+                  <a:off x="4605309" y="3125517"/>
+                  <a:ext cx="1045577" cy="369332"/>
+                </a:xfrm>
+                <a:prstGeom prst="rect">
+                  <a:avLst/>
+                </a:prstGeom>
+                <a:grpFill/>
+              </p:spPr>
+              <p:txBody>
+                <a:bodyPr wrap="square" rtlCol="0">
+                  <a:spAutoFit/>
+                </a:bodyPr>
+                <a:lstStyle/>
+                <a:p>
+                  <a:r>
+                    <a:rPr lang="de-DE" dirty="0" smtClean="0"/>
+                    <a:t>Office</a:t>
+                  </a:r>
+                  <a:endParaRPr lang="de-DE" dirty="0"/>
+                </a:p>
+              </p:txBody>
+            </p:sp>
+            <p:sp>
+              <p:nvSpPr>
+                <p:cNvPr id="51" name="Textfeld 50"/>
+                <p:cNvSpPr txBox="1"/>
+                <p:nvPr/>
+              </p:nvSpPr>
+              <p:spPr>
+                <a:xfrm>
+                  <a:off x="6449481" y="2698133"/>
+                  <a:ext cx="1980783" cy="369332"/>
+                </a:xfrm>
+                <a:prstGeom prst="rect">
+                  <a:avLst/>
+                </a:prstGeom>
+                <a:grpFill/>
+              </p:spPr>
+              <p:txBody>
+                <a:bodyPr wrap="square" rtlCol="0">
+                  <a:spAutoFit/>
+                </a:bodyPr>
+                <a:lstStyle/>
+                <a:p>
+                  <a:r>
+                    <a:rPr lang="de-DE" dirty="0" err="1" smtClean="0"/>
+                    <a:t>RaumAusstattung</a:t>
+                  </a:r>
+                  <a:r>
+                    <a:rPr lang="de-DE" dirty="0" smtClean="0"/>
+                    <a:t> </a:t>
+                  </a:r>
+                  <a:endParaRPr lang="de-DE" dirty="0"/>
+                </a:p>
+              </p:txBody>
+            </p:sp>
+            <p:pic>
+              <p:nvPicPr>
+                <p:cNvPr id="53" name="Grafik 52"/>
+                <p:cNvPicPr>
+                  <a:picLocks noChangeAspect="1"/>
+                </p:cNvPicPr>
+                <p:nvPr/>
+              </p:nvPicPr>
+              <p:blipFill>
+                <a:blip r:embed="rId3" cstate="print">
+                  <a:extLst>
+                    <a:ext uri="{28A0092B-C50C-407E-A947-70E740481C1C}">
+                      <a14:useLocalDpi xmlns:a14="http://schemas.microsoft.com/office/drawing/2010/main" val="0"/>
+                    </a:ext>
+                  </a:extLst>
+                </a:blip>
+                <a:stretch>
+                  <a:fillRect/>
+                </a:stretch>
+              </p:blipFill>
+              <p:spPr>
+                <a:xfrm>
+                  <a:off x="7373046" y="3189083"/>
+                  <a:ext cx="315836" cy="315836"/>
+                </a:xfrm>
+                <a:prstGeom prst="rect">
+                  <a:avLst/>
+                </a:prstGeom>
+                <a:grpFill/>
+              </p:spPr>
+            </p:pic>
+            <p:pic>
+              <p:nvPicPr>
+                <p:cNvPr id="54" name="Grafik 53"/>
+                <p:cNvPicPr>
+                  <a:picLocks noChangeAspect="1"/>
+                </p:cNvPicPr>
+                <p:nvPr/>
+              </p:nvPicPr>
+              <p:blipFill>
+                <a:blip r:embed="rId6" cstate="print">
+                  <a:extLst>
+                    <a:ext uri="{28A0092B-C50C-407E-A947-70E740481C1C}">
+                      <a14:useLocalDpi xmlns:a14="http://schemas.microsoft.com/office/drawing/2010/main" val="0"/>
+                    </a:ext>
+                  </a:extLst>
+                </a:blip>
+                <a:stretch>
+                  <a:fillRect/>
+                </a:stretch>
+              </p:blipFill>
+              <p:spPr>
+                <a:xfrm>
+                  <a:off x="7801700" y="3091724"/>
+                  <a:ext cx="448520" cy="448520"/>
+                </a:xfrm>
+                <a:prstGeom prst="rect">
+                  <a:avLst/>
+                </a:prstGeom>
+                <a:grpFill/>
+              </p:spPr>
+            </p:pic>
+            <p:sp>
+              <p:nvSpPr>
+                <p:cNvPr id="55" name="Textfeld 54"/>
+                <p:cNvSpPr txBox="1"/>
+                <p:nvPr/>
+              </p:nvSpPr>
+              <p:spPr>
+                <a:xfrm>
+                  <a:off x="9087517" y="2698258"/>
+                  <a:ext cx="1085353" cy="369332"/>
+                </a:xfrm>
+                <a:prstGeom prst="rect">
+                  <a:avLst/>
+                </a:prstGeom>
+                <a:grpFill/>
+              </p:spPr>
+              <p:txBody>
+                <a:bodyPr wrap="square" rtlCol="0">
+                  <a:spAutoFit/>
+                </a:bodyPr>
+                <a:lstStyle/>
+                <a:p>
+                  <a:r>
+                    <a:rPr lang="de-DE" dirty="0" smtClean="0"/>
+                    <a:t>Preis</a:t>
+                  </a:r>
+                  <a:endParaRPr lang="de-DE" dirty="0"/>
+                </a:p>
+              </p:txBody>
+            </p:sp>
+          </p:grpSp>
+          <p:sp>
+            <p:nvSpPr>
+              <p:cNvPr id="86" name="Textfeld 85"/>
+              <p:cNvSpPr txBox="1"/>
+              <p:nvPr/>
+            </p:nvSpPr>
+            <p:spPr>
+              <a:xfrm>
+                <a:off x="4564895" y="2595704"/>
+                <a:ext cx="1872657" cy="369332"/>
+              </a:xfrm>
+              <a:prstGeom prst="rect">
+                <a:avLst/>
+              </a:prstGeom>
+              <a:noFill/>
+            </p:spPr>
+            <p:txBody>
+              <a:bodyPr wrap="square" rtlCol="0">
+                <a:spAutoFit/>
+              </a:bodyPr>
+              <a:lstStyle/>
+              <a:p>
+                <a:r>
+                  <a:rPr lang="de-DE" dirty="0" err="1" smtClean="0"/>
+                  <a:t>Raumart</a:t>
+                </a:r>
+                <a:r>
+                  <a:rPr lang="de-DE" dirty="0" smtClean="0"/>
+                  <a:t>:</a:t>
+                </a:r>
+                <a:endParaRPr lang="de-DE" dirty="0"/>
+              </a:p>
+            </p:txBody>
+          </p:sp>
+        </p:grpSp>
+        <p:sp>
+          <p:nvSpPr>
+            <p:cNvPr id="88" name="Textfeld 87"/>
+            <p:cNvSpPr txBox="1"/>
+            <p:nvPr/>
+          </p:nvSpPr>
+          <p:spPr>
+            <a:xfrm>
+              <a:off x="8752366" y="3086381"/>
+              <a:ext cx="1178017" cy="369332"/>
+            </a:xfrm>
+            <a:prstGeom prst="rect">
+              <a:avLst/>
+            </a:prstGeom>
+            <a:noFill/>
+          </p:spPr>
+          <p:txBody>
+            <a:bodyPr wrap="square" rtlCol="0">
+              <a:spAutoFit/>
+            </a:bodyPr>
+            <a:lstStyle/>
+            <a:p>
+              <a:r>
+                <a:rPr lang="de-DE" dirty="0" smtClean="0"/>
+                <a:t>€ 12,-/Tag</a:t>
+              </a:r>
+              <a:endParaRPr lang="de-DE" dirty="0"/>
+            </a:p>
+          </p:txBody>
+        </p:sp>
+      </p:grpSp>
       <p:sp>
         <p:nvSpPr>
           <p:cNvPr id="89" name="Textfeld 88"/>
@@ -7051,7 +7082,7 @@
           <p:nvPr/>
         </p:nvPicPr>
         <p:blipFill>
-          <a:blip r:embed="rId6">
+          <a:blip r:embed="rId5">
             <a:extLst>
               <a:ext uri="{28A0092B-C50C-407E-A947-70E740481C1C}">
                 <a14:useLocalDpi xmlns:a14="http://schemas.microsoft.com/office/drawing/2010/main" val="0"/>
@@ -7242,6 +7273,553 @@
     <p:extLst>
       <p:ext uri="{BB962C8B-B14F-4D97-AF65-F5344CB8AC3E}">
         <p14:creationId xmlns:p14="http://schemas.microsoft.com/office/powerpoint/2010/main" val="2897207657"/>
+      </p:ext>
+    </p:extLst>
+  </p:cSld>
+  <p:clrMapOvr>
+    <a:masterClrMapping/>
+  </p:clrMapOvr>
+  <p:timing>
+    <p:tnLst>
+      <p:par>
+        <p:cTn id="1" dur="indefinite" restart="never" nodeType="tmRoot"/>
+      </p:par>
+    </p:tnLst>
+  </p:timing>
+</p:sld>
+</file>
+
+<file path=ppt/slides/slide5.xml><?xml version="1.0" encoding="utf-8"?>
+<p:sld xmlns:a="http://schemas.openxmlformats.org/drawingml/2006/main" xmlns:r="http://schemas.openxmlformats.org/officeDocument/2006/relationships" xmlns:p="http://schemas.openxmlformats.org/presentationml/2006/main">
+  <p:cSld>
+    <p:spTree>
+      <p:nvGrpSpPr>
+        <p:cNvPr id="1" name=""/>
+        <p:cNvGrpSpPr/>
+        <p:nvPr/>
+      </p:nvGrpSpPr>
+      <p:grpSpPr>
+        <a:xfrm>
+          <a:off x="0" y="0"/>
+          <a:ext cx="0" cy="0"/>
+          <a:chOff x="0" y="0"/>
+          <a:chExt cx="0" cy="0"/>
+        </a:xfrm>
+      </p:grpSpPr>
+      <p:pic>
+        <p:nvPicPr>
+          <p:cNvPr id="2" name="Grafik 1"/>
+          <p:cNvPicPr>
+            <a:picLocks noChangeAspect="1"/>
+          </p:cNvPicPr>
+          <p:nvPr/>
+        </p:nvPicPr>
+        <p:blipFill>
+          <a:blip r:embed="rId2">
+            <a:extLst>
+              <a:ext uri="{28A0092B-C50C-407E-A947-70E740481C1C}">
+                <a14:useLocalDpi xmlns:a14="http://schemas.microsoft.com/office/drawing/2010/main" val="0"/>
+              </a:ext>
+            </a:extLst>
+          </a:blip>
+          <a:stretch>
+            <a:fillRect/>
+          </a:stretch>
+        </p:blipFill>
+        <p:spPr>
+          <a:xfrm>
+            <a:off x="1019755" y="-7951"/>
+            <a:ext cx="10058400" cy="6707364"/>
+          </a:xfrm>
+          <a:prstGeom prst="rect">
+            <a:avLst/>
+          </a:prstGeom>
+        </p:spPr>
+      </p:pic>
+      <p:sp>
+        <p:nvSpPr>
+          <p:cNvPr id="3" name="Textfeld 2"/>
+          <p:cNvSpPr txBox="1"/>
+          <p:nvPr/>
+        </p:nvSpPr>
+        <p:spPr>
+          <a:xfrm>
+            <a:off x="4854469" y="960491"/>
+            <a:ext cx="2257167" cy="369332"/>
+          </a:xfrm>
+          <a:prstGeom prst="rect">
+            <a:avLst/>
+          </a:prstGeom>
+          <a:noFill/>
+        </p:spPr>
+        <p:txBody>
+          <a:bodyPr wrap="square" rtlCol="0">
+            <a:spAutoFit/>
+          </a:bodyPr>
+          <a:lstStyle/>
+          <a:p>
+            <a:r>
+              <a:rPr lang="de-DE" dirty="0" smtClean="0">
+                <a:solidFill>
+                  <a:schemeClr val="bg1"/>
+                </a:solidFill>
+              </a:rPr>
+              <a:t>Innovation  4 Austria</a:t>
+            </a:r>
+            <a:endParaRPr lang="de-DE" dirty="0">
+              <a:solidFill>
+                <a:schemeClr val="bg1"/>
+              </a:solidFill>
+            </a:endParaRPr>
+          </a:p>
+        </p:txBody>
+      </p:sp>
+      <p:sp>
+        <p:nvSpPr>
+          <p:cNvPr id="5" name="Abgerundetes Rechteck 4"/>
+          <p:cNvSpPr/>
+          <p:nvPr/>
+        </p:nvSpPr>
+        <p:spPr>
+          <a:xfrm>
+            <a:off x="9411730" y="824567"/>
+            <a:ext cx="1058561" cy="271848"/>
+          </a:xfrm>
+          <a:prstGeom prst="roundRect">
+            <a:avLst/>
+          </a:prstGeom>
+          <a:solidFill>
+            <a:schemeClr val="bg1"/>
+          </a:solidFill>
+        </p:spPr>
+        <p:style>
+          <a:lnRef idx="2">
+            <a:schemeClr val="accent1">
+              <a:shade val="50000"/>
+            </a:schemeClr>
+          </a:lnRef>
+          <a:fillRef idx="1">
+            <a:schemeClr val="accent1"/>
+          </a:fillRef>
+          <a:effectRef idx="0">
+            <a:schemeClr val="accent1"/>
+          </a:effectRef>
+          <a:fontRef idx="minor">
+            <a:schemeClr val="lt1"/>
+          </a:fontRef>
+        </p:style>
+        <p:txBody>
+          <a:bodyPr rtlCol="0" anchor="ctr"/>
+          <a:lstStyle/>
+          <a:p>
+            <a:pPr algn="ctr"/>
+            <a:r>
+              <a:rPr lang="de-DE" dirty="0" smtClean="0">
+                <a:solidFill>
+                  <a:schemeClr val="tx1"/>
+                </a:solidFill>
+              </a:rPr>
+              <a:t>Profil</a:t>
+            </a:r>
+            <a:endParaRPr lang="de-DE" dirty="0">
+              <a:solidFill>
+                <a:schemeClr val="tx1"/>
+              </a:solidFill>
+            </a:endParaRPr>
+          </a:p>
+        </p:txBody>
+      </p:sp>
+      <p:sp>
+        <p:nvSpPr>
+          <p:cNvPr id="6" name="Abgerundetes Rechteck 5"/>
+          <p:cNvSpPr/>
+          <p:nvPr/>
+        </p:nvSpPr>
+        <p:spPr>
+          <a:xfrm>
+            <a:off x="8600304" y="401858"/>
+            <a:ext cx="1869987" cy="271848"/>
+          </a:xfrm>
+          <a:prstGeom prst="roundRect">
+            <a:avLst/>
+          </a:prstGeom>
+          <a:solidFill>
+            <a:schemeClr val="bg1"/>
+          </a:solidFill>
+        </p:spPr>
+        <p:style>
+          <a:lnRef idx="2">
+            <a:schemeClr val="accent1">
+              <a:shade val="50000"/>
+            </a:schemeClr>
+          </a:lnRef>
+          <a:fillRef idx="1">
+            <a:schemeClr val="accent1"/>
+          </a:fillRef>
+          <a:effectRef idx="0">
+            <a:schemeClr val="accent1"/>
+          </a:effectRef>
+          <a:fontRef idx="minor">
+            <a:schemeClr val="lt1"/>
+          </a:fontRef>
+        </p:style>
+        <p:txBody>
+          <a:bodyPr rtlCol="0" anchor="ctr"/>
+          <a:lstStyle/>
+          <a:p>
+            <a:pPr algn="ctr"/>
+            <a:r>
+              <a:rPr lang="de-DE" dirty="0" smtClean="0">
+                <a:solidFill>
+                  <a:schemeClr val="tx1"/>
+                </a:solidFill>
+              </a:rPr>
+              <a:t>Übersicht</a:t>
+            </a:r>
+            <a:endParaRPr lang="de-DE" dirty="0">
+              <a:solidFill>
+                <a:schemeClr val="tx1"/>
+              </a:solidFill>
+            </a:endParaRPr>
+          </a:p>
+        </p:txBody>
+      </p:sp>
+      <p:grpSp>
+        <p:nvGrpSpPr>
+          <p:cNvPr id="7" name="Gruppieren 6"/>
+          <p:cNvGrpSpPr/>
+          <p:nvPr/>
+        </p:nvGrpSpPr>
+        <p:grpSpPr>
+          <a:xfrm>
+            <a:off x="2174675" y="2434020"/>
+            <a:ext cx="7966103" cy="1359284"/>
+            <a:chOff x="2051496" y="2543205"/>
+            <a:chExt cx="8121374" cy="1408670"/>
+          </a:xfrm>
+          <a:solidFill>
+            <a:schemeClr val="bg1"/>
+          </a:solidFill>
+        </p:grpSpPr>
+        <p:sp>
+          <p:nvSpPr>
+            <p:cNvPr id="8" name="Abgerundetes Rechteck 7"/>
+            <p:cNvSpPr/>
+            <p:nvPr/>
+          </p:nvSpPr>
+          <p:spPr>
+            <a:xfrm>
+              <a:off x="2051496" y="2543205"/>
+              <a:ext cx="8121374" cy="1408670"/>
+            </a:xfrm>
+            <a:prstGeom prst="roundRect">
+              <a:avLst/>
+            </a:prstGeom>
+            <a:grpFill/>
+          </p:spPr>
+          <p:style>
+            <a:lnRef idx="2">
+              <a:schemeClr val="accent1">
+                <a:shade val="50000"/>
+              </a:schemeClr>
+            </a:lnRef>
+            <a:fillRef idx="1">
+              <a:schemeClr val="accent1"/>
+            </a:fillRef>
+            <a:effectRef idx="0">
+              <a:schemeClr val="accent1"/>
+            </a:effectRef>
+            <a:fontRef idx="minor">
+              <a:schemeClr val="lt1"/>
+            </a:fontRef>
+          </p:style>
+          <p:txBody>
+            <a:bodyPr rtlCol="0" anchor="ctr"/>
+            <a:lstStyle/>
+            <a:p>
+              <a:pPr algn="ctr"/>
+              <a:endParaRPr lang="de-DE"/>
+            </a:p>
+          </p:txBody>
+        </p:sp>
+        <p:sp>
+          <p:nvSpPr>
+            <p:cNvPr id="9" name="Textfeld 8"/>
+            <p:cNvSpPr txBox="1"/>
+            <p:nvPr/>
+          </p:nvSpPr>
+          <p:spPr>
+            <a:xfrm>
+              <a:off x="2380969" y="2741427"/>
+              <a:ext cx="2067698" cy="646331"/>
+            </a:xfrm>
+            <a:prstGeom prst="rect">
+              <a:avLst/>
+            </a:prstGeom>
+            <a:grpFill/>
+          </p:spPr>
+          <p:txBody>
+            <a:bodyPr wrap="square" rtlCol="0">
+              <a:spAutoFit/>
+            </a:bodyPr>
+            <a:lstStyle/>
+            <a:p>
+              <a:r>
+                <a:rPr lang="de-DE" dirty="0" smtClean="0"/>
+                <a:t>Heller Raum mit Blick auf Donau</a:t>
+              </a:r>
+              <a:endParaRPr lang="de-DE" dirty="0"/>
+            </a:p>
+          </p:txBody>
+        </p:sp>
+        <p:sp>
+          <p:nvSpPr>
+            <p:cNvPr id="10" name="Textfeld 9"/>
+            <p:cNvSpPr txBox="1"/>
+            <p:nvPr/>
+          </p:nvSpPr>
+          <p:spPr>
+            <a:xfrm>
+              <a:off x="4566745" y="3013559"/>
+              <a:ext cx="1045577" cy="369332"/>
+            </a:xfrm>
+            <a:prstGeom prst="rect">
+              <a:avLst/>
+            </a:prstGeom>
+            <a:grpFill/>
+          </p:spPr>
+          <p:txBody>
+            <a:bodyPr wrap="square" rtlCol="0">
+              <a:spAutoFit/>
+            </a:bodyPr>
+            <a:lstStyle/>
+            <a:p>
+              <a:r>
+                <a:rPr lang="de-DE" dirty="0" smtClean="0"/>
+                <a:t>Office</a:t>
+              </a:r>
+              <a:endParaRPr lang="de-DE" dirty="0"/>
+            </a:p>
+          </p:txBody>
+        </p:sp>
+        <p:sp>
+          <p:nvSpPr>
+            <p:cNvPr id="14" name="Textfeld 13"/>
+            <p:cNvSpPr txBox="1"/>
+            <p:nvPr/>
+          </p:nvSpPr>
+          <p:spPr>
+            <a:xfrm>
+              <a:off x="7399394" y="2674050"/>
+              <a:ext cx="1085353" cy="369332"/>
+            </a:xfrm>
+            <a:prstGeom prst="rect">
+              <a:avLst/>
+            </a:prstGeom>
+            <a:grpFill/>
+          </p:spPr>
+          <p:txBody>
+            <a:bodyPr wrap="square" rtlCol="0">
+              <a:spAutoFit/>
+            </a:bodyPr>
+            <a:lstStyle/>
+            <a:p>
+              <a:r>
+                <a:rPr lang="de-DE" dirty="0" smtClean="0"/>
+                <a:t>Preis</a:t>
+              </a:r>
+              <a:endParaRPr lang="de-DE" dirty="0"/>
+            </a:p>
+          </p:txBody>
+        </p:sp>
+      </p:grpSp>
+      <p:grpSp>
+        <p:nvGrpSpPr>
+          <p:cNvPr id="24" name="Gruppieren 23"/>
+          <p:cNvGrpSpPr/>
+          <p:nvPr/>
+        </p:nvGrpSpPr>
+        <p:grpSpPr>
+          <a:xfrm>
+            <a:off x="4560690" y="2559664"/>
+            <a:ext cx="5135245" cy="738664"/>
+            <a:chOff x="4560690" y="2559664"/>
+            <a:chExt cx="5135245" cy="738664"/>
+          </a:xfrm>
+        </p:grpSpPr>
+        <p:sp>
+          <p:nvSpPr>
+            <p:cNvPr id="17" name="Textfeld 16"/>
+            <p:cNvSpPr txBox="1"/>
+            <p:nvPr/>
+          </p:nvSpPr>
+          <p:spPr>
+            <a:xfrm>
+              <a:off x="4560690" y="2559664"/>
+              <a:ext cx="1322564" cy="369332"/>
+            </a:xfrm>
+            <a:prstGeom prst="rect">
+              <a:avLst/>
+            </a:prstGeom>
+            <a:noFill/>
+          </p:spPr>
+          <p:txBody>
+            <a:bodyPr wrap="square" rtlCol="0">
+              <a:spAutoFit/>
+            </a:bodyPr>
+            <a:lstStyle/>
+            <a:p>
+              <a:r>
+                <a:rPr lang="de-DE" dirty="0" err="1" smtClean="0"/>
+                <a:t>Raumart</a:t>
+              </a:r>
+              <a:endParaRPr lang="de-DE" dirty="0"/>
+            </a:p>
+          </p:txBody>
+        </p:sp>
+        <p:sp>
+          <p:nvSpPr>
+            <p:cNvPr id="18" name="Textfeld 17"/>
+            <p:cNvSpPr txBox="1"/>
+            <p:nvPr/>
+          </p:nvSpPr>
+          <p:spPr>
+            <a:xfrm>
+              <a:off x="5836208" y="2559664"/>
+              <a:ext cx="1084770" cy="369332"/>
+            </a:xfrm>
+            <a:prstGeom prst="rect">
+              <a:avLst/>
+            </a:prstGeom>
+            <a:noFill/>
+          </p:spPr>
+          <p:txBody>
+            <a:bodyPr wrap="square" rtlCol="0">
+              <a:spAutoFit/>
+            </a:bodyPr>
+            <a:lstStyle/>
+            <a:p>
+              <a:r>
+                <a:rPr lang="de-DE" dirty="0" smtClean="0"/>
+                <a:t>Buchung </a:t>
+              </a:r>
+              <a:endParaRPr lang="de-DE" dirty="0"/>
+            </a:p>
+          </p:txBody>
+        </p:sp>
+        <p:sp>
+          <p:nvSpPr>
+            <p:cNvPr id="19" name="Textfeld 18"/>
+            <p:cNvSpPr txBox="1"/>
+            <p:nvPr/>
+          </p:nvSpPr>
+          <p:spPr>
+            <a:xfrm>
+              <a:off x="5805792" y="2928996"/>
+              <a:ext cx="1580289" cy="369332"/>
+            </a:xfrm>
+            <a:prstGeom prst="rect">
+              <a:avLst/>
+            </a:prstGeom>
+            <a:noFill/>
+          </p:spPr>
+          <p:txBody>
+            <a:bodyPr wrap="square" rtlCol="0">
+              <a:spAutoFit/>
+            </a:bodyPr>
+            <a:lstStyle/>
+            <a:p>
+              <a:r>
+                <a:rPr lang="de-DE" dirty="0" smtClean="0"/>
+                <a:t>17.02 – 25.02</a:t>
+              </a:r>
+              <a:endParaRPr lang="de-DE" dirty="0"/>
+            </a:p>
+          </p:txBody>
+        </p:sp>
+        <p:sp>
+          <p:nvSpPr>
+            <p:cNvPr id="20" name="Textfeld 19"/>
+            <p:cNvSpPr txBox="1"/>
+            <p:nvPr/>
+          </p:nvSpPr>
+          <p:spPr>
+            <a:xfrm>
+              <a:off x="7400507" y="2912097"/>
+              <a:ext cx="1064304" cy="369332"/>
+            </a:xfrm>
+            <a:prstGeom prst="rect">
+              <a:avLst/>
+            </a:prstGeom>
+            <a:noFill/>
+          </p:spPr>
+          <p:txBody>
+            <a:bodyPr wrap="square" rtlCol="0">
+              <a:spAutoFit/>
+            </a:bodyPr>
+            <a:lstStyle/>
+            <a:p>
+              <a:r>
+                <a:rPr lang="de-DE" dirty="0" smtClean="0"/>
+                <a:t>98,-</a:t>
+              </a:r>
+              <a:endParaRPr lang="de-DE" dirty="0"/>
+            </a:p>
+          </p:txBody>
+        </p:sp>
+        <p:sp>
+          <p:nvSpPr>
+            <p:cNvPr id="22" name="Abgerundetes Rechteck 21"/>
+            <p:cNvSpPr/>
+            <p:nvPr/>
+          </p:nvSpPr>
+          <p:spPr>
+            <a:xfrm>
+              <a:off x="8450385" y="2569148"/>
+              <a:ext cx="1245550" cy="653635"/>
+            </a:xfrm>
+            <a:prstGeom prst="roundRect">
+              <a:avLst/>
+            </a:prstGeom>
+          </p:spPr>
+          <p:style>
+            <a:lnRef idx="2">
+              <a:schemeClr val="accent1">
+                <a:shade val="50000"/>
+              </a:schemeClr>
+            </a:lnRef>
+            <a:fillRef idx="1">
+              <a:schemeClr val="accent1"/>
+            </a:fillRef>
+            <a:effectRef idx="0">
+              <a:schemeClr val="accent1"/>
+            </a:effectRef>
+            <a:fontRef idx="minor">
+              <a:schemeClr val="lt1"/>
+            </a:fontRef>
+          </p:style>
+          <p:txBody>
+            <a:bodyPr rtlCol="0" anchor="ctr"/>
+            <a:lstStyle/>
+            <a:p>
+              <a:pPr algn="ctr"/>
+              <a:r>
+                <a:rPr lang="de-DE" dirty="0" smtClean="0"/>
+                <a:t>Jetzt </a:t>
+              </a:r>
+              <a:r>
+                <a:rPr lang="de-DE" dirty="0" smtClean="0"/>
+                <a:t>Buchen</a:t>
+              </a:r>
+              <a:endParaRPr lang="de-DE" dirty="0"/>
+            </a:p>
+          </p:txBody>
+        </p:sp>
+      </p:grpSp>
+    </p:spTree>
+    <p:extLst>
+      <p:ext uri="{BB962C8B-B14F-4D97-AF65-F5344CB8AC3E}">
+        <p14:creationId xmlns:p14="http://schemas.microsoft.com/office/powerpoint/2010/main" val="680708337"/>
       </p:ext>
     </p:extLst>
   </p:cSld>

</xml_diff>

<commit_message>
DashboardModel / RechnungsModel, BuchungsModel, MitarbeiterModel erstellt
</commit_message>
<xml_diff>
--- a/Mockup.pptx
+++ b/Mockup.pptx
@@ -3325,7 +3325,7 @@
         </p:blipFill>
         <p:spPr>
           <a:xfrm>
-            <a:off x="657290" y="138079"/>
+            <a:off x="622734" y="142409"/>
             <a:ext cx="10058400" cy="6707364"/>
           </a:xfrm>
           <a:prstGeom prst="rect">
@@ -3417,10 +3417,6 @@
           <a:lstStyle/>
           <a:p>
             <a:pPr algn="ctr"/>
-            <a:r>
-              <a:rPr lang="de-DE" dirty="0" smtClean="0"/>
-              <a:t>f</a:t>
-            </a:r>
             <a:endParaRPr lang="de-DE" dirty="0"/>
           </a:p>
         </p:txBody>
@@ -3465,10 +3461,6 @@
           <a:lstStyle/>
           <a:p>
             <a:pPr algn="ctr"/>
-            <a:r>
-              <a:rPr lang="de-DE" dirty="0" smtClean="0"/>
-              <a:t>f</a:t>
-            </a:r>
             <a:endParaRPr lang="de-DE" dirty="0"/>
           </a:p>
         </p:txBody>
@@ -3487,9 +3479,7 @@
           <a:prstGeom prst="roundRect">
             <a:avLst/>
           </a:prstGeom>
-          <a:solidFill>
-            <a:schemeClr val="bg1"/>
-          </a:solidFill>
+          <a:noFill/>
         </p:spPr>
         <p:style>
           <a:lnRef idx="2">
@@ -3538,21 +3528,40 @@
           </a:bodyPr>
           <a:lstStyle/>
           <a:p>
-            <a:r>
-              <a:rPr lang="de-DE" sz="1100" dirty="0" smtClean="0"/>
+            <a:pPr algn="ctr"/>
+            <a:r>
+              <a:rPr lang="de-DE" sz="1100" dirty="0" smtClean="0">
+                <a:solidFill>
+                  <a:schemeClr val="bg1"/>
+                </a:solidFill>
+              </a:rPr>
               <a:t>Raumnummer</a:t>
             </a:r>
           </a:p>
           <a:p>
-            <a:r>
-              <a:rPr lang="de-DE" sz="1100" dirty="0" err="1" smtClean="0"/>
+            <a:pPr algn="ctr"/>
+            <a:r>
+              <a:rPr lang="de-DE" sz="1100" dirty="0" err="1" smtClean="0">
+                <a:solidFill>
+                  <a:schemeClr val="bg1"/>
+                </a:solidFill>
+              </a:rPr>
               <a:t>Raumart</a:t>
             </a:r>
-            <a:endParaRPr lang="de-DE" sz="1100" dirty="0" smtClean="0"/>
-          </a:p>
-          <a:p>
-            <a:r>
-              <a:rPr lang="de-DE" sz="1100" dirty="0" smtClean="0"/>
+            <a:endParaRPr lang="de-DE" sz="1100" dirty="0" smtClean="0">
+              <a:solidFill>
+                <a:schemeClr val="bg1"/>
+              </a:solidFill>
+            </a:endParaRPr>
+          </a:p>
+          <a:p>
+            <a:pPr algn="ctr"/>
+            <a:r>
+              <a:rPr lang="de-DE" sz="1100" dirty="0" smtClean="0">
+                <a:solidFill>
+                  <a:schemeClr val="bg1"/>
+                </a:solidFill>
+              </a:rPr>
               <a:t>Von - Bis</a:t>
             </a:r>
           </a:p>
@@ -3574,6 +3583,7 @@
             <a:chOff x="7529384" y="2042984"/>
             <a:chExt cx="2001794" cy="1252151"/>
           </a:xfrm>
+          <a:noFill/>
         </p:grpSpPr>
         <p:sp>
           <p:nvSpPr>
@@ -3589,9 +3599,7 @@
             <a:prstGeom prst="roundRect">
               <a:avLst/>
             </a:prstGeom>
-            <a:solidFill>
-              <a:schemeClr val="bg1"/>
-            </a:solidFill>
+            <a:grpFill/>
           </p:spPr>
           <p:style>
             <a:lnRef idx="2">
@@ -3632,7 +3640,7 @@
             <a:prstGeom prst="rect">
               <a:avLst/>
             </a:prstGeom>
-            <a:noFill/>
+            <a:grpFill/>
           </p:spPr>
           <p:txBody>
             <a:bodyPr wrap="square" rtlCol="0">
@@ -3640,20 +3648,37 @@
             </a:bodyPr>
             <a:lstStyle/>
             <a:p>
+              <a:pPr algn="ctr"/>
               <a:r>
-                <a:rPr lang="de-DE" sz="1100" dirty="0" smtClean="0"/>
+                <a:rPr lang="de-DE" sz="1100" dirty="0" smtClean="0">
+                  <a:solidFill>
+                    <a:schemeClr val="bg1"/>
+                  </a:solidFill>
+                </a:rPr>
                 <a:t>FA-Rechnung </a:t>
               </a:r>
               <a:r>
-                <a:rPr lang="de-DE" sz="1100" dirty="0" err="1"/>
+                <a:rPr lang="de-DE" sz="1100" dirty="0" err="1">
+                  <a:solidFill>
+                    <a:schemeClr val="bg1"/>
+                  </a:solidFill>
+                </a:rPr>
                 <a:t>Nr</a:t>
               </a:r>
               <a:r>
-                <a:rPr lang="de-DE" dirty="0" smtClean="0"/>
+                <a:rPr lang="de-DE" dirty="0" smtClean="0">
+                  <a:solidFill>
+                    <a:schemeClr val="bg1"/>
+                  </a:solidFill>
+                </a:rPr>
                 <a:t> </a:t>
               </a:r>
               <a:r>
-                <a:rPr lang="de-DE" sz="1100" dirty="0"/>
+                <a:rPr lang="de-DE" sz="1100" dirty="0">
+                  <a:solidFill>
+                    <a:schemeClr val="bg1"/>
+                  </a:solidFill>
+                </a:rPr>
                 <a:t>Dezember</a:t>
               </a:r>
             </a:p>
@@ -3822,9 +3847,7 @@
           <a:prstGeom prst="roundRect">
             <a:avLst/>
           </a:prstGeom>
-          <a:solidFill>
-            <a:schemeClr val="bg1"/>
-          </a:solidFill>
+          <a:noFill/>
         </p:spPr>
         <p:style>
           <a:lnRef idx="2">
@@ -3865,9 +3888,7 @@
           <a:prstGeom prst="roundRect">
             <a:avLst/>
           </a:prstGeom>
-          <a:solidFill>
-            <a:schemeClr val="bg1"/>
-          </a:solidFill>
+          <a:noFill/>
         </p:spPr>
         <p:style>
           <a:lnRef idx="2">
@@ -3896,14 +3917,14 @@
       </p:sp>
       <p:sp>
         <p:nvSpPr>
-          <p:cNvPr id="25" name="Textfeld 24"/>
+          <p:cNvPr id="26" name="Textfeld 25"/>
           <p:cNvSpPr txBox="1"/>
           <p:nvPr/>
         </p:nvSpPr>
         <p:spPr>
           <a:xfrm>
-            <a:off x="5026816" y="3626705"/>
-            <a:ext cx="1616131" cy="600164"/>
+            <a:off x="5026816" y="5181600"/>
+            <a:ext cx="1615361" cy="600164"/>
           </a:xfrm>
           <a:prstGeom prst="rect">
             <a:avLst/>
@@ -3916,63 +3937,40 @@
           </a:bodyPr>
           <a:lstStyle/>
           <a:p>
-            <a:r>
-              <a:rPr lang="de-DE" sz="1100" dirty="0" smtClean="0"/>
+            <a:pPr algn="ctr"/>
+            <a:r>
+              <a:rPr lang="de-DE" sz="1100" dirty="0" smtClean="0">
+                <a:solidFill>
+                  <a:schemeClr val="bg1"/>
+                </a:solidFill>
+              </a:rPr>
               <a:t>Raumnummer</a:t>
             </a:r>
           </a:p>
           <a:p>
-            <a:r>
-              <a:rPr lang="de-DE" sz="1100" dirty="0" err="1" smtClean="0"/>
+            <a:pPr algn="ctr"/>
+            <a:r>
+              <a:rPr lang="de-DE" sz="1100" dirty="0" err="1" smtClean="0">
+                <a:solidFill>
+                  <a:schemeClr val="bg1"/>
+                </a:solidFill>
+              </a:rPr>
               <a:t>Raumart</a:t>
             </a:r>
-            <a:endParaRPr lang="de-DE" sz="1100" dirty="0" smtClean="0"/>
-          </a:p>
-          <a:p>
-            <a:r>
-              <a:rPr lang="de-DE" sz="1100" dirty="0" smtClean="0"/>
-              <a:t>Von - Bis</a:t>
-            </a:r>
-          </a:p>
-        </p:txBody>
-      </p:sp>
-      <p:sp>
-        <p:nvSpPr>
-          <p:cNvPr id="26" name="Textfeld 25"/>
-          <p:cNvSpPr txBox="1"/>
-          <p:nvPr/>
-        </p:nvSpPr>
-        <p:spPr>
-          <a:xfrm>
-            <a:off x="5026816" y="5181600"/>
-            <a:ext cx="1615361" cy="600164"/>
-          </a:xfrm>
-          <a:prstGeom prst="rect">
-            <a:avLst/>
-          </a:prstGeom>
-          <a:noFill/>
-        </p:spPr>
-        <p:txBody>
-          <a:bodyPr wrap="square" rtlCol="0">
-            <a:spAutoFit/>
-          </a:bodyPr>
-          <a:lstStyle/>
-          <a:p>
-            <a:r>
-              <a:rPr lang="de-DE" sz="1100" dirty="0" smtClean="0"/>
-              <a:t>Raumnummer</a:t>
-            </a:r>
-          </a:p>
-          <a:p>
-            <a:r>
-              <a:rPr lang="de-DE" sz="1100" dirty="0" err="1" smtClean="0"/>
-              <a:t>Raumart</a:t>
-            </a:r>
-            <a:endParaRPr lang="de-DE" sz="1100" dirty="0" smtClean="0"/>
-          </a:p>
-          <a:p>
-            <a:r>
-              <a:rPr lang="de-DE" sz="1100" dirty="0" smtClean="0"/>
+            <a:endParaRPr lang="de-DE" sz="1100" dirty="0" smtClean="0">
+              <a:solidFill>
+                <a:schemeClr val="bg1"/>
+              </a:solidFill>
+            </a:endParaRPr>
+          </a:p>
+          <a:p>
+            <a:pPr algn="ctr"/>
+            <a:r>
+              <a:rPr lang="de-DE" sz="1100" dirty="0" smtClean="0">
+                <a:solidFill>
+                  <a:schemeClr val="bg1"/>
+                </a:solidFill>
+              </a:rPr>
               <a:t>Von - Bis</a:t>
             </a:r>
           </a:p>
@@ -3991,6 +3989,7 @@
             <a:chOff x="1952368" y="1448896"/>
             <a:chExt cx="7633563" cy="4880127"/>
           </a:xfrm>
+          <a:noFill/>
         </p:grpSpPr>
         <p:sp>
           <p:nvSpPr>
@@ -4006,6 +4005,7 @@
             <a:prstGeom prst="rect">
               <a:avLst/>
             </a:prstGeom>
+            <a:grpFill/>
           </p:spPr>
           <p:style>
             <a:lnRef idx="2">
@@ -4045,6 +4045,7 @@
               <a:chOff x="1952368" y="1476766"/>
               <a:chExt cx="7586494" cy="4852257"/>
             </a:xfrm>
+            <a:grpFill/>
           </p:grpSpPr>
           <p:sp>
             <p:nvSpPr>
@@ -4060,6 +4061,7 @@
               <a:prstGeom prst="rect">
                 <a:avLst/>
               </a:prstGeom>
+              <a:grpFill/>
             </p:spPr>
             <p:style>
               <a:lnRef idx="2">
@@ -4099,6 +4101,7 @@
                 <a:chOff x="1952368" y="1476766"/>
                 <a:chExt cx="7586494" cy="4852257"/>
               </a:xfrm>
+              <a:grpFill/>
             </p:grpSpPr>
             <p:grpSp>
               <p:nvGrpSpPr>
@@ -4113,6 +4116,7 @@
                   <a:chOff x="1952368" y="1985319"/>
                   <a:chExt cx="7586494" cy="4343704"/>
                 </a:xfrm>
+                <a:grpFill/>
               </p:grpSpPr>
               <p:sp>
                 <p:nvSpPr>
@@ -4128,9 +4132,7 @@
                   <a:prstGeom prst="roundRect">
                     <a:avLst/>
                   </a:prstGeom>
-                  <a:solidFill>
-                    <a:schemeClr val="bg1"/>
-                  </a:solidFill>
+                  <a:grpFill/>
                 </p:spPr>
                 <p:style>
                   <a:lnRef idx="2">
@@ -4171,7 +4173,7 @@
                   <a:prstGeom prst="rect">
                     <a:avLst/>
                   </a:prstGeom>
-                  <a:noFill/>
+                  <a:grpFill/>
                 </p:spPr>
                 <p:txBody>
                   <a:bodyPr wrap="square" rtlCol="0">
@@ -4179,32 +4181,59 @@
                   </a:bodyPr>
                   <a:lstStyle/>
                   <a:p>
+                    <a:pPr algn="ctr"/>
                     <a:r>
-                      <a:rPr lang="de-DE" sz="1100" dirty="0" err="1"/>
+                      <a:rPr lang="de-DE" sz="1100" dirty="0" err="1">
+                        <a:solidFill>
+                          <a:schemeClr val="bg1"/>
+                        </a:solidFill>
+                      </a:rPr>
                       <a:t>Fa</a:t>
                     </a:r>
                     <a:r>
-                      <a:rPr lang="de-DE" sz="1100" dirty="0"/>
+                      <a:rPr lang="de-DE" sz="1100" dirty="0">
+                        <a:solidFill>
+                          <a:schemeClr val="bg1"/>
+                        </a:solidFill>
+                      </a:rPr>
                       <a:t>- Mitarbeiter@</a:t>
                     </a:r>
                   </a:p>
                   <a:p>
+                    <a:pPr algn="ctr"/>
                     <a:r>
-                      <a:rPr lang="de-DE" sz="1100" dirty="0"/>
+                      <a:rPr lang="de-DE" sz="1100" dirty="0">
+                        <a:solidFill>
+                          <a:schemeClr val="bg1"/>
+                        </a:solidFill>
+                      </a:rPr>
                       <a:t>Emailadresse</a:t>
                     </a:r>
                   </a:p>
                   <a:p>
+                    <a:pPr algn="ctr"/>
                     <a:r>
-                      <a:rPr lang="de-DE" sz="1100" dirty="0"/>
+                      <a:rPr lang="de-DE" sz="1100" dirty="0">
+                        <a:solidFill>
+                          <a:schemeClr val="bg1"/>
+                        </a:solidFill>
+                      </a:rPr>
                       <a:t>Vorname</a:t>
                     </a:r>
                     <a:r>
-                      <a:rPr lang="de-DE" dirty="0" smtClean="0"/>
+                      <a:rPr lang="de-DE" dirty="0" smtClean="0">
+                        <a:solidFill>
+                          <a:schemeClr val="bg1"/>
+                        </a:solidFill>
+                      </a:rPr>
                       <a:t> </a:t>
                     </a:r>
                     <a:r>
-                      <a:rPr lang="de-DE" sz="1100" dirty="0"/>
+                      <a:rPr lang="de-DE" sz="1100" dirty="0">
+                        <a:solidFill>
+                          <a:schemeClr val="bg1"/>
+                        </a:solidFill>
+                      </a:rPr>
                       <a:t>Nachname</a:t>
                     </a:r>
                   </a:p>
@@ -4223,6 +4252,7 @@
                     <a:chOff x="1952368" y="1985319"/>
                     <a:chExt cx="7586494" cy="4318990"/>
                   </a:xfrm>
+                  <a:grpFill/>
                 </p:grpSpPr>
                 <p:sp>
                   <p:nvSpPr>
@@ -4238,9 +4268,7 @@
                     <a:prstGeom prst="roundRect">
                       <a:avLst/>
                     </a:prstGeom>
-                    <a:solidFill>
-                      <a:schemeClr val="bg1"/>
-                    </a:solidFill>
+                    <a:grpFill/>
                   </p:spPr>
                   <p:style>
                     <a:lnRef idx="2">
@@ -4281,7 +4309,7 @@
                     <a:prstGeom prst="rect">
                       <a:avLst/>
                     </a:prstGeom>
-                    <a:noFill/>
+                    <a:grpFill/>
                   </p:spPr>
                   <p:txBody>
                     <a:bodyPr wrap="square" rtlCol="0">
@@ -4289,24 +4317,43 @@
                     </a:bodyPr>
                     <a:lstStyle/>
                     <a:p>
+                      <a:pPr algn="ctr"/>
                       <a:r>
-                        <a:rPr lang="de-DE" sz="1100" dirty="0" err="1"/>
+                        <a:rPr lang="de-DE" sz="1100" dirty="0" err="1">
+                          <a:solidFill>
+                            <a:schemeClr val="bg1"/>
+                          </a:solidFill>
+                        </a:rPr>
                         <a:t>Fa</a:t>
                       </a:r>
                       <a:r>
-                        <a:rPr lang="de-DE" sz="1100" dirty="0"/>
+                        <a:rPr lang="de-DE" sz="1100" dirty="0">
+                          <a:solidFill>
+                            <a:schemeClr val="bg1"/>
+                          </a:solidFill>
+                        </a:rPr>
                         <a:t>- Mitarbeiter@</a:t>
                       </a:r>
                     </a:p>
                     <a:p>
+                      <a:pPr algn="ctr"/>
                       <a:r>
-                        <a:rPr lang="de-DE" sz="1100" dirty="0"/>
+                        <a:rPr lang="de-DE" sz="1100" dirty="0">
+                          <a:solidFill>
+                            <a:schemeClr val="bg1"/>
+                          </a:solidFill>
+                        </a:rPr>
                         <a:t>Emailadresse</a:t>
                       </a:r>
                     </a:p>
                     <a:p>
+                      <a:pPr algn="ctr"/>
                       <a:r>
-                        <a:rPr lang="de-DE" sz="1100" dirty="0"/>
+                        <a:rPr lang="de-DE" sz="1100" dirty="0">
+                          <a:solidFill>
+                            <a:schemeClr val="bg1"/>
+                          </a:solidFill>
+                        </a:rPr>
                         <a:t>Vorname Nachname</a:t>
                       </a:r>
                     </a:p>
@@ -4325,6 +4372,7 @@
                       <a:chOff x="1952368" y="1985319"/>
                       <a:chExt cx="7586494" cy="4318990"/>
                     </a:xfrm>
+                    <a:grpFill/>
                   </p:grpSpPr>
                   <p:sp>
                     <p:nvSpPr>
@@ -4340,9 +4388,7 @@
                       <a:prstGeom prst="roundRect">
                         <a:avLst/>
                       </a:prstGeom>
-                      <a:solidFill>
-                        <a:schemeClr val="bg1"/>
-                      </a:solidFill>
+                      <a:grpFill/>
                     </p:spPr>
                     <p:style>
                       <a:lnRef idx="2">
@@ -4383,7 +4429,7 @@
                       <a:prstGeom prst="rect">
                         <a:avLst/>
                       </a:prstGeom>
-                      <a:noFill/>
+                      <a:grpFill/>
                     </p:spPr>
                     <p:txBody>
                       <a:bodyPr wrap="square" rtlCol="0">
@@ -4391,39 +4437,74 @@
                       </a:bodyPr>
                       <a:lstStyle/>
                       <a:p>
+                        <a:pPr algn="ctr"/>
                         <a:r>
-                          <a:rPr lang="de-DE" sz="1100" dirty="0" err="1"/>
+                          <a:rPr lang="de-DE" sz="1100" dirty="0" err="1">
+                            <a:solidFill>
+                              <a:schemeClr val="bg1"/>
+                            </a:solidFill>
+                          </a:rPr>
                           <a:t>Fa</a:t>
                         </a:r>
                         <a:r>
-                          <a:rPr lang="de-DE" sz="1100" dirty="0"/>
+                          <a:rPr lang="de-DE" sz="1100" dirty="0">
+                            <a:solidFill>
+                              <a:schemeClr val="bg1"/>
+                            </a:solidFill>
+                          </a:rPr>
                           <a:t>-</a:t>
                         </a:r>
                         <a:r>
-                          <a:rPr lang="de-DE" dirty="0" smtClean="0"/>
+                          <a:rPr lang="de-DE" dirty="0" smtClean="0">
+                            <a:solidFill>
+                              <a:schemeClr val="bg1"/>
+                            </a:solidFill>
+                          </a:rPr>
                           <a:t> </a:t>
                         </a:r>
                         <a:r>
-                          <a:rPr lang="de-DE" sz="1100" dirty="0" smtClean="0"/>
+                          <a:rPr lang="de-DE" sz="1100" dirty="0" smtClean="0">
+                            <a:solidFill>
+                              <a:schemeClr val="bg1"/>
+                            </a:solidFill>
+                          </a:rPr>
                           <a:t>Mitarbeiter</a:t>
                         </a:r>
                         <a:r>
-                          <a:rPr lang="de-DE" sz="1100" dirty="0"/>
+                          <a:rPr lang="de-DE" sz="1100" dirty="0">
+                            <a:solidFill>
+                              <a:schemeClr val="bg1"/>
+                            </a:solidFill>
+                          </a:rPr>
                           <a:t>@</a:t>
                         </a:r>
                       </a:p>
                       <a:p>
+                        <a:pPr algn="ctr"/>
                         <a:r>
-                          <a:rPr lang="de-DE" sz="1100" dirty="0" smtClean="0"/>
+                          <a:rPr lang="de-DE" sz="1100" dirty="0" smtClean="0">
+                            <a:solidFill>
+                              <a:schemeClr val="bg1"/>
+                            </a:solidFill>
+                          </a:rPr>
                           <a:t>Emailadresse</a:t>
                         </a:r>
                       </a:p>
                       <a:p>
+                        <a:pPr algn="ctr"/>
                         <a:r>
-                          <a:rPr lang="de-DE" sz="1100" dirty="0" smtClean="0"/>
+                          <a:rPr lang="de-DE" sz="1100" dirty="0" smtClean="0">
+                            <a:solidFill>
+                              <a:schemeClr val="bg1"/>
+                            </a:solidFill>
+                          </a:rPr>
                           <a:t>Vorname Nachname</a:t>
                         </a:r>
-                        <a:endParaRPr lang="de-DE" sz="1100" dirty="0"/>
+                        <a:endParaRPr lang="de-DE" sz="1100" dirty="0">
+                          <a:solidFill>
+                            <a:schemeClr val="bg1"/>
+                          </a:solidFill>
+                        </a:endParaRPr>
                       </a:p>
                     </p:txBody>
                   </p:sp>
@@ -4440,6 +4521,7 @@
                         <a:chOff x="7438766" y="3458264"/>
                         <a:chExt cx="2100096" cy="2846045"/>
                       </a:xfrm>
+                      <a:grpFill/>
                     </p:grpSpPr>
                     <p:sp>
                       <p:nvSpPr>
@@ -4455,9 +4537,7 @@
                         <a:prstGeom prst="roundRect">
                           <a:avLst/>
                         </a:prstGeom>
-                        <a:solidFill>
-                          <a:schemeClr val="bg1"/>
-                        </a:solidFill>
+                        <a:grpFill/>
                       </p:spPr>
                       <p:style>
                         <a:lnRef idx="2">
@@ -4484,115 +4564,50 @@
                         </a:p>
                       </p:txBody>
                     </p:sp>
-                    <p:grpSp>
-                      <p:nvGrpSpPr>
-                        <p:cNvPr id="37" name="Gruppieren 36"/>
-                        <p:cNvGrpSpPr/>
+                    <p:sp>
+                      <p:nvSpPr>
+                        <p:cNvPr id="21" name="Abgerundetes Rechteck 20"/>
+                        <p:cNvSpPr/>
                         <p:nvPr/>
-                      </p:nvGrpSpPr>
-                      <p:grpSpPr>
+                      </p:nvSpPr>
+                      <p:spPr>
                         <a:xfrm>
                           <a:off x="7537068" y="3458264"/>
                           <a:ext cx="2001794" cy="1252151"/>
-                          <a:chOff x="7537068" y="3458264"/>
-                          <a:chExt cx="2001794" cy="1252151"/>
                         </a:xfrm>
-                      </p:grpSpPr>
-                      <p:sp>
-                        <p:nvSpPr>
-                          <p:cNvPr id="21" name="Abgerundetes Rechteck 20"/>
-                          <p:cNvSpPr/>
-                          <p:nvPr/>
-                        </p:nvSpPr>
-                        <p:spPr>
-                          <a:xfrm>
-                            <a:off x="7537068" y="3458264"/>
-                            <a:ext cx="2001794" cy="1252151"/>
-                          </a:xfrm>
-                          <a:prstGeom prst="roundRect">
-                            <a:avLst/>
-                          </a:prstGeom>
-                          <a:solidFill>
-                            <a:schemeClr val="bg1"/>
-                          </a:solidFill>
-                        </p:spPr>
-                        <p:style>
-                          <a:lnRef idx="2">
-                            <a:schemeClr val="accent1">
-                              <a:shade val="50000"/>
-                            </a:schemeClr>
-                          </a:lnRef>
-                          <a:fillRef idx="1">
-                            <a:schemeClr val="accent1"/>
-                          </a:fillRef>
-                          <a:effectRef idx="0">
-                            <a:schemeClr val="accent1"/>
-                          </a:effectRef>
-                          <a:fontRef idx="minor">
-                            <a:schemeClr val="lt1"/>
-                          </a:fontRef>
-                        </p:style>
-                        <p:txBody>
-                          <a:bodyPr rtlCol="0" anchor="ctr"/>
-                          <a:lstStyle/>
-                          <a:p>
-                            <a:r>
-                              <a:rPr lang="de-DE" dirty="0" smtClean="0"/>
-                              <a:t>FA-Rechnung</a:t>
-                            </a:r>
-                            <a:endParaRPr lang="de-DE" sz="1100" dirty="0">
-                              <a:solidFill>
-                                <a:schemeClr val="tx1"/>
-                              </a:solidFill>
-                            </a:endParaRPr>
-                          </a:p>
-                        </p:txBody>
-                      </p:sp>
-                      <p:sp>
-                        <p:nvSpPr>
-                          <p:cNvPr id="27" name="Textfeld 26"/>
-                          <p:cNvSpPr txBox="1"/>
-                          <p:nvPr/>
-                        </p:nvSpPr>
-                        <p:spPr>
-                          <a:xfrm>
-                            <a:off x="7722598" y="3712719"/>
-                            <a:ext cx="1615361" cy="538609"/>
-                          </a:xfrm>
-                          <a:prstGeom prst="rect">
-                            <a:avLst/>
-                          </a:prstGeom>
-                          <a:noFill/>
-                        </p:spPr>
-                        <p:txBody>
-                          <a:bodyPr wrap="square" rtlCol="0">
-                            <a:spAutoFit/>
-                          </a:bodyPr>
-                          <a:lstStyle/>
-                          <a:p>
-                            <a:r>
-                              <a:rPr lang="de-DE" sz="1100" dirty="0" smtClean="0"/>
-                              <a:t>FA-Rechnung </a:t>
-                            </a:r>
-                            <a:r>
-                              <a:rPr lang="de-DE" sz="1100" dirty="0" err="1" smtClean="0"/>
-                              <a:t>Nr</a:t>
-                            </a:r>
-                            <a:r>
-                              <a:rPr lang="de-DE" dirty="0" smtClean="0"/>
-                              <a:t> </a:t>
-                            </a:r>
-                          </a:p>
-                          <a:p>
-                            <a:r>
-                              <a:rPr lang="de-DE" sz="1100" dirty="0" smtClean="0"/>
-                              <a:t>Jänner</a:t>
-                            </a:r>
-                            <a:endParaRPr lang="de-DE" sz="1100" dirty="0"/>
-                          </a:p>
-                        </p:txBody>
-                      </p:sp>
-                    </p:grpSp>
+                        <a:prstGeom prst="roundRect">
+                          <a:avLst/>
+                        </a:prstGeom>
+                        <a:grpFill/>
+                      </p:spPr>
+                      <p:style>
+                        <a:lnRef idx="2">
+                          <a:schemeClr val="accent1">
+                            <a:shade val="50000"/>
+                          </a:schemeClr>
+                        </a:lnRef>
+                        <a:fillRef idx="1">
+                          <a:schemeClr val="accent1"/>
+                        </a:fillRef>
+                        <a:effectRef idx="0">
+                          <a:schemeClr val="accent1"/>
+                        </a:effectRef>
+                        <a:fontRef idx="minor">
+                          <a:schemeClr val="lt1"/>
+                        </a:fontRef>
+                      </p:style>
+                      <p:txBody>
+                        <a:bodyPr rtlCol="0" anchor="ctr"/>
+                        <a:lstStyle/>
+                        <a:p>
+                          <a:endParaRPr lang="de-DE" sz="1100" dirty="0">
+                            <a:solidFill>
+                              <a:schemeClr val="tx1"/>
+                            </a:solidFill>
+                          </a:endParaRPr>
+                        </a:p>
+                      </p:txBody>
+                    </p:sp>
                     <p:sp>
                       <p:nvSpPr>
                         <p:cNvPr id="28" name="Textfeld 27"/>
@@ -4607,7 +4622,7 @@
                         <a:prstGeom prst="rect">
                           <a:avLst/>
                         </a:prstGeom>
-                        <a:noFill/>
+                        <a:grpFill/>
                       </p:spPr>
                       <p:txBody>
                         <a:bodyPr wrap="square" rtlCol="0">
@@ -4615,21 +4630,52 @@
                         </a:bodyPr>
                         <a:lstStyle/>
                         <a:p>
+                          <a:pPr algn="ctr"/>
                           <a:r>
-                            <a:rPr lang="de-DE" sz="1100" dirty="0"/>
-                            <a:t>FA-Rechnung</a:t>
+                            <a:rPr lang="de-DE" sz="1100" dirty="0" smtClean="0">
+                              <a:solidFill>
+                                <a:schemeClr val="bg1"/>
+                              </a:solidFill>
+                            </a:rPr>
+                            <a:t>FA-Rechnung </a:t>
                           </a:r>
                           <a:r>
-                            <a:rPr lang="de-DE" dirty="0" smtClean="0"/>
+                            <a:rPr lang="de-DE" sz="1100" dirty="0" err="1" smtClean="0">
+                              <a:solidFill>
+                                <a:schemeClr val="bg1"/>
+                              </a:solidFill>
+                            </a:rPr>
+                            <a:t>Nr</a:t>
+                          </a:r>
+                          <a:r>
+                            <a:rPr lang="de-DE" dirty="0" smtClean="0">
+                              <a:solidFill>
+                                <a:schemeClr val="bg1"/>
+                              </a:solidFill>
+                            </a:rPr>
                             <a:t> </a:t>
                           </a:r>
+                          <a:endParaRPr lang="de-DE" dirty="0" smtClean="0">
+                            <a:solidFill>
+                              <a:schemeClr val="bg1"/>
+                            </a:solidFill>
+                          </a:endParaRPr>
                         </a:p>
                         <a:p>
+                          <a:pPr algn="ctr"/>
                           <a:r>
-                            <a:rPr lang="de-DE" sz="1100" dirty="0" smtClean="0"/>
+                            <a:rPr lang="de-DE" sz="1100" dirty="0" smtClean="0">
+                              <a:solidFill>
+                                <a:schemeClr val="bg1"/>
+                              </a:solidFill>
+                            </a:rPr>
                             <a:t>Februar</a:t>
                           </a:r>
-                          <a:endParaRPr lang="de-DE" sz="1100" dirty="0"/>
+                          <a:endParaRPr lang="de-DE" sz="1100" dirty="0">
+                            <a:solidFill>
+                              <a:schemeClr val="bg1"/>
+                            </a:solidFill>
+                          </a:endParaRPr>
                         </a:p>
                       </p:txBody>
                     </p:sp>
@@ -4651,6 +4697,7 @@
                 <a:prstGeom prst="rect">
                   <a:avLst/>
                 </a:prstGeom>
+                <a:grpFill/>
               </p:spPr>
               <p:style>
                 <a:lnRef idx="2">
@@ -4691,7 +4738,7 @@
                 <a:prstGeom prst="rect">
                   <a:avLst/>
                 </a:prstGeom>
-                <a:noFill/>
+                <a:grpFill/>
               </p:spPr>
               <p:txBody>
                 <a:bodyPr wrap="square" rtlCol="0">
@@ -4699,11 +4746,20 @@
                 </a:bodyPr>
                 <a:lstStyle/>
                 <a:p>
+                  <a:pPr algn="ctr"/>
                   <a:r>
-                    <a:rPr lang="de-DE" dirty="0" smtClean="0"/>
+                    <a:rPr lang="de-DE" dirty="0" smtClean="0">
+                      <a:solidFill>
+                        <a:schemeClr val="bg1"/>
+                      </a:solidFill>
+                    </a:rPr>
                     <a:t>Mitarbeiter</a:t>
                   </a:r>
-                  <a:endParaRPr lang="de-DE" dirty="0"/>
+                  <a:endParaRPr lang="de-DE" dirty="0">
+                    <a:solidFill>
+                      <a:schemeClr val="bg1"/>
+                    </a:solidFill>
+                  </a:endParaRPr>
                 </a:p>
               </p:txBody>
             </p:sp>
@@ -4722,7 +4778,7 @@
               <a:prstGeom prst="rect">
                 <a:avLst/>
               </a:prstGeom>
-              <a:noFill/>
+              <a:grpFill/>
             </p:spPr>
             <p:txBody>
               <a:bodyPr wrap="square" rtlCol="0">
@@ -4731,10 +4787,18 @@
               <a:lstStyle/>
               <a:p>
                 <a:r>
-                  <a:rPr lang="de-DE" dirty="0" smtClean="0"/>
+                  <a:rPr lang="de-DE" dirty="0" smtClean="0">
+                    <a:solidFill>
+                      <a:schemeClr val="bg1"/>
+                    </a:solidFill>
+                  </a:rPr>
                   <a:t>Buchungen</a:t>
                 </a:r>
-                <a:endParaRPr lang="de-DE" dirty="0"/>
+                <a:endParaRPr lang="de-DE" dirty="0">
+                  <a:solidFill>
+                    <a:schemeClr val="bg1"/>
+                  </a:solidFill>
+                </a:endParaRPr>
               </a:p>
             </p:txBody>
           </p:sp>
@@ -4753,7 +4817,7 @@
             <a:prstGeom prst="rect">
               <a:avLst/>
             </a:prstGeom>
-            <a:noFill/>
+            <a:grpFill/>
           </p:spPr>
           <p:txBody>
             <a:bodyPr wrap="square" rtlCol="0">
@@ -4761,15 +4825,146 @@
             </a:bodyPr>
             <a:lstStyle/>
             <a:p>
+              <a:pPr algn="ctr"/>
               <a:r>
-                <a:rPr lang="de-DE" dirty="0" smtClean="0"/>
+                <a:rPr lang="de-DE" dirty="0" smtClean="0">
+                  <a:solidFill>
+                    <a:schemeClr val="bg1"/>
+                  </a:solidFill>
+                </a:rPr>
                 <a:t>Rechnungen</a:t>
               </a:r>
-              <a:endParaRPr lang="de-DE" dirty="0"/>
+              <a:endParaRPr lang="de-DE" dirty="0">
+                <a:solidFill>
+                  <a:schemeClr val="bg1"/>
+                </a:solidFill>
+              </a:endParaRPr>
             </a:p>
           </p:txBody>
         </p:sp>
       </p:grpSp>
+      <p:sp>
+        <p:nvSpPr>
+          <p:cNvPr id="48" name="Textfeld 47"/>
+          <p:cNvSpPr txBox="1"/>
+          <p:nvPr/>
+        </p:nvSpPr>
+        <p:spPr>
+          <a:xfrm>
+            <a:off x="5025024" y="3663089"/>
+            <a:ext cx="1678784" cy="769441"/>
+          </a:xfrm>
+          <a:prstGeom prst="rect">
+            <a:avLst/>
+          </a:prstGeom>
+          <a:noFill/>
+        </p:spPr>
+        <p:txBody>
+          <a:bodyPr wrap="square" rtlCol="0">
+            <a:spAutoFit/>
+          </a:bodyPr>
+          <a:lstStyle/>
+          <a:p>
+            <a:pPr algn="ctr"/>
+            <a:r>
+              <a:rPr lang="de-DE" sz="1100" dirty="0" smtClean="0">
+                <a:solidFill>
+                  <a:schemeClr val="bg1"/>
+                </a:solidFill>
+              </a:rPr>
+              <a:t>Raumnummer</a:t>
+            </a:r>
+          </a:p>
+          <a:p>
+            <a:pPr algn="ctr"/>
+            <a:r>
+              <a:rPr lang="de-DE" sz="1100" dirty="0" err="1" smtClean="0">
+                <a:solidFill>
+                  <a:schemeClr val="bg1"/>
+                </a:solidFill>
+              </a:rPr>
+              <a:t>Raumart</a:t>
+            </a:r>
+            <a:endParaRPr lang="de-DE" sz="1100" dirty="0" smtClean="0">
+              <a:solidFill>
+                <a:schemeClr val="bg1"/>
+              </a:solidFill>
+            </a:endParaRPr>
+          </a:p>
+          <a:p>
+            <a:pPr algn="ctr"/>
+            <a:r>
+              <a:rPr lang="de-DE" sz="1100" dirty="0" smtClean="0">
+                <a:solidFill>
+                  <a:schemeClr val="bg1"/>
+                </a:solidFill>
+              </a:rPr>
+              <a:t>Von - Bis</a:t>
+            </a:r>
+          </a:p>
+          <a:p>
+            <a:endParaRPr lang="de-DE" sz="1100" dirty="0"/>
+          </a:p>
+        </p:txBody>
+      </p:sp>
+      <p:sp>
+        <p:nvSpPr>
+          <p:cNvPr id="50" name="Textfeld 49"/>
+          <p:cNvSpPr txBox="1"/>
+          <p:nvPr/>
+        </p:nvSpPr>
+        <p:spPr>
+          <a:xfrm>
+            <a:off x="7762399" y="3630192"/>
+            <a:ext cx="1535763" cy="538609"/>
+          </a:xfrm>
+          <a:prstGeom prst="rect">
+            <a:avLst/>
+          </a:prstGeom>
+          <a:noFill/>
+        </p:spPr>
+        <p:txBody>
+          <a:bodyPr wrap="square" rtlCol="0">
+            <a:spAutoFit/>
+          </a:bodyPr>
+          <a:lstStyle/>
+          <a:p>
+            <a:pPr algn="ctr"/>
+            <a:r>
+              <a:rPr lang="de-DE" sz="1100" dirty="0" smtClean="0">
+                <a:solidFill>
+                  <a:schemeClr val="bg1"/>
+                </a:solidFill>
+              </a:rPr>
+              <a:t>FA-Rechnung </a:t>
+            </a:r>
+            <a:r>
+              <a:rPr lang="de-DE" sz="1100" dirty="0" err="1">
+                <a:solidFill>
+                  <a:schemeClr val="bg1"/>
+                </a:solidFill>
+              </a:rPr>
+              <a:t>Nr</a:t>
+            </a:r>
+            <a:r>
+              <a:rPr lang="de-DE" dirty="0" smtClean="0">
+                <a:solidFill>
+                  <a:schemeClr val="bg1"/>
+                </a:solidFill>
+              </a:rPr>
+              <a:t> </a:t>
+            </a:r>
+            <a:r>
+              <a:rPr lang="de-DE" sz="1100" dirty="0">
+                <a:solidFill>
+                  <a:schemeClr val="bg1"/>
+                </a:solidFill>
+              </a:rPr>
+              <a:t>Dezember</a:t>
+            </a:r>
+          </a:p>
+        </p:txBody>
+      </p:sp>
     </p:spTree>
     <p:extLst>
       <p:ext uri="{BB962C8B-B14F-4D97-AF65-F5344CB8AC3E}">
@@ -5302,7 +5497,7 @@
         </p:blipFill>
         <p:spPr>
           <a:xfrm>
-            <a:off x="899393" y="150636"/>
+            <a:off x="899393" y="167494"/>
             <a:ext cx="10058400" cy="6707364"/>
           </a:xfrm>
           <a:prstGeom prst="rect">
@@ -5509,11 +5704,12 @@
         </p:nvGrpSpPr>
         <p:grpSpPr>
           <a:xfrm>
-            <a:off x="1983085" y="1862458"/>
+            <a:off x="2107349" y="1862458"/>
             <a:ext cx="1235676" cy="369332"/>
             <a:chOff x="1991146" y="2116343"/>
             <a:chExt cx="1235676" cy="369332"/>
           </a:xfrm>
+          <a:noFill/>
         </p:grpSpPr>
         <p:sp>
           <p:nvSpPr>
@@ -5529,9 +5725,7 @@
             <a:prstGeom prst="roundRect">
               <a:avLst/>
             </a:prstGeom>
-            <a:solidFill>
-              <a:schemeClr val="bg1"/>
-            </a:solidFill>
+            <a:grpFill/>
           </p:spPr>
           <p:style>
             <a:lnRef idx="2">
@@ -5572,7 +5766,7 @@
             <a:prstGeom prst="rect">
               <a:avLst/>
             </a:prstGeom>
-            <a:noFill/>
+            <a:grpFill/>
           </p:spPr>
           <p:txBody>
             <a:bodyPr wrap="square" rtlCol="0">
@@ -5581,10 +5775,18 @@
             <a:lstStyle/>
             <a:p>
               <a:r>
-                <a:rPr lang="de-DE" dirty="0" err="1" smtClean="0"/>
+                <a:rPr lang="de-DE" dirty="0" err="1">
+                  <a:solidFill>
+                    <a:schemeClr val="bg1"/>
+                  </a:solidFill>
+                </a:rPr>
                 <a:t>Raumart</a:t>
               </a:r>
-              <a:endParaRPr lang="de-DE" dirty="0"/>
+              <a:endParaRPr lang="de-DE" dirty="0">
+                <a:solidFill>
+                  <a:schemeClr val="bg1"/>
+                </a:solidFill>
+              </a:endParaRPr>
             </a:p>
           </p:txBody>
         </p:sp>
@@ -5602,6 +5804,7 @@
             <a:prstGeom prst="flowChartMerge">
               <a:avLst/>
             </a:prstGeom>
+            <a:grpFill/>
           </p:spPr>
           <p:style>
             <a:lnRef idx="2">
@@ -5637,10 +5840,10 @@
         </p:nvGrpSpPr>
         <p:grpSpPr>
           <a:xfrm>
-            <a:off x="4798725" y="1862458"/>
-            <a:ext cx="1235676" cy="345989"/>
+            <a:off x="4898694" y="1862458"/>
+            <a:ext cx="1235676" cy="619060"/>
             <a:chOff x="3846693" y="2134531"/>
-            <a:chExt cx="1235676" cy="345989"/>
+            <a:chExt cx="1235676" cy="619060"/>
           </a:xfrm>
         </p:grpSpPr>
         <p:sp>
@@ -5657,9 +5860,7 @@
             <a:prstGeom prst="roundRect">
               <a:avLst/>
             </a:prstGeom>
-            <a:solidFill>
-              <a:schemeClr val="bg1"/>
-            </a:solidFill>
+            <a:noFill/>
           </p:spPr>
           <p:style>
             <a:lnRef idx="2">
@@ -5695,7 +5896,7 @@
           <p:spPr>
             <a:xfrm>
               <a:off x="3952500" y="2138038"/>
-              <a:ext cx="1024061" cy="338554"/>
+              <a:ext cx="1024061" cy="615553"/>
             </a:xfrm>
             <a:prstGeom prst="rect">
               <a:avLst/>
@@ -5709,8 +5910,16 @@
             <a:lstStyle/>
             <a:p>
               <a:r>
+                <a:rPr lang="de-DE" dirty="0">
+                  <a:solidFill>
+                    <a:schemeClr val="bg1"/>
+                  </a:solidFill>
+                </a:rPr>
+                <a:t>Preis</a:t>
+              </a:r>
+              <a:r>
                 <a:rPr lang="de-DE" sz="1600" dirty="0" smtClean="0"/>
-                <a:t>Preis  von</a:t>
+                <a:t>  von</a:t>
               </a:r>
               <a:endParaRPr lang="de-DE" sz="1600" dirty="0"/>
             </a:p>
@@ -5725,11 +5934,12 @@
         </p:nvGrpSpPr>
         <p:grpSpPr>
           <a:xfrm>
-            <a:off x="3352109" y="1852261"/>
-            <a:ext cx="1369981" cy="361270"/>
+            <a:off x="3435869" y="1852261"/>
+            <a:ext cx="1369981" cy="646331"/>
             <a:chOff x="6078376" y="2099342"/>
-            <a:chExt cx="1369981" cy="361270"/>
-          </a:xfrm>
+            <a:chExt cx="1369981" cy="646331"/>
+          </a:xfrm>
+          <a:noFill/>
         </p:grpSpPr>
         <p:sp>
           <p:nvSpPr>
@@ -5745,9 +5955,7 @@
             <a:prstGeom prst="roundRect">
               <a:avLst/>
             </a:prstGeom>
-            <a:solidFill>
-              <a:schemeClr val="bg1"/>
-            </a:solidFill>
+            <a:grpFill/>
           </p:spPr>
           <p:style>
             <a:lnRef idx="2">
@@ -5788,6 +5996,7 @@
             <a:prstGeom prst="flowChartMerge">
               <a:avLst/>
             </a:prstGeom>
+            <a:grpFill/>
           </p:spPr>
           <p:style>
             <a:lnRef idx="2">
@@ -5823,12 +6032,12 @@
           <p:spPr>
             <a:xfrm>
               <a:off x="6078376" y="2099342"/>
-              <a:ext cx="1121050" cy="338554"/>
+              <a:ext cx="1121050" cy="646331"/>
             </a:xfrm>
             <a:prstGeom prst="rect">
               <a:avLst/>
             </a:prstGeom>
-            <a:noFill/>
+            <a:grpFill/>
           </p:spPr>
           <p:txBody>
             <a:bodyPr wrap="square" rtlCol="0">
@@ -5837,10 +6046,18 @@
             <a:lstStyle/>
             <a:p>
               <a:r>
-                <a:rPr lang="de-DE" sz="1600" dirty="0" err="1" smtClean="0"/>
+                <a:rPr lang="de-DE" dirty="0" err="1">
+                  <a:solidFill>
+                    <a:schemeClr val="bg1"/>
+                  </a:solidFill>
+                </a:rPr>
                 <a:t>Austattung</a:t>
               </a:r>
-              <a:endParaRPr lang="de-DE" sz="1600" dirty="0"/>
+              <a:endParaRPr lang="de-DE" dirty="0">
+                <a:solidFill>
+                  <a:schemeClr val="bg1"/>
+                </a:solidFill>
+              </a:endParaRPr>
             </a:p>
           </p:txBody>
         </p:sp>
@@ -5853,11 +6070,12 @@
         </p:nvGrpSpPr>
         <p:grpSpPr>
           <a:xfrm>
-            <a:off x="7516690" y="1825420"/>
+            <a:off x="7555734" y="1825420"/>
             <a:ext cx="1235676" cy="388111"/>
             <a:chOff x="7068442" y="2080739"/>
             <a:chExt cx="1235676" cy="388111"/>
           </a:xfrm>
+          <a:noFill/>
         </p:grpSpPr>
         <p:sp>
           <p:nvSpPr>
@@ -5873,9 +6091,7 @@
             <a:prstGeom prst="roundRect">
               <a:avLst/>
             </a:prstGeom>
-            <a:solidFill>
-              <a:schemeClr val="bg1"/>
-            </a:solidFill>
+            <a:grpFill/>
           </p:spPr>
           <p:style>
             <a:lnRef idx="2">
@@ -5916,7 +6132,7 @@
             <a:prstGeom prst="rect">
               <a:avLst/>
             </a:prstGeom>
-            <a:noFill/>
+            <a:grpFill/>
           </p:spPr>
           <p:txBody>
             <a:bodyPr wrap="square" rtlCol="0">
@@ -5926,10 +6142,13 @@
             <a:p>
               <a:pPr algn="ctr"/>
               <a:r>
-                <a:rPr lang="de-DE" dirty="0" smtClean="0"/>
+                <a:rPr lang="de-DE" dirty="0">
+                  <a:solidFill>
+                    <a:schemeClr val="bg1"/>
+                  </a:solidFill>
+                </a:rPr>
                 <a:t>von</a:t>
               </a:r>
-              <a:endParaRPr lang="de-DE" dirty="0"/>
             </a:p>
           </p:txBody>
         </p:sp>
@@ -5962,9 +6181,7 @@
             <a:prstGeom prst="roundRect">
               <a:avLst/>
             </a:prstGeom>
-            <a:solidFill>
-              <a:schemeClr val="bg1"/>
-            </a:solidFill>
+            <a:noFill/>
           </p:spPr>
           <p:style>
             <a:lnRef idx="2">
@@ -6015,10 +6232,13 @@
             <a:p>
               <a:pPr algn="ctr"/>
               <a:r>
-                <a:rPr lang="de-DE" dirty="0" smtClean="0"/>
+                <a:rPr lang="de-DE" dirty="0">
+                  <a:solidFill>
+                    <a:schemeClr val="bg1"/>
+                  </a:solidFill>
+                </a:rPr>
                 <a:t>bis</a:t>
               </a:r>
-              <a:endParaRPr lang="de-DE" dirty="0"/>
             </a:p>
           </p:txBody>
         </p:sp>
@@ -6031,11 +6251,12 @@
         </p:nvGrpSpPr>
         <p:grpSpPr>
           <a:xfrm>
-            <a:off x="6149127" y="1825420"/>
+            <a:off x="6227214" y="1825420"/>
             <a:ext cx="1235676" cy="383027"/>
             <a:chOff x="4804592" y="2084205"/>
             <a:chExt cx="1235676" cy="383027"/>
           </a:xfrm>
+          <a:noFill/>
         </p:grpSpPr>
         <p:sp>
           <p:nvSpPr>
@@ -6051,9 +6272,7 @@
             <a:prstGeom prst="roundRect">
               <a:avLst/>
             </a:prstGeom>
-            <a:solidFill>
-              <a:schemeClr val="bg1"/>
-            </a:solidFill>
+            <a:grpFill/>
           </p:spPr>
           <p:style>
             <a:lnRef idx="2">
@@ -6094,7 +6313,7 @@
             <a:prstGeom prst="rect">
               <a:avLst/>
             </a:prstGeom>
-            <a:noFill/>
+            <a:grpFill/>
           </p:spPr>
           <p:txBody>
             <a:bodyPr wrap="square" rtlCol="0">
@@ -6103,7 +6322,11 @@
             <a:lstStyle/>
             <a:p>
               <a:r>
-                <a:rPr lang="de-DE" sz="1600" dirty="0"/>
+                <a:rPr lang="de-DE" dirty="0">
+                  <a:solidFill>
+                    <a:schemeClr val="bg1"/>
+                  </a:solidFill>
+                </a:rPr>
                 <a:t>Preis</a:t>
               </a:r>
               <a:r>
@@ -6111,7 +6334,11 @@
                 <a:t> </a:t>
               </a:r>
               <a:r>
-                <a:rPr lang="de-DE" sz="1600" dirty="0"/>
+                <a:rPr lang="de-DE" dirty="0">
+                  <a:solidFill>
+                    <a:schemeClr val="bg1"/>
+                  </a:solidFill>
+                </a:rPr>
                 <a:t>bis</a:t>
               </a:r>
             </a:p>
@@ -6131,9 +6358,7 @@
             <a:chOff x="2020826" y="2580141"/>
             <a:chExt cx="8152044" cy="1408670"/>
           </a:xfrm>
-          <a:solidFill>
-            <a:schemeClr val="bg1"/>
-          </a:solidFill>
+          <a:noFill/>
         </p:grpSpPr>
         <p:sp>
           <p:nvSpPr>
@@ -6199,7 +6424,11 @@
             <a:lstStyle/>
             <a:p>
               <a:r>
-                <a:rPr lang="de-DE" dirty="0"/>
+                <a:rPr lang="de-DE" dirty="0">
+                  <a:solidFill>
+                    <a:schemeClr val="bg1"/>
+                  </a:solidFill>
+                </a:rPr>
                 <a:t>Heller Raum mit Blick auf Donau</a:t>
               </a:r>
             </a:p>
@@ -6231,10 +6460,18 @@
             <a:lstStyle/>
             <a:p>
               <a:r>
-                <a:rPr lang="de-DE" dirty="0" err="1" smtClean="0"/>
+                <a:rPr lang="de-DE" dirty="0" err="1" smtClean="0">
+                  <a:solidFill>
+                    <a:schemeClr val="bg1"/>
+                  </a:solidFill>
+                </a:rPr>
                 <a:t>Meetingraum</a:t>
               </a:r>
-              <a:endParaRPr lang="de-DE" dirty="0"/>
+              <a:endParaRPr lang="de-DE" dirty="0">
+                <a:solidFill>
+                  <a:schemeClr val="bg1"/>
+                </a:solidFill>
+              </a:endParaRPr>
             </a:p>
           </p:txBody>
         </p:sp>
@@ -6261,14 +6498,26 @@
             <a:lstStyle/>
             <a:p>
               <a:r>
-                <a:rPr lang="de-DE" dirty="0" err="1" smtClean="0"/>
+                <a:rPr lang="de-DE" dirty="0" err="1" smtClean="0">
+                  <a:solidFill>
+                    <a:schemeClr val="bg1"/>
+                  </a:solidFill>
+                </a:rPr>
                 <a:t>RaumAusstattung</a:t>
               </a:r>
               <a:r>
-                <a:rPr lang="de-DE" dirty="0" smtClean="0"/>
+                <a:rPr lang="de-DE" dirty="0" smtClean="0">
+                  <a:solidFill>
+                    <a:schemeClr val="bg1"/>
+                  </a:solidFill>
+                </a:rPr>
                 <a:t> </a:t>
               </a:r>
-              <a:endParaRPr lang="de-DE" dirty="0"/>
+              <a:endParaRPr lang="de-DE" dirty="0">
+                <a:solidFill>
+                  <a:schemeClr val="bg1"/>
+                </a:solidFill>
+              </a:endParaRPr>
             </a:p>
           </p:txBody>
         </p:sp>
@@ -6326,10 +6575,13 @@
             <a:lstStyle/>
             <a:p>
               <a:r>
-                <a:rPr lang="de-DE" dirty="0" smtClean="0"/>
+                <a:rPr lang="de-DE" dirty="0">
+                  <a:solidFill>
+                    <a:schemeClr val="bg1"/>
+                  </a:solidFill>
+                </a:rPr>
                 <a:t>Preis</a:t>
               </a:r>
-              <a:endParaRPr lang="de-DE" dirty="0"/>
             </a:p>
           </p:txBody>
         </p:sp>
@@ -6447,14 +6699,26 @@
           <a:lstStyle/>
           <a:p>
             <a:r>
-              <a:rPr lang="de-DE" dirty="0" err="1" smtClean="0"/>
+              <a:rPr lang="de-DE" dirty="0" err="1">
+                <a:solidFill>
+                  <a:schemeClr val="bg1"/>
+                </a:solidFill>
+              </a:rPr>
               <a:t>Raumart</a:t>
             </a:r>
             <a:r>
-              <a:rPr lang="de-DE" dirty="0" smtClean="0"/>
+              <a:rPr lang="de-DE" dirty="0">
+                <a:solidFill>
+                  <a:schemeClr val="bg1"/>
+                </a:solidFill>
+              </a:rPr>
               <a:t>:</a:t>
             </a:r>
-            <a:endParaRPr lang="de-DE" dirty="0"/>
+            <a:endParaRPr lang="de-DE" dirty="0">
+              <a:solidFill>
+                <a:schemeClr val="bg1"/>
+              </a:solidFill>
+            </a:endParaRPr>
           </a:p>
         </p:txBody>
       </p:sp>
@@ -6471,6 +6735,7 @@
             <a:chOff x="2092180" y="2358855"/>
             <a:chExt cx="8073310" cy="1372497"/>
           </a:xfrm>
+          <a:noFill/>
         </p:grpSpPr>
         <p:grpSp>
           <p:nvGrpSpPr>
@@ -6485,6 +6750,7 @@
               <a:chOff x="2092180" y="2358855"/>
               <a:chExt cx="8073310" cy="1372497"/>
             </a:xfrm>
+            <a:grpFill/>
           </p:grpSpPr>
           <p:grpSp>
             <p:nvGrpSpPr>
@@ -6499,9 +6765,7 @@
                 <a:chOff x="2099925" y="2492034"/>
                 <a:chExt cx="8121374" cy="1408670"/>
               </a:xfrm>
-              <a:solidFill>
-                <a:schemeClr val="bg1"/>
-              </a:solidFill>
+              <a:grpFill/>
             </p:grpSpPr>
             <p:sp>
               <p:nvSpPr>
@@ -6553,7 +6817,7 @@
               <p:spPr>
                 <a:xfrm>
                   <a:off x="2380969" y="2741427"/>
-                  <a:ext cx="2067698" cy="646331"/>
+                  <a:ext cx="2067698" cy="663365"/>
                 </a:xfrm>
                 <a:prstGeom prst="rect">
                   <a:avLst/>
@@ -6567,10 +6831,18 @@
                 <a:lstStyle/>
                 <a:p>
                   <a:r>
-                    <a:rPr lang="de-DE" dirty="0" smtClean="0"/>
+                    <a:rPr lang="de-DE" dirty="0" smtClean="0">
+                      <a:solidFill>
+                        <a:schemeClr val="bg1"/>
+                      </a:solidFill>
+                    </a:rPr>
                     <a:t>Heller Raum mit Blick auf Donau</a:t>
                   </a:r>
-                  <a:endParaRPr lang="de-DE" dirty="0"/>
+                  <a:endParaRPr lang="de-DE" dirty="0">
+                    <a:solidFill>
+                      <a:schemeClr val="bg1"/>
+                    </a:solidFill>
+                  </a:endParaRPr>
                 </a:p>
               </p:txBody>
             </p:sp>
@@ -6583,7 +6855,7 @@
               <p:spPr>
                 <a:xfrm>
                   <a:off x="4605309" y="3125517"/>
-                  <a:ext cx="1045577" cy="369332"/>
+                  <a:ext cx="1045577" cy="379066"/>
                 </a:xfrm>
                 <a:prstGeom prst="rect">
                   <a:avLst/>
@@ -6597,10 +6869,18 @@
                 <a:lstStyle/>
                 <a:p>
                   <a:r>
-                    <a:rPr lang="de-DE" dirty="0" smtClean="0"/>
+                    <a:rPr lang="de-DE" dirty="0" smtClean="0">
+                      <a:solidFill>
+                        <a:schemeClr val="bg1"/>
+                      </a:solidFill>
+                    </a:rPr>
                     <a:t>Office</a:t>
                   </a:r>
-                  <a:endParaRPr lang="de-DE" dirty="0"/>
+                  <a:endParaRPr lang="de-DE" dirty="0">
+                    <a:solidFill>
+                      <a:schemeClr val="bg1"/>
+                    </a:solidFill>
+                  </a:endParaRPr>
                 </a:p>
               </p:txBody>
             </p:sp>
@@ -6613,7 +6893,7 @@
               <p:spPr>
                 <a:xfrm>
                   <a:off x="6449481" y="2698133"/>
-                  <a:ext cx="1980783" cy="369332"/>
+                  <a:ext cx="1980783" cy="379066"/>
                 </a:xfrm>
                 <a:prstGeom prst="rect">
                   <a:avLst/>
@@ -6627,14 +6907,26 @@
                 <a:lstStyle/>
                 <a:p>
                   <a:r>
-                    <a:rPr lang="de-DE" dirty="0" err="1" smtClean="0"/>
+                    <a:rPr lang="de-DE" dirty="0" err="1" smtClean="0">
+                      <a:solidFill>
+                        <a:schemeClr val="bg1"/>
+                      </a:solidFill>
+                    </a:rPr>
                     <a:t>RaumAusstattung</a:t>
                   </a:r>
                   <a:r>
-                    <a:rPr lang="de-DE" dirty="0" smtClean="0"/>
+                    <a:rPr lang="de-DE" dirty="0" smtClean="0">
+                      <a:solidFill>
+                        <a:schemeClr val="bg1"/>
+                      </a:solidFill>
+                    </a:rPr>
                     <a:t> </a:t>
                   </a:r>
-                  <a:endParaRPr lang="de-DE" dirty="0"/>
+                  <a:endParaRPr lang="de-DE" dirty="0">
+                    <a:solidFill>
+                      <a:schemeClr val="bg1"/>
+                    </a:solidFill>
+                  </a:endParaRPr>
                 </a:p>
               </p:txBody>
             </p:sp>
@@ -6709,7 +7001,7 @@
               <p:spPr>
                 <a:xfrm>
                   <a:off x="9087517" y="2698258"/>
-                  <a:ext cx="1085353" cy="369332"/>
+                  <a:ext cx="1085353" cy="379066"/>
                 </a:xfrm>
                 <a:prstGeom prst="rect">
                   <a:avLst/>
@@ -6723,10 +7015,18 @@
                 <a:lstStyle/>
                 <a:p>
                   <a:r>
-                    <a:rPr lang="de-DE" dirty="0" smtClean="0"/>
+                    <a:rPr lang="de-DE" dirty="0" smtClean="0">
+                      <a:solidFill>
+                        <a:schemeClr val="bg1"/>
+                      </a:solidFill>
+                    </a:rPr>
                     <a:t>Preis</a:t>
                   </a:r>
-                  <a:endParaRPr lang="de-DE" dirty="0"/>
+                  <a:endParaRPr lang="de-DE" dirty="0">
+                    <a:solidFill>
+                      <a:schemeClr val="bg1"/>
+                    </a:solidFill>
+                  </a:endParaRPr>
                 </a:p>
               </p:txBody>
             </p:sp>
@@ -6745,7 +7045,7 @@
               <a:prstGeom prst="rect">
                 <a:avLst/>
               </a:prstGeom>
-              <a:noFill/>
+              <a:grpFill/>
             </p:spPr>
             <p:txBody>
               <a:bodyPr wrap="square" rtlCol="0">
@@ -6754,7 +7054,11 @@
               <a:lstStyle/>
               <a:p>
                 <a:r>
-                  <a:rPr lang="de-DE" dirty="0" err="1" smtClean="0"/>
+                  <a:rPr lang="de-DE" dirty="0" err="1" smtClean="0">
+                    <a:solidFill>
+                      <a:schemeClr val="bg1"/>
+                    </a:solidFill>
+                  </a:rPr>
                   <a:t>Raumart</a:t>
                 </a:r>
                 <a:r>
@@ -6780,7 +7084,7 @@
             <a:prstGeom prst="rect">
               <a:avLst/>
             </a:prstGeom>
-            <a:noFill/>
+            <a:grpFill/>
           </p:spPr>
           <p:txBody>
             <a:bodyPr wrap="square" rtlCol="0">
@@ -6789,10 +7093,18 @@
             <a:lstStyle/>
             <a:p>
               <a:r>
-                <a:rPr lang="de-DE" dirty="0" smtClean="0"/>
+                <a:rPr lang="de-DE" dirty="0" smtClean="0">
+                  <a:solidFill>
+                    <a:schemeClr val="bg1"/>
+                  </a:solidFill>
+                </a:rPr>
                 <a:t>€ 12,-/Tag</a:t>
               </a:r>
-              <a:endParaRPr lang="de-DE" dirty="0"/>
+              <a:endParaRPr lang="de-DE" dirty="0">
+                <a:solidFill>
+                  <a:schemeClr val="bg1"/>
+                </a:solidFill>
+              </a:endParaRPr>
             </a:p>
           </p:txBody>
         </p:sp>
@@ -6820,8 +7132,32 @@
           <a:lstStyle/>
           <a:p>
             <a:r>
+              <a:rPr lang="de-DE" dirty="0">
+                <a:solidFill>
+                  <a:schemeClr val="bg1"/>
+                </a:solidFill>
+              </a:rPr>
+              <a:t>€</a:t>
+            </a:r>
+            <a:r>
               <a:rPr lang="de-DE" dirty="0" smtClean="0"/>
-              <a:t>€ 12,-/Tag</a:t>
+              <a:t> </a:t>
+            </a:r>
+            <a:r>
+              <a:rPr lang="de-DE" dirty="0">
+                <a:solidFill>
+                  <a:schemeClr val="bg1"/>
+                </a:solidFill>
+              </a:rPr>
+              <a:t>12</a:t>
+            </a:r>
+            <a:r>
+              <a:rPr lang="de-DE" dirty="0">
+                <a:solidFill>
+                  <a:schemeClr val="bg1"/>
+                </a:solidFill>
+              </a:rPr>
+              <a:t>,-/Tag</a:t>
             </a:r>
           </a:p>
           <a:p>
@@ -6842,9 +7178,7 @@
             <a:chOff x="2010862" y="2517785"/>
             <a:chExt cx="8162008" cy="1408670"/>
           </a:xfrm>
-          <a:solidFill>
-            <a:schemeClr val="bg1"/>
-          </a:solidFill>
+          <a:noFill/>
         </p:grpSpPr>
         <p:sp>
           <p:nvSpPr>
@@ -6910,10 +7244,61 @@
             <a:lstStyle/>
             <a:p>
               <a:r>
+                <a:rPr lang="de-DE" dirty="0">
+                  <a:solidFill>
+                    <a:schemeClr val="bg1"/>
+                  </a:solidFill>
+                </a:rPr>
+                <a:t>Ruhiger</a:t>
+              </a:r>
+              <a:r>
                 <a:rPr lang="de-DE" dirty="0" smtClean="0"/>
-                <a:t>Ruhiger Raum mit allen Anschlüssen</a:t>
+                <a:t> </a:t>
               </a:r>
-              <a:endParaRPr lang="de-DE" dirty="0"/>
+              <a:r>
+                <a:rPr lang="de-DE" dirty="0">
+                  <a:solidFill>
+                    <a:schemeClr val="bg1"/>
+                  </a:solidFill>
+                </a:rPr>
+                <a:t>Raum</a:t>
+              </a:r>
+              <a:r>
+                <a:rPr lang="de-DE" dirty="0" smtClean="0"/>
+                <a:t> </a:t>
+              </a:r>
+              <a:r>
+                <a:rPr lang="de-DE" dirty="0">
+                  <a:solidFill>
+                    <a:schemeClr val="bg1"/>
+                  </a:solidFill>
+                </a:rPr>
+                <a:t>mit</a:t>
+              </a:r>
+              <a:r>
+                <a:rPr lang="de-DE" dirty="0" smtClean="0"/>
+                <a:t> </a:t>
+              </a:r>
+              <a:r>
+                <a:rPr lang="de-DE" dirty="0">
+                  <a:solidFill>
+                    <a:schemeClr val="bg1"/>
+                  </a:solidFill>
+                </a:rPr>
+                <a:t>allen</a:t>
+              </a:r>
+              <a:r>
+                <a:rPr lang="de-DE" dirty="0" smtClean="0"/>
+                <a:t> </a:t>
+              </a:r>
+              <a:r>
+                <a:rPr lang="de-DE" dirty="0">
+                  <a:solidFill>
+                    <a:schemeClr val="bg1"/>
+                  </a:solidFill>
+                </a:rPr>
+                <a:t>Anschlüssen</a:t>
+              </a:r>
             </a:p>
           </p:txBody>
         </p:sp>
@@ -6940,10 +7325,13 @@
             <a:lstStyle/>
             <a:p>
               <a:r>
-                <a:rPr lang="de-DE" dirty="0" smtClean="0"/>
+                <a:rPr lang="de-DE" dirty="0">
+                  <a:solidFill>
+                    <a:schemeClr val="bg1"/>
+                  </a:solidFill>
+                </a:rPr>
                 <a:t>Office</a:t>
               </a:r>
-              <a:endParaRPr lang="de-DE" dirty="0"/>
             </a:p>
           </p:txBody>
         </p:sp>
@@ -6970,14 +7358,18 @@
             <a:lstStyle/>
             <a:p>
               <a:r>
-                <a:rPr lang="de-DE" dirty="0" err="1" smtClean="0"/>
-                <a:t>RaumAusstattung</a:t>
+                <a:rPr lang="de-DE" dirty="0" smtClean="0">
+                  <a:solidFill>
+                    <a:schemeClr val="bg1"/>
+                  </a:solidFill>
+                </a:rPr>
+                <a:t>Raum Ausstattung </a:t>
               </a:r>
-              <a:r>
-                <a:rPr lang="de-DE" dirty="0" smtClean="0"/>
-                <a:t> </a:t>
-              </a:r>
-              <a:endParaRPr lang="de-DE" dirty="0"/>
+              <a:endParaRPr lang="de-DE" dirty="0">
+                <a:solidFill>
+                  <a:schemeClr val="bg1"/>
+                </a:solidFill>
+              </a:endParaRPr>
             </a:p>
           </p:txBody>
         </p:sp>
@@ -7035,10 +7427,13 @@
             <a:lstStyle/>
             <a:p>
               <a:r>
-                <a:rPr lang="de-DE" dirty="0" smtClean="0"/>
+                <a:rPr lang="de-DE" dirty="0">
+                  <a:solidFill>
+                    <a:schemeClr val="bg1"/>
+                  </a:solidFill>
+                </a:rPr>
                 <a:t>Preis</a:t>
               </a:r>
-              <a:endParaRPr lang="de-DE" dirty="0"/>
             </a:p>
           </p:txBody>
         </p:sp>
@@ -7126,14 +7521,21 @@
           <a:lstStyle/>
           <a:p>
             <a:r>
-              <a:rPr lang="de-DE" dirty="0" err="1" smtClean="0"/>
+              <a:rPr lang="de-DE" dirty="0" err="1">
+                <a:solidFill>
+                  <a:schemeClr val="bg1"/>
+                </a:solidFill>
+              </a:rPr>
               <a:t>Raumart</a:t>
             </a:r>
             <a:r>
-              <a:rPr lang="de-DE" dirty="0" smtClean="0"/>
+              <a:rPr lang="de-DE" dirty="0">
+                <a:solidFill>
+                  <a:schemeClr val="bg1"/>
+                </a:solidFill>
+              </a:rPr>
               <a:t>:</a:t>
             </a:r>
-            <a:endParaRPr lang="de-DE" dirty="0"/>
           </a:p>
         </p:txBody>
       </p:sp>
@@ -7805,11 +8207,7 @@
               <a:pPr algn="ctr"/>
               <a:r>
                 <a:rPr lang="de-DE" dirty="0" smtClean="0"/>
-                <a:t>Jetzt </a:t>
-              </a:r>
-              <a:r>
-                <a:rPr lang="de-DE" dirty="0" smtClean="0"/>
-                <a:t>Buchen</a:t>
+                <a:t>Jetzt Buchen</a:t>
               </a:r>
               <a:endParaRPr lang="de-DE" dirty="0"/>
             </a:p>

</xml_diff>

<commit_message>
Mockup für alle Frimen erstellt
</commit_message>
<xml_diff>
--- a/Mockup.pptx
+++ b/Mockup.pptx
@@ -10,6 +10,8 @@
     <p:sldId id="258" r:id="rId4"/>
     <p:sldId id="259" r:id="rId5"/>
     <p:sldId id="260" r:id="rId6"/>
+    <p:sldId id="262" r:id="rId7"/>
+    <p:sldId id="261" r:id="rId8"/>
   </p:sldIdLst>
   <p:sldSz cx="12192000" cy="6858000"/>
   <p:notesSz cx="6858000" cy="9144000"/>
@@ -247,7 +249,7 @@
           <a:p>
             <a:fld id="{BF127077-7699-459F-B21B-8CE1187F5A25}" type="datetimeFigureOut">
               <a:rPr lang="de-DE" smtClean="0"/>
-              <a:t>08.02.2017</a:t>
+              <a:t>16.02.2017</a:t>
             </a:fld>
             <a:endParaRPr lang="de-DE"/>
           </a:p>
@@ -417,7 +419,7 @@
           <a:p>
             <a:fld id="{BF127077-7699-459F-B21B-8CE1187F5A25}" type="datetimeFigureOut">
               <a:rPr lang="de-DE" smtClean="0"/>
-              <a:t>08.02.2017</a:t>
+              <a:t>16.02.2017</a:t>
             </a:fld>
             <a:endParaRPr lang="de-DE"/>
           </a:p>
@@ -597,7 +599,7 @@
           <a:p>
             <a:fld id="{BF127077-7699-459F-B21B-8CE1187F5A25}" type="datetimeFigureOut">
               <a:rPr lang="de-DE" smtClean="0"/>
-              <a:t>08.02.2017</a:t>
+              <a:t>16.02.2017</a:t>
             </a:fld>
             <a:endParaRPr lang="de-DE"/>
           </a:p>
@@ -767,7 +769,7 @@
           <a:p>
             <a:fld id="{BF127077-7699-459F-B21B-8CE1187F5A25}" type="datetimeFigureOut">
               <a:rPr lang="de-DE" smtClean="0"/>
-              <a:t>08.02.2017</a:t>
+              <a:t>16.02.2017</a:t>
             </a:fld>
             <a:endParaRPr lang="de-DE"/>
           </a:p>
@@ -1013,7 +1015,7 @@
           <a:p>
             <a:fld id="{BF127077-7699-459F-B21B-8CE1187F5A25}" type="datetimeFigureOut">
               <a:rPr lang="de-DE" smtClean="0"/>
-              <a:t>08.02.2017</a:t>
+              <a:t>16.02.2017</a:t>
             </a:fld>
             <a:endParaRPr lang="de-DE"/>
           </a:p>
@@ -1245,7 +1247,7 @@
           <a:p>
             <a:fld id="{BF127077-7699-459F-B21B-8CE1187F5A25}" type="datetimeFigureOut">
               <a:rPr lang="de-DE" smtClean="0"/>
-              <a:t>08.02.2017</a:t>
+              <a:t>16.02.2017</a:t>
             </a:fld>
             <a:endParaRPr lang="de-DE"/>
           </a:p>
@@ -1612,7 +1614,7 @@
           <a:p>
             <a:fld id="{BF127077-7699-459F-B21B-8CE1187F5A25}" type="datetimeFigureOut">
               <a:rPr lang="de-DE" smtClean="0"/>
-              <a:t>08.02.2017</a:t>
+              <a:t>16.02.2017</a:t>
             </a:fld>
             <a:endParaRPr lang="de-DE"/>
           </a:p>
@@ -1730,7 +1732,7 @@
           <a:p>
             <a:fld id="{BF127077-7699-459F-B21B-8CE1187F5A25}" type="datetimeFigureOut">
               <a:rPr lang="de-DE" smtClean="0"/>
-              <a:t>08.02.2017</a:t>
+              <a:t>16.02.2017</a:t>
             </a:fld>
             <a:endParaRPr lang="de-DE"/>
           </a:p>
@@ -1825,7 +1827,7 @@
           <a:p>
             <a:fld id="{BF127077-7699-459F-B21B-8CE1187F5A25}" type="datetimeFigureOut">
               <a:rPr lang="de-DE" smtClean="0"/>
-              <a:t>08.02.2017</a:t>
+              <a:t>16.02.2017</a:t>
             </a:fld>
             <a:endParaRPr lang="de-DE"/>
           </a:p>
@@ -2102,7 +2104,7 @@
           <a:p>
             <a:fld id="{BF127077-7699-459F-B21B-8CE1187F5A25}" type="datetimeFigureOut">
               <a:rPr lang="de-DE" smtClean="0"/>
-              <a:t>08.02.2017</a:t>
+              <a:t>16.02.2017</a:t>
             </a:fld>
             <a:endParaRPr lang="de-DE"/>
           </a:p>
@@ -2355,7 +2357,7 @@
           <a:p>
             <a:fld id="{BF127077-7699-459F-B21B-8CE1187F5A25}" type="datetimeFigureOut">
               <a:rPr lang="de-DE" smtClean="0"/>
-              <a:t>08.02.2017</a:t>
+              <a:t>16.02.2017</a:t>
             </a:fld>
             <a:endParaRPr lang="de-DE"/>
           </a:p>
@@ -2568,7 +2570,7 @@
           <a:p>
             <a:fld id="{BF127077-7699-459F-B21B-8CE1187F5A25}" type="datetimeFigureOut">
               <a:rPr lang="de-DE" smtClean="0"/>
-              <a:t>08.02.2017</a:t>
+              <a:t>16.02.2017</a:t>
             </a:fld>
             <a:endParaRPr lang="de-DE"/>
           </a:p>
@@ -8232,6 +8234,1071 @@
 </p:sld>
 </file>
 
+<file path=ppt/slides/slide6.xml><?xml version="1.0" encoding="utf-8"?>
+<p:sld xmlns:a="http://schemas.openxmlformats.org/drawingml/2006/main" xmlns:r="http://schemas.openxmlformats.org/officeDocument/2006/relationships" xmlns:p="http://schemas.openxmlformats.org/presentationml/2006/main">
+  <p:cSld>
+    <p:spTree>
+      <p:nvGrpSpPr>
+        <p:cNvPr id="1" name=""/>
+        <p:cNvGrpSpPr/>
+        <p:nvPr/>
+      </p:nvGrpSpPr>
+      <p:grpSpPr>
+        <a:xfrm>
+          <a:off x="0" y="0"/>
+          <a:ext cx="0" cy="0"/>
+          <a:chOff x="0" y="0"/>
+          <a:chExt cx="0" cy="0"/>
+        </a:xfrm>
+      </p:grpSpPr>
+      <p:pic>
+        <p:nvPicPr>
+          <p:cNvPr id="2" name="Grafik 1"/>
+          <p:cNvPicPr>
+            <a:picLocks noChangeAspect="1"/>
+          </p:cNvPicPr>
+          <p:nvPr/>
+        </p:nvPicPr>
+        <p:blipFill>
+          <a:blip r:embed="rId2">
+            <a:extLst>
+              <a:ext uri="{28A0092B-C50C-407E-A947-70E740481C1C}">
+                <a14:useLocalDpi xmlns:a14="http://schemas.microsoft.com/office/drawing/2010/main" val="0"/>
+              </a:ext>
+            </a:extLst>
+          </a:blip>
+          <a:stretch>
+            <a:fillRect/>
+          </a:stretch>
+        </p:blipFill>
+        <p:spPr>
+          <a:xfrm>
+            <a:off x="1019755" y="-7951"/>
+            <a:ext cx="10058400" cy="6707364"/>
+          </a:xfrm>
+          <a:prstGeom prst="rect">
+            <a:avLst/>
+          </a:prstGeom>
+        </p:spPr>
+      </p:pic>
+      <p:sp>
+        <p:nvSpPr>
+          <p:cNvPr id="3" name="Textfeld 2"/>
+          <p:cNvSpPr txBox="1"/>
+          <p:nvPr/>
+        </p:nvSpPr>
+        <p:spPr>
+          <a:xfrm>
+            <a:off x="4854469" y="960491"/>
+            <a:ext cx="2257167" cy="369332"/>
+          </a:xfrm>
+          <a:prstGeom prst="rect">
+            <a:avLst/>
+          </a:prstGeom>
+          <a:noFill/>
+        </p:spPr>
+        <p:txBody>
+          <a:bodyPr wrap="square" rtlCol="0">
+            <a:spAutoFit/>
+          </a:bodyPr>
+          <a:lstStyle/>
+          <a:p>
+            <a:r>
+              <a:rPr lang="de-DE" dirty="0" smtClean="0">
+                <a:solidFill>
+                  <a:schemeClr val="bg1"/>
+                </a:solidFill>
+              </a:rPr>
+              <a:t>Innovation  4 Austria</a:t>
+            </a:r>
+            <a:endParaRPr lang="de-DE" dirty="0">
+              <a:solidFill>
+                <a:schemeClr val="bg1"/>
+              </a:solidFill>
+            </a:endParaRPr>
+          </a:p>
+        </p:txBody>
+      </p:sp>
+      <p:sp>
+        <p:nvSpPr>
+          <p:cNvPr id="5" name="Abgerundetes Rechteck 4"/>
+          <p:cNvSpPr/>
+          <p:nvPr/>
+        </p:nvSpPr>
+        <p:spPr>
+          <a:xfrm>
+            <a:off x="9411730" y="824567"/>
+            <a:ext cx="1058561" cy="271848"/>
+          </a:xfrm>
+          <a:prstGeom prst="roundRect">
+            <a:avLst/>
+          </a:prstGeom>
+          <a:solidFill>
+            <a:schemeClr val="bg1"/>
+          </a:solidFill>
+        </p:spPr>
+        <p:style>
+          <a:lnRef idx="2">
+            <a:schemeClr val="accent1">
+              <a:shade val="50000"/>
+            </a:schemeClr>
+          </a:lnRef>
+          <a:fillRef idx="1">
+            <a:schemeClr val="accent1"/>
+          </a:fillRef>
+          <a:effectRef idx="0">
+            <a:schemeClr val="accent1"/>
+          </a:effectRef>
+          <a:fontRef idx="minor">
+            <a:schemeClr val="lt1"/>
+          </a:fontRef>
+        </p:style>
+        <p:txBody>
+          <a:bodyPr rtlCol="0" anchor="ctr"/>
+          <a:lstStyle/>
+          <a:p>
+            <a:pPr algn="ctr"/>
+            <a:r>
+              <a:rPr lang="de-DE" dirty="0" smtClean="0">
+                <a:solidFill>
+                  <a:schemeClr val="tx1"/>
+                </a:solidFill>
+              </a:rPr>
+              <a:t>Profil</a:t>
+            </a:r>
+            <a:endParaRPr lang="de-DE" dirty="0">
+              <a:solidFill>
+                <a:schemeClr val="tx1"/>
+              </a:solidFill>
+            </a:endParaRPr>
+          </a:p>
+        </p:txBody>
+      </p:sp>
+      <p:sp>
+        <p:nvSpPr>
+          <p:cNvPr id="6" name="Abgerundetes Rechteck 5"/>
+          <p:cNvSpPr/>
+          <p:nvPr/>
+        </p:nvSpPr>
+        <p:spPr>
+          <a:xfrm>
+            <a:off x="8600304" y="401858"/>
+            <a:ext cx="1869987" cy="271848"/>
+          </a:xfrm>
+          <a:prstGeom prst="roundRect">
+            <a:avLst/>
+          </a:prstGeom>
+          <a:solidFill>
+            <a:schemeClr val="bg1"/>
+          </a:solidFill>
+        </p:spPr>
+        <p:style>
+          <a:lnRef idx="2">
+            <a:schemeClr val="accent1">
+              <a:shade val="50000"/>
+            </a:schemeClr>
+          </a:lnRef>
+          <a:fillRef idx="1">
+            <a:schemeClr val="accent1"/>
+          </a:fillRef>
+          <a:effectRef idx="0">
+            <a:schemeClr val="accent1"/>
+          </a:effectRef>
+          <a:fontRef idx="minor">
+            <a:schemeClr val="lt1"/>
+          </a:fontRef>
+        </p:style>
+        <p:txBody>
+          <a:bodyPr rtlCol="0" anchor="ctr"/>
+          <a:lstStyle/>
+          <a:p>
+            <a:pPr algn="ctr"/>
+            <a:r>
+              <a:rPr lang="de-DE" dirty="0" smtClean="0">
+                <a:solidFill>
+                  <a:schemeClr val="tx1"/>
+                </a:solidFill>
+              </a:rPr>
+              <a:t>Übersicht</a:t>
+            </a:r>
+            <a:endParaRPr lang="de-DE" dirty="0">
+              <a:solidFill>
+                <a:schemeClr val="tx1"/>
+              </a:solidFill>
+            </a:endParaRPr>
+          </a:p>
+        </p:txBody>
+      </p:sp>
+      <p:grpSp>
+        <p:nvGrpSpPr>
+          <p:cNvPr id="12" name="Gruppieren 11"/>
+          <p:cNvGrpSpPr/>
+          <p:nvPr/>
+        </p:nvGrpSpPr>
+        <p:grpSpPr>
+          <a:xfrm>
+            <a:off x="2166436" y="1986589"/>
+            <a:ext cx="7966103" cy="1359284"/>
+            <a:chOff x="2166437" y="2298265"/>
+            <a:chExt cx="7966103" cy="1359284"/>
+          </a:xfrm>
+        </p:grpSpPr>
+        <p:grpSp>
+          <p:nvGrpSpPr>
+            <p:cNvPr id="7" name="Gruppieren 6"/>
+            <p:cNvGrpSpPr/>
+            <p:nvPr/>
+          </p:nvGrpSpPr>
+          <p:grpSpPr>
+            <a:xfrm>
+              <a:off x="2166437" y="2298265"/>
+              <a:ext cx="7966103" cy="1359284"/>
+              <a:chOff x="2051496" y="2543205"/>
+              <a:chExt cx="8121374" cy="1408670"/>
+            </a:xfrm>
+            <a:solidFill>
+              <a:schemeClr val="accent4">
+                <a:lumMod val="20000"/>
+                <a:lumOff val="80000"/>
+              </a:schemeClr>
+            </a:solidFill>
+          </p:grpSpPr>
+          <p:sp>
+            <p:nvSpPr>
+              <p:cNvPr id="8" name="Abgerundetes Rechteck 7"/>
+              <p:cNvSpPr/>
+              <p:nvPr/>
+            </p:nvSpPr>
+            <p:spPr>
+              <a:xfrm>
+                <a:off x="2051496" y="2543205"/>
+                <a:ext cx="8121374" cy="1408670"/>
+              </a:xfrm>
+              <a:prstGeom prst="roundRect">
+                <a:avLst/>
+              </a:prstGeom>
+              <a:grpFill/>
+            </p:spPr>
+            <p:style>
+              <a:lnRef idx="2">
+                <a:schemeClr val="accent1">
+                  <a:shade val="50000"/>
+                </a:schemeClr>
+              </a:lnRef>
+              <a:fillRef idx="1">
+                <a:schemeClr val="accent1"/>
+              </a:fillRef>
+              <a:effectRef idx="0">
+                <a:schemeClr val="accent1"/>
+              </a:effectRef>
+              <a:fontRef idx="minor">
+                <a:schemeClr val="lt1"/>
+              </a:fontRef>
+            </p:style>
+            <p:txBody>
+              <a:bodyPr rtlCol="0" anchor="ctr"/>
+              <a:lstStyle/>
+              <a:p>
+                <a:pPr algn="ctr"/>
+                <a:endParaRPr lang="de-DE"/>
+              </a:p>
+            </p:txBody>
+          </p:sp>
+          <p:sp>
+            <p:nvSpPr>
+              <p:cNvPr id="9" name="Textfeld 8"/>
+              <p:cNvSpPr txBox="1"/>
+              <p:nvPr/>
+            </p:nvSpPr>
+            <p:spPr>
+              <a:xfrm>
+                <a:off x="2357980" y="2841709"/>
+                <a:ext cx="2067698" cy="382751"/>
+              </a:xfrm>
+              <a:prstGeom prst="rect">
+                <a:avLst/>
+              </a:prstGeom>
+              <a:grpFill/>
+            </p:spPr>
+            <p:txBody>
+              <a:bodyPr wrap="square" rtlCol="0">
+                <a:spAutoFit/>
+              </a:bodyPr>
+              <a:lstStyle/>
+              <a:p>
+                <a:r>
+                  <a:rPr lang="de-DE" dirty="0" smtClean="0"/>
+                  <a:t>Firmenname</a:t>
+                </a:r>
+                <a:endParaRPr lang="de-DE" dirty="0"/>
+              </a:p>
+            </p:txBody>
+          </p:sp>
+        </p:grpSp>
+        <p:sp>
+          <p:nvSpPr>
+            <p:cNvPr id="22" name="Abgerundetes Rechteck 21"/>
+            <p:cNvSpPr/>
+            <p:nvPr/>
+          </p:nvSpPr>
+          <p:spPr>
+            <a:xfrm>
+              <a:off x="7663199" y="2570115"/>
+              <a:ext cx="2092411" cy="342949"/>
+            </a:xfrm>
+            <a:prstGeom prst="roundRect">
+              <a:avLst/>
+            </a:prstGeom>
+          </p:spPr>
+          <p:style>
+            <a:lnRef idx="2">
+              <a:schemeClr val="accent1">
+                <a:shade val="50000"/>
+              </a:schemeClr>
+            </a:lnRef>
+            <a:fillRef idx="1">
+              <a:schemeClr val="accent1"/>
+            </a:fillRef>
+            <a:effectRef idx="0">
+              <a:schemeClr val="accent1"/>
+            </a:effectRef>
+            <a:fontRef idx="minor">
+              <a:schemeClr val="lt1"/>
+            </a:fontRef>
+          </p:style>
+          <p:txBody>
+            <a:bodyPr rtlCol="0" anchor="ctr"/>
+            <a:lstStyle/>
+            <a:p>
+              <a:pPr algn="ctr"/>
+              <a:r>
+                <a:rPr lang="de-DE" sz="1200" dirty="0" smtClean="0"/>
+                <a:t>Buchungen</a:t>
+              </a:r>
+              <a:r>
+                <a:rPr lang="de-DE" dirty="0" smtClean="0"/>
+                <a:t> </a:t>
+              </a:r>
+              <a:r>
+                <a:rPr lang="de-DE" sz="1200" dirty="0" smtClean="0"/>
+                <a:t>einsehen</a:t>
+              </a:r>
+              <a:endParaRPr lang="de-DE" sz="1200" dirty="0"/>
+            </a:p>
+          </p:txBody>
+        </p:sp>
+        <p:sp>
+          <p:nvSpPr>
+            <p:cNvPr id="21" name="Abgerundetes Rechteck 20"/>
+            <p:cNvSpPr/>
+            <p:nvPr/>
+          </p:nvSpPr>
+          <p:spPr>
+            <a:xfrm>
+              <a:off x="7695215" y="2989770"/>
+              <a:ext cx="2092411" cy="342949"/>
+            </a:xfrm>
+            <a:prstGeom prst="roundRect">
+              <a:avLst/>
+            </a:prstGeom>
+          </p:spPr>
+          <p:style>
+            <a:lnRef idx="2">
+              <a:schemeClr val="accent1">
+                <a:shade val="50000"/>
+              </a:schemeClr>
+            </a:lnRef>
+            <a:fillRef idx="1">
+              <a:schemeClr val="accent1"/>
+            </a:fillRef>
+            <a:effectRef idx="0">
+              <a:schemeClr val="accent1"/>
+            </a:effectRef>
+            <a:fontRef idx="minor">
+              <a:schemeClr val="lt1"/>
+            </a:fontRef>
+          </p:style>
+          <p:txBody>
+            <a:bodyPr rtlCol="0" anchor="ctr"/>
+            <a:lstStyle/>
+            <a:p>
+              <a:pPr algn="ctr"/>
+              <a:r>
+                <a:rPr lang="de-DE" sz="1200" dirty="0" smtClean="0"/>
+                <a:t>Mitarbeiter einsehen</a:t>
+              </a:r>
+              <a:endParaRPr lang="de-DE" sz="1200" dirty="0"/>
+            </a:p>
+          </p:txBody>
+        </p:sp>
+        <p:sp>
+          <p:nvSpPr>
+            <p:cNvPr id="4" name="Textfeld 3"/>
+            <p:cNvSpPr txBox="1"/>
+            <p:nvPr/>
+          </p:nvSpPr>
+          <p:spPr>
+            <a:xfrm>
+              <a:off x="4503169" y="2550678"/>
+              <a:ext cx="3091571" cy="369332"/>
+            </a:xfrm>
+            <a:prstGeom prst="rect">
+              <a:avLst/>
+            </a:prstGeom>
+            <a:noFill/>
+          </p:spPr>
+          <p:txBody>
+            <a:bodyPr wrap="square" rtlCol="0">
+              <a:spAutoFit/>
+            </a:bodyPr>
+            <a:lstStyle/>
+            <a:p>
+              <a:r>
+                <a:rPr lang="de-DE" dirty="0" err="1" smtClean="0"/>
+                <a:t>Strasse</a:t>
+              </a:r>
+              <a:r>
+                <a:rPr lang="de-DE" dirty="0" smtClean="0"/>
+                <a:t>	Nummer</a:t>
+              </a:r>
+              <a:endParaRPr lang="de-DE" dirty="0"/>
+            </a:p>
+          </p:txBody>
+        </p:sp>
+        <p:sp>
+          <p:nvSpPr>
+            <p:cNvPr id="23" name="Textfeld 22"/>
+            <p:cNvSpPr txBox="1"/>
+            <p:nvPr/>
+          </p:nvSpPr>
+          <p:spPr>
+            <a:xfrm>
+              <a:off x="4503168" y="2994697"/>
+              <a:ext cx="3091571" cy="369332"/>
+            </a:xfrm>
+            <a:prstGeom prst="rect">
+              <a:avLst/>
+            </a:prstGeom>
+            <a:noFill/>
+          </p:spPr>
+          <p:txBody>
+            <a:bodyPr wrap="square" rtlCol="0">
+              <a:spAutoFit/>
+            </a:bodyPr>
+            <a:lstStyle/>
+            <a:p>
+              <a:r>
+                <a:rPr lang="de-DE" dirty="0" err="1" smtClean="0"/>
+                <a:t>Plz</a:t>
+              </a:r>
+              <a:r>
+                <a:rPr lang="de-DE" dirty="0" smtClean="0"/>
+                <a:t>	Ort</a:t>
+              </a:r>
+              <a:endParaRPr lang="de-DE" dirty="0"/>
+            </a:p>
+          </p:txBody>
+        </p:sp>
+      </p:grpSp>
+      <p:grpSp>
+        <p:nvGrpSpPr>
+          <p:cNvPr id="32" name="Gruppieren 31"/>
+          <p:cNvGrpSpPr/>
+          <p:nvPr/>
+        </p:nvGrpSpPr>
+        <p:grpSpPr>
+          <a:xfrm>
+            <a:off x="2166436" y="3636875"/>
+            <a:ext cx="7966103" cy="1359284"/>
+            <a:chOff x="2166437" y="2298265"/>
+            <a:chExt cx="7966103" cy="1359284"/>
+          </a:xfrm>
+        </p:grpSpPr>
+        <p:grpSp>
+          <p:nvGrpSpPr>
+            <p:cNvPr id="33" name="Gruppieren 32"/>
+            <p:cNvGrpSpPr/>
+            <p:nvPr/>
+          </p:nvGrpSpPr>
+          <p:grpSpPr>
+            <a:xfrm>
+              <a:off x="2166437" y="2298265"/>
+              <a:ext cx="7966103" cy="1359284"/>
+              <a:chOff x="2051496" y="2543205"/>
+              <a:chExt cx="8121374" cy="1408670"/>
+            </a:xfrm>
+            <a:solidFill>
+              <a:schemeClr val="accent4">
+                <a:lumMod val="20000"/>
+                <a:lumOff val="80000"/>
+              </a:schemeClr>
+            </a:solidFill>
+          </p:grpSpPr>
+          <p:sp>
+            <p:nvSpPr>
+              <p:cNvPr id="38" name="Abgerundetes Rechteck 37"/>
+              <p:cNvSpPr/>
+              <p:nvPr/>
+            </p:nvSpPr>
+            <p:spPr>
+              <a:xfrm>
+                <a:off x="2051496" y="2543205"/>
+                <a:ext cx="8121374" cy="1408670"/>
+              </a:xfrm>
+              <a:prstGeom prst="roundRect">
+                <a:avLst/>
+              </a:prstGeom>
+              <a:grpFill/>
+            </p:spPr>
+            <p:style>
+              <a:lnRef idx="2">
+                <a:schemeClr val="accent1">
+                  <a:shade val="50000"/>
+                </a:schemeClr>
+              </a:lnRef>
+              <a:fillRef idx="1">
+                <a:schemeClr val="accent1"/>
+              </a:fillRef>
+              <a:effectRef idx="0">
+                <a:schemeClr val="accent1"/>
+              </a:effectRef>
+              <a:fontRef idx="minor">
+                <a:schemeClr val="lt1"/>
+              </a:fontRef>
+            </p:style>
+            <p:txBody>
+              <a:bodyPr rtlCol="0" anchor="ctr"/>
+              <a:lstStyle/>
+              <a:p>
+                <a:pPr algn="ctr"/>
+                <a:endParaRPr lang="de-DE"/>
+              </a:p>
+            </p:txBody>
+          </p:sp>
+          <p:sp>
+            <p:nvSpPr>
+              <p:cNvPr id="39" name="Textfeld 38"/>
+              <p:cNvSpPr txBox="1"/>
+              <p:nvPr/>
+            </p:nvSpPr>
+            <p:spPr>
+              <a:xfrm>
+                <a:off x="2357980" y="2841709"/>
+                <a:ext cx="2067698" cy="382751"/>
+              </a:xfrm>
+              <a:prstGeom prst="rect">
+                <a:avLst/>
+              </a:prstGeom>
+              <a:grpFill/>
+            </p:spPr>
+            <p:txBody>
+              <a:bodyPr wrap="square" rtlCol="0">
+                <a:spAutoFit/>
+              </a:bodyPr>
+              <a:lstStyle/>
+              <a:p>
+                <a:r>
+                  <a:rPr lang="de-DE" dirty="0" smtClean="0"/>
+                  <a:t>Firmenname</a:t>
+                </a:r>
+                <a:endParaRPr lang="de-DE" dirty="0"/>
+              </a:p>
+            </p:txBody>
+          </p:sp>
+        </p:grpSp>
+        <p:sp>
+          <p:nvSpPr>
+            <p:cNvPr id="34" name="Abgerundetes Rechteck 33"/>
+            <p:cNvSpPr/>
+            <p:nvPr/>
+          </p:nvSpPr>
+          <p:spPr>
+            <a:xfrm>
+              <a:off x="7663199" y="2570115"/>
+              <a:ext cx="2092411" cy="342949"/>
+            </a:xfrm>
+            <a:prstGeom prst="roundRect">
+              <a:avLst/>
+            </a:prstGeom>
+          </p:spPr>
+          <p:style>
+            <a:lnRef idx="2">
+              <a:schemeClr val="accent1">
+                <a:shade val="50000"/>
+              </a:schemeClr>
+            </a:lnRef>
+            <a:fillRef idx="1">
+              <a:schemeClr val="accent1"/>
+            </a:fillRef>
+            <a:effectRef idx="0">
+              <a:schemeClr val="accent1"/>
+            </a:effectRef>
+            <a:fontRef idx="minor">
+              <a:schemeClr val="lt1"/>
+            </a:fontRef>
+          </p:style>
+          <p:txBody>
+            <a:bodyPr rtlCol="0" anchor="ctr"/>
+            <a:lstStyle/>
+            <a:p>
+              <a:pPr algn="ctr"/>
+              <a:r>
+                <a:rPr lang="de-DE" sz="1200" dirty="0" smtClean="0"/>
+                <a:t>Buchungen</a:t>
+              </a:r>
+              <a:r>
+                <a:rPr lang="de-DE" dirty="0" smtClean="0"/>
+                <a:t> </a:t>
+              </a:r>
+              <a:r>
+                <a:rPr lang="de-DE" sz="1200" dirty="0" smtClean="0"/>
+                <a:t>einsehen</a:t>
+              </a:r>
+              <a:endParaRPr lang="de-DE" sz="1200" dirty="0"/>
+            </a:p>
+          </p:txBody>
+        </p:sp>
+        <p:sp>
+          <p:nvSpPr>
+            <p:cNvPr id="35" name="Abgerundetes Rechteck 34"/>
+            <p:cNvSpPr/>
+            <p:nvPr/>
+          </p:nvSpPr>
+          <p:spPr>
+            <a:xfrm>
+              <a:off x="7695215" y="2989770"/>
+              <a:ext cx="2092411" cy="342949"/>
+            </a:xfrm>
+            <a:prstGeom prst="roundRect">
+              <a:avLst/>
+            </a:prstGeom>
+          </p:spPr>
+          <p:style>
+            <a:lnRef idx="2">
+              <a:schemeClr val="accent1">
+                <a:shade val="50000"/>
+              </a:schemeClr>
+            </a:lnRef>
+            <a:fillRef idx="1">
+              <a:schemeClr val="accent1"/>
+            </a:fillRef>
+            <a:effectRef idx="0">
+              <a:schemeClr val="accent1"/>
+            </a:effectRef>
+            <a:fontRef idx="minor">
+              <a:schemeClr val="lt1"/>
+            </a:fontRef>
+          </p:style>
+          <p:txBody>
+            <a:bodyPr rtlCol="0" anchor="ctr"/>
+            <a:lstStyle/>
+            <a:p>
+              <a:pPr algn="ctr"/>
+              <a:r>
+                <a:rPr lang="de-DE" sz="1200" dirty="0" smtClean="0"/>
+                <a:t>Mitarbeiter einsehen</a:t>
+              </a:r>
+              <a:endParaRPr lang="de-DE" sz="1200" dirty="0"/>
+            </a:p>
+          </p:txBody>
+        </p:sp>
+        <p:sp>
+          <p:nvSpPr>
+            <p:cNvPr id="36" name="Textfeld 35"/>
+            <p:cNvSpPr txBox="1"/>
+            <p:nvPr/>
+          </p:nvSpPr>
+          <p:spPr>
+            <a:xfrm>
+              <a:off x="4503169" y="2550678"/>
+              <a:ext cx="3091571" cy="369332"/>
+            </a:xfrm>
+            <a:prstGeom prst="rect">
+              <a:avLst/>
+            </a:prstGeom>
+            <a:noFill/>
+          </p:spPr>
+          <p:txBody>
+            <a:bodyPr wrap="square" rtlCol="0">
+              <a:spAutoFit/>
+            </a:bodyPr>
+            <a:lstStyle/>
+            <a:p>
+              <a:r>
+                <a:rPr lang="de-DE" dirty="0" err="1" smtClean="0"/>
+                <a:t>Strasse</a:t>
+              </a:r>
+              <a:r>
+                <a:rPr lang="de-DE" dirty="0" smtClean="0"/>
+                <a:t>	Nummer</a:t>
+              </a:r>
+              <a:endParaRPr lang="de-DE" dirty="0"/>
+            </a:p>
+          </p:txBody>
+        </p:sp>
+        <p:sp>
+          <p:nvSpPr>
+            <p:cNvPr id="37" name="Textfeld 36"/>
+            <p:cNvSpPr txBox="1"/>
+            <p:nvPr/>
+          </p:nvSpPr>
+          <p:spPr>
+            <a:xfrm>
+              <a:off x="4503168" y="2994697"/>
+              <a:ext cx="3091571" cy="369332"/>
+            </a:xfrm>
+            <a:prstGeom prst="rect">
+              <a:avLst/>
+            </a:prstGeom>
+            <a:noFill/>
+          </p:spPr>
+          <p:txBody>
+            <a:bodyPr wrap="square" rtlCol="0">
+              <a:spAutoFit/>
+            </a:bodyPr>
+            <a:lstStyle/>
+            <a:p>
+              <a:r>
+                <a:rPr lang="de-DE" dirty="0" err="1" smtClean="0"/>
+                <a:t>Plz</a:t>
+              </a:r>
+              <a:r>
+                <a:rPr lang="de-DE" dirty="0" smtClean="0"/>
+                <a:t>	Ort</a:t>
+              </a:r>
+              <a:endParaRPr lang="de-DE" dirty="0"/>
+            </a:p>
+          </p:txBody>
+        </p:sp>
+      </p:grpSp>
+      <p:grpSp>
+        <p:nvGrpSpPr>
+          <p:cNvPr id="40" name="Gruppieren 39"/>
+          <p:cNvGrpSpPr/>
+          <p:nvPr/>
+        </p:nvGrpSpPr>
+        <p:grpSpPr>
+          <a:xfrm>
+            <a:off x="2166436" y="5261412"/>
+            <a:ext cx="7966103" cy="1359284"/>
+            <a:chOff x="2166437" y="2298265"/>
+            <a:chExt cx="7966103" cy="1359284"/>
+          </a:xfrm>
+        </p:grpSpPr>
+        <p:grpSp>
+          <p:nvGrpSpPr>
+            <p:cNvPr id="41" name="Gruppieren 40"/>
+            <p:cNvGrpSpPr/>
+            <p:nvPr/>
+          </p:nvGrpSpPr>
+          <p:grpSpPr>
+            <a:xfrm>
+              <a:off x="2166437" y="2298265"/>
+              <a:ext cx="7966103" cy="1359284"/>
+              <a:chOff x="2051496" y="2543205"/>
+              <a:chExt cx="8121374" cy="1408670"/>
+            </a:xfrm>
+            <a:solidFill>
+              <a:schemeClr val="accent4">
+                <a:lumMod val="20000"/>
+                <a:lumOff val="80000"/>
+              </a:schemeClr>
+            </a:solidFill>
+          </p:grpSpPr>
+          <p:sp>
+            <p:nvSpPr>
+              <p:cNvPr id="46" name="Abgerundetes Rechteck 45"/>
+              <p:cNvSpPr/>
+              <p:nvPr/>
+            </p:nvSpPr>
+            <p:spPr>
+              <a:xfrm>
+                <a:off x="2051496" y="2543205"/>
+                <a:ext cx="8121374" cy="1408670"/>
+              </a:xfrm>
+              <a:prstGeom prst="roundRect">
+                <a:avLst/>
+              </a:prstGeom>
+              <a:grpFill/>
+            </p:spPr>
+            <p:style>
+              <a:lnRef idx="2">
+                <a:schemeClr val="accent1">
+                  <a:shade val="50000"/>
+                </a:schemeClr>
+              </a:lnRef>
+              <a:fillRef idx="1">
+                <a:schemeClr val="accent1"/>
+              </a:fillRef>
+              <a:effectRef idx="0">
+                <a:schemeClr val="accent1"/>
+              </a:effectRef>
+              <a:fontRef idx="minor">
+                <a:schemeClr val="lt1"/>
+              </a:fontRef>
+            </p:style>
+            <p:txBody>
+              <a:bodyPr rtlCol="0" anchor="ctr"/>
+              <a:lstStyle/>
+              <a:p>
+                <a:pPr algn="ctr"/>
+                <a:endParaRPr lang="de-DE"/>
+              </a:p>
+            </p:txBody>
+          </p:sp>
+          <p:sp>
+            <p:nvSpPr>
+              <p:cNvPr id="47" name="Textfeld 46"/>
+              <p:cNvSpPr txBox="1"/>
+              <p:nvPr/>
+            </p:nvSpPr>
+            <p:spPr>
+              <a:xfrm>
+                <a:off x="2357980" y="2841709"/>
+                <a:ext cx="2067698" cy="382751"/>
+              </a:xfrm>
+              <a:prstGeom prst="rect">
+                <a:avLst/>
+              </a:prstGeom>
+              <a:grpFill/>
+            </p:spPr>
+            <p:txBody>
+              <a:bodyPr wrap="square" rtlCol="0">
+                <a:spAutoFit/>
+              </a:bodyPr>
+              <a:lstStyle/>
+              <a:p>
+                <a:r>
+                  <a:rPr lang="de-DE" dirty="0" smtClean="0"/>
+                  <a:t>Firmenname</a:t>
+                </a:r>
+                <a:endParaRPr lang="de-DE" dirty="0"/>
+              </a:p>
+            </p:txBody>
+          </p:sp>
+        </p:grpSp>
+        <p:sp>
+          <p:nvSpPr>
+            <p:cNvPr id="42" name="Abgerundetes Rechteck 41"/>
+            <p:cNvSpPr/>
+            <p:nvPr/>
+          </p:nvSpPr>
+          <p:spPr>
+            <a:xfrm>
+              <a:off x="7663199" y="2570115"/>
+              <a:ext cx="2092411" cy="342949"/>
+            </a:xfrm>
+            <a:prstGeom prst="roundRect">
+              <a:avLst/>
+            </a:prstGeom>
+          </p:spPr>
+          <p:style>
+            <a:lnRef idx="2">
+              <a:schemeClr val="accent1">
+                <a:shade val="50000"/>
+              </a:schemeClr>
+            </a:lnRef>
+            <a:fillRef idx="1">
+              <a:schemeClr val="accent1"/>
+            </a:fillRef>
+            <a:effectRef idx="0">
+              <a:schemeClr val="accent1"/>
+            </a:effectRef>
+            <a:fontRef idx="minor">
+              <a:schemeClr val="lt1"/>
+            </a:fontRef>
+          </p:style>
+          <p:txBody>
+            <a:bodyPr rtlCol="0" anchor="ctr"/>
+            <a:lstStyle/>
+            <a:p>
+              <a:pPr algn="ctr"/>
+              <a:r>
+                <a:rPr lang="de-DE" sz="1200" dirty="0" smtClean="0"/>
+                <a:t>Buchungen</a:t>
+              </a:r>
+              <a:r>
+                <a:rPr lang="de-DE" dirty="0" smtClean="0"/>
+                <a:t> </a:t>
+              </a:r>
+              <a:r>
+                <a:rPr lang="de-DE" sz="1200" dirty="0" smtClean="0"/>
+                <a:t>einsehen</a:t>
+              </a:r>
+              <a:endParaRPr lang="de-DE" sz="1200" dirty="0"/>
+            </a:p>
+          </p:txBody>
+        </p:sp>
+        <p:sp>
+          <p:nvSpPr>
+            <p:cNvPr id="43" name="Abgerundetes Rechteck 42"/>
+            <p:cNvSpPr/>
+            <p:nvPr/>
+          </p:nvSpPr>
+          <p:spPr>
+            <a:xfrm>
+              <a:off x="7695215" y="2989770"/>
+              <a:ext cx="2092411" cy="342949"/>
+            </a:xfrm>
+            <a:prstGeom prst="roundRect">
+              <a:avLst/>
+            </a:prstGeom>
+          </p:spPr>
+          <p:style>
+            <a:lnRef idx="2">
+              <a:schemeClr val="accent1">
+                <a:shade val="50000"/>
+              </a:schemeClr>
+            </a:lnRef>
+            <a:fillRef idx="1">
+              <a:schemeClr val="accent1"/>
+            </a:fillRef>
+            <a:effectRef idx="0">
+              <a:schemeClr val="accent1"/>
+            </a:effectRef>
+            <a:fontRef idx="minor">
+              <a:schemeClr val="lt1"/>
+            </a:fontRef>
+          </p:style>
+          <p:txBody>
+            <a:bodyPr rtlCol="0" anchor="ctr"/>
+            <a:lstStyle/>
+            <a:p>
+              <a:pPr algn="ctr"/>
+              <a:r>
+                <a:rPr lang="de-DE" sz="1200" dirty="0" smtClean="0"/>
+                <a:t>Mitarbeiter einsehen</a:t>
+              </a:r>
+              <a:endParaRPr lang="de-DE" sz="1200" dirty="0"/>
+            </a:p>
+          </p:txBody>
+        </p:sp>
+        <p:sp>
+          <p:nvSpPr>
+            <p:cNvPr id="44" name="Textfeld 43"/>
+            <p:cNvSpPr txBox="1"/>
+            <p:nvPr/>
+          </p:nvSpPr>
+          <p:spPr>
+            <a:xfrm>
+              <a:off x="4503169" y="2550678"/>
+              <a:ext cx="3091571" cy="369332"/>
+            </a:xfrm>
+            <a:prstGeom prst="rect">
+              <a:avLst/>
+            </a:prstGeom>
+            <a:noFill/>
+          </p:spPr>
+          <p:txBody>
+            <a:bodyPr wrap="square" rtlCol="0">
+              <a:spAutoFit/>
+            </a:bodyPr>
+            <a:lstStyle/>
+            <a:p>
+              <a:r>
+                <a:rPr lang="de-DE" dirty="0" err="1" smtClean="0"/>
+                <a:t>Strasse</a:t>
+              </a:r>
+              <a:r>
+                <a:rPr lang="de-DE" dirty="0" smtClean="0"/>
+                <a:t>	Nummer</a:t>
+              </a:r>
+              <a:endParaRPr lang="de-DE" dirty="0"/>
+            </a:p>
+          </p:txBody>
+        </p:sp>
+        <p:sp>
+          <p:nvSpPr>
+            <p:cNvPr id="45" name="Textfeld 44"/>
+            <p:cNvSpPr txBox="1"/>
+            <p:nvPr/>
+          </p:nvSpPr>
+          <p:spPr>
+            <a:xfrm>
+              <a:off x="4503168" y="2994697"/>
+              <a:ext cx="3091571" cy="369332"/>
+            </a:xfrm>
+            <a:prstGeom prst="rect">
+              <a:avLst/>
+            </a:prstGeom>
+            <a:noFill/>
+          </p:spPr>
+          <p:txBody>
+            <a:bodyPr wrap="square" rtlCol="0">
+              <a:spAutoFit/>
+            </a:bodyPr>
+            <a:lstStyle/>
+            <a:p>
+              <a:r>
+                <a:rPr lang="de-DE" dirty="0" err="1" smtClean="0"/>
+                <a:t>Plz</a:t>
+              </a:r>
+              <a:r>
+                <a:rPr lang="de-DE" dirty="0" smtClean="0"/>
+                <a:t>	Ort</a:t>
+              </a:r>
+              <a:endParaRPr lang="de-DE" dirty="0"/>
+            </a:p>
+          </p:txBody>
+        </p:sp>
+      </p:grpSp>
+    </p:spTree>
+    <p:extLst>
+      <p:ext uri="{BB962C8B-B14F-4D97-AF65-F5344CB8AC3E}">
+        <p14:creationId xmlns:p14="http://schemas.microsoft.com/office/powerpoint/2010/main" val="2479007803"/>
+      </p:ext>
+    </p:extLst>
+  </p:cSld>
+  <p:clrMapOvr>
+    <a:masterClrMapping/>
+  </p:clrMapOvr>
+  <p:timing>
+    <p:tnLst>
+      <p:par>
+        <p:cTn id="1" dur="indefinite" restart="never" nodeType="tmRoot"/>
+      </p:par>
+    </p:tnLst>
+  </p:timing>
+</p:sld>
+</file>
+
+<file path=ppt/slides/slide7.xml><?xml version="1.0" encoding="utf-8"?>
+<p:sld xmlns:a="http://schemas.openxmlformats.org/drawingml/2006/main" xmlns:r="http://schemas.openxmlformats.org/officeDocument/2006/relationships" xmlns:p="http://schemas.openxmlformats.org/presentationml/2006/main">
+  <p:cSld>
+    <p:spTree>
+      <p:nvGrpSpPr>
+        <p:cNvPr id="1" name=""/>
+        <p:cNvGrpSpPr/>
+        <p:nvPr/>
+      </p:nvGrpSpPr>
+      <p:grpSpPr>
+        <a:xfrm>
+          <a:off x="0" y="0"/>
+          <a:ext cx="0" cy="0"/>
+          <a:chOff x="0" y="0"/>
+          <a:chExt cx="0" cy="0"/>
+        </a:xfrm>
+      </p:grpSpPr>
+    </p:spTree>
+    <p:extLst>
+      <p:ext uri="{BB962C8B-B14F-4D97-AF65-F5344CB8AC3E}">
+        <p14:creationId xmlns:p14="http://schemas.microsoft.com/office/powerpoint/2010/main" val="294083124"/>
+      </p:ext>
+    </p:extLst>
+  </p:cSld>
+  <p:clrMapOvr>
+    <a:masterClrMapping/>
+  </p:clrMapOvr>
+  <p:timing>
+    <p:tnLst>
+      <p:par>
+        <p:cTn id="1" dur="indefinite" restart="never" nodeType="tmRoot"/>
+      </p:par>
+    </p:tnLst>
+  </p:timing>
+</p:sld>
+</file>
+
 <file path=ppt/theme/theme1.xml><?xml version="1.0" encoding="utf-8"?>
 <a:theme xmlns:a="http://schemas.openxmlformats.org/drawingml/2006/main" name="Office Theme">
   <a:themeElements>

</xml_diff>

<commit_message>
MitarbeiterAnlegen funktioniert Validierungen noch nicht eigebaut Validierung Clientseitig ob Emailadresse schon vorhanden ist, ist auch noch nicht da
</commit_message>
<xml_diff>
--- a/Mockup.pptx
+++ b/Mockup.pptx
@@ -249,7 +249,7 @@
           <a:p>
             <a:fld id="{BF127077-7699-459F-B21B-8CE1187F5A25}" type="datetimeFigureOut">
               <a:rPr lang="de-DE" smtClean="0"/>
-              <a:t>17.02.2017</a:t>
+              <a:t>24.02.2017</a:t>
             </a:fld>
             <a:endParaRPr lang="de-DE"/>
           </a:p>
@@ -419,7 +419,7 @@
           <a:p>
             <a:fld id="{BF127077-7699-459F-B21B-8CE1187F5A25}" type="datetimeFigureOut">
               <a:rPr lang="de-DE" smtClean="0"/>
-              <a:t>17.02.2017</a:t>
+              <a:t>24.02.2017</a:t>
             </a:fld>
             <a:endParaRPr lang="de-DE"/>
           </a:p>
@@ -599,7 +599,7 @@
           <a:p>
             <a:fld id="{BF127077-7699-459F-B21B-8CE1187F5A25}" type="datetimeFigureOut">
               <a:rPr lang="de-DE" smtClean="0"/>
-              <a:t>17.02.2017</a:t>
+              <a:t>24.02.2017</a:t>
             </a:fld>
             <a:endParaRPr lang="de-DE"/>
           </a:p>
@@ -769,7 +769,7 @@
           <a:p>
             <a:fld id="{BF127077-7699-459F-B21B-8CE1187F5A25}" type="datetimeFigureOut">
               <a:rPr lang="de-DE" smtClean="0"/>
-              <a:t>17.02.2017</a:t>
+              <a:t>24.02.2017</a:t>
             </a:fld>
             <a:endParaRPr lang="de-DE"/>
           </a:p>
@@ -1015,7 +1015,7 @@
           <a:p>
             <a:fld id="{BF127077-7699-459F-B21B-8CE1187F5A25}" type="datetimeFigureOut">
               <a:rPr lang="de-DE" smtClean="0"/>
-              <a:t>17.02.2017</a:t>
+              <a:t>24.02.2017</a:t>
             </a:fld>
             <a:endParaRPr lang="de-DE"/>
           </a:p>
@@ -1247,7 +1247,7 @@
           <a:p>
             <a:fld id="{BF127077-7699-459F-B21B-8CE1187F5A25}" type="datetimeFigureOut">
               <a:rPr lang="de-DE" smtClean="0"/>
-              <a:t>17.02.2017</a:t>
+              <a:t>24.02.2017</a:t>
             </a:fld>
             <a:endParaRPr lang="de-DE"/>
           </a:p>
@@ -1614,7 +1614,7 @@
           <a:p>
             <a:fld id="{BF127077-7699-459F-B21B-8CE1187F5A25}" type="datetimeFigureOut">
               <a:rPr lang="de-DE" smtClean="0"/>
-              <a:t>17.02.2017</a:t>
+              <a:t>24.02.2017</a:t>
             </a:fld>
             <a:endParaRPr lang="de-DE"/>
           </a:p>
@@ -1732,7 +1732,7 @@
           <a:p>
             <a:fld id="{BF127077-7699-459F-B21B-8CE1187F5A25}" type="datetimeFigureOut">
               <a:rPr lang="de-DE" smtClean="0"/>
-              <a:t>17.02.2017</a:t>
+              <a:t>24.02.2017</a:t>
             </a:fld>
             <a:endParaRPr lang="de-DE"/>
           </a:p>
@@ -1827,7 +1827,7 @@
           <a:p>
             <a:fld id="{BF127077-7699-459F-B21B-8CE1187F5A25}" type="datetimeFigureOut">
               <a:rPr lang="de-DE" smtClean="0"/>
-              <a:t>17.02.2017</a:t>
+              <a:t>24.02.2017</a:t>
             </a:fld>
             <a:endParaRPr lang="de-DE"/>
           </a:p>
@@ -2104,7 +2104,7 @@
           <a:p>
             <a:fld id="{BF127077-7699-459F-B21B-8CE1187F5A25}" type="datetimeFigureOut">
               <a:rPr lang="de-DE" smtClean="0"/>
-              <a:t>17.02.2017</a:t>
+              <a:t>24.02.2017</a:t>
             </a:fld>
             <a:endParaRPr lang="de-DE"/>
           </a:p>
@@ -2357,7 +2357,7 @@
           <a:p>
             <a:fld id="{BF127077-7699-459F-B21B-8CE1187F5A25}" type="datetimeFigureOut">
               <a:rPr lang="de-DE" smtClean="0"/>
-              <a:t>17.02.2017</a:t>
+              <a:t>24.02.2017</a:t>
             </a:fld>
             <a:endParaRPr lang="de-DE"/>
           </a:p>
@@ -2570,7 +2570,7 @@
           <a:p>
             <a:fld id="{BF127077-7699-459F-B21B-8CE1187F5A25}" type="datetimeFigureOut">
               <a:rPr lang="de-DE" smtClean="0"/>
-              <a:t>17.02.2017</a:t>
+              <a:t>24.02.2017</a:t>
             </a:fld>
             <a:endParaRPr lang="de-DE"/>
           </a:p>
@@ -5944,10 +5944,10 @@
         </p:nvGrpSpPr>
         <p:grpSpPr>
           <a:xfrm>
-            <a:off x="3435869" y="1852261"/>
-            <a:ext cx="1369981" cy="646331"/>
-            <a:chOff x="6078376" y="2099342"/>
-            <a:chExt cx="1369981" cy="646331"/>
+            <a:off x="3435868" y="1852261"/>
+            <a:ext cx="1369982" cy="369332"/>
+            <a:chOff x="6078375" y="2099342"/>
+            <a:chExt cx="1369982" cy="369332"/>
           </a:xfrm>
           <a:noFill/>
         </p:grpSpPr>
@@ -6041,8 +6041,8 @@
           </p:nvSpPr>
           <p:spPr>
             <a:xfrm>
-              <a:off x="6078376" y="2099342"/>
-              <a:ext cx="1121050" cy="646331"/>
+              <a:off x="6078375" y="2099342"/>
+              <a:ext cx="1264173" cy="369332"/>
             </a:xfrm>
             <a:prstGeom prst="rect">
               <a:avLst/>
@@ -9059,7 +9059,7 @@
           </p:nvSpPr>
           <p:spPr>
             <a:xfrm>
-              <a:off x="4132465" y="3059009"/>
+              <a:off x="4503169" y="3030928"/>
               <a:ext cx="3091571" cy="369332"/>
             </a:xfrm>
             <a:prstGeom prst="rect">

</xml_diff>

<commit_message>
filterModel und View integriert RaumArtModel/ RaumAusstattungsModell und RaumModel angelegt
</commit_message>
<xml_diff>
--- a/Mockup.pptx
+++ b/Mockup.pptx
@@ -11,7 +11,7 @@
     <p:sldId id="259" r:id="rId5"/>
     <p:sldId id="260" r:id="rId6"/>
     <p:sldId id="262" r:id="rId7"/>
-    <p:sldId id="261" r:id="rId8"/>
+    <p:sldId id="263" r:id="rId8"/>
   </p:sldIdLst>
   <p:sldSz cx="12192000" cy="6858000"/>
   <p:notesSz cx="6858000" cy="9144000"/>
@@ -249,7 +249,7 @@
           <a:p>
             <a:fld id="{BF127077-7699-459F-B21B-8CE1187F5A25}" type="datetimeFigureOut">
               <a:rPr lang="de-DE" smtClean="0"/>
-              <a:t>24.02.2017</a:t>
+              <a:t>28.02.2017</a:t>
             </a:fld>
             <a:endParaRPr lang="de-DE"/>
           </a:p>
@@ -419,7 +419,7 @@
           <a:p>
             <a:fld id="{BF127077-7699-459F-B21B-8CE1187F5A25}" type="datetimeFigureOut">
               <a:rPr lang="de-DE" smtClean="0"/>
-              <a:t>24.02.2017</a:t>
+              <a:t>28.02.2017</a:t>
             </a:fld>
             <a:endParaRPr lang="de-DE"/>
           </a:p>
@@ -599,7 +599,7 @@
           <a:p>
             <a:fld id="{BF127077-7699-459F-B21B-8CE1187F5A25}" type="datetimeFigureOut">
               <a:rPr lang="de-DE" smtClean="0"/>
-              <a:t>24.02.2017</a:t>
+              <a:t>28.02.2017</a:t>
             </a:fld>
             <a:endParaRPr lang="de-DE"/>
           </a:p>
@@ -769,7 +769,7 @@
           <a:p>
             <a:fld id="{BF127077-7699-459F-B21B-8CE1187F5A25}" type="datetimeFigureOut">
               <a:rPr lang="de-DE" smtClean="0"/>
-              <a:t>24.02.2017</a:t>
+              <a:t>28.02.2017</a:t>
             </a:fld>
             <a:endParaRPr lang="de-DE"/>
           </a:p>
@@ -1015,7 +1015,7 @@
           <a:p>
             <a:fld id="{BF127077-7699-459F-B21B-8CE1187F5A25}" type="datetimeFigureOut">
               <a:rPr lang="de-DE" smtClean="0"/>
-              <a:t>24.02.2017</a:t>
+              <a:t>28.02.2017</a:t>
             </a:fld>
             <a:endParaRPr lang="de-DE"/>
           </a:p>
@@ -1247,7 +1247,7 @@
           <a:p>
             <a:fld id="{BF127077-7699-459F-B21B-8CE1187F5A25}" type="datetimeFigureOut">
               <a:rPr lang="de-DE" smtClean="0"/>
-              <a:t>24.02.2017</a:t>
+              <a:t>28.02.2017</a:t>
             </a:fld>
             <a:endParaRPr lang="de-DE"/>
           </a:p>
@@ -1614,7 +1614,7 @@
           <a:p>
             <a:fld id="{BF127077-7699-459F-B21B-8CE1187F5A25}" type="datetimeFigureOut">
               <a:rPr lang="de-DE" smtClean="0"/>
-              <a:t>24.02.2017</a:t>
+              <a:t>28.02.2017</a:t>
             </a:fld>
             <a:endParaRPr lang="de-DE"/>
           </a:p>
@@ -1732,7 +1732,7 @@
           <a:p>
             <a:fld id="{BF127077-7699-459F-B21B-8CE1187F5A25}" type="datetimeFigureOut">
               <a:rPr lang="de-DE" smtClean="0"/>
-              <a:t>24.02.2017</a:t>
+              <a:t>28.02.2017</a:t>
             </a:fld>
             <a:endParaRPr lang="de-DE"/>
           </a:p>
@@ -1827,7 +1827,7 @@
           <a:p>
             <a:fld id="{BF127077-7699-459F-B21B-8CE1187F5A25}" type="datetimeFigureOut">
               <a:rPr lang="de-DE" smtClean="0"/>
-              <a:t>24.02.2017</a:t>
+              <a:t>28.02.2017</a:t>
             </a:fld>
             <a:endParaRPr lang="de-DE"/>
           </a:p>
@@ -2104,7 +2104,7 @@
           <a:p>
             <a:fld id="{BF127077-7699-459F-B21B-8CE1187F5A25}" type="datetimeFigureOut">
               <a:rPr lang="de-DE" smtClean="0"/>
-              <a:t>24.02.2017</a:t>
+              <a:t>28.02.2017</a:t>
             </a:fld>
             <a:endParaRPr lang="de-DE"/>
           </a:p>
@@ -2357,7 +2357,7 @@
           <a:p>
             <a:fld id="{BF127077-7699-459F-B21B-8CE1187F5A25}" type="datetimeFigureOut">
               <a:rPr lang="de-DE" smtClean="0"/>
-              <a:t>24.02.2017</a:t>
+              <a:t>28.02.2017</a:t>
             </a:fld>
             <a:endParaRPr lang="de-DE"/>
           </a:p>
@@ -2570,7 +2570,7 @@
           <a:p>
             <a:fld id="{BF127077-7699-459F-B21B-8CE1187F5A25}" type="datetimeFigureOut">
               <a:rPr lang="de-DE" smtClean="0"/>
-              <a:t>24.02.2017</a:t>
+              <a:t>28.02.2017</a:t>
             </a:fld>
             <a:endParaRPr lang="de-DE"/>
           </a:p>
@@ -5507,7 +5507,7 @@
         </p:blipFill>
         <p:spPr>
           <a:xfrm>
-            <a:off x="858204" y="219601"/>
+            <a:off x="839207" y="219601"/>
             <a:ext cx="10058400" cy="6707364"/>
           </a:xfrm>
           <a:prstGeom prst="rect">
@@ -5714,9 +5714,9 @@
         </p:nvGrpSpPr>
         <p:grpSpPr>
           <a:xfrm>
-            <a:off x="2107349" y="1862458"/>
+            <a:off x="5868407" y="1442474"/>
             <a:ext cx="1235676" cy="369332"/>
-            <a:chOff x="1991146" y="2116343"/>
+            <a:chOff x="2046476" y="2116343"/>
             <a:chExt cx="1235676" cy="369332"/>
           </a:xfrm>
           <a:noFill/>
@@ -5729,7 +5729,7 @@
           </p:nvSpPr>
           <p:spPr>
             <a:xfrm>
-              <a:off x="1991146" y="2134320"/>
+              <a:off x="2046476" y="2134319"/>
               <a:ext cx="1235676" cy="345989"/>
             </a:xfrm>
             <a:prstGeom prst="roundRect">
@@ -5844,107 +5844,13 @@
       </p:grpSp>
       <p:grpSp>
         <p:nvGrpSpPr>
-          <p:cNvPr id="21" name="Gruppieren 20"/>
-          <p:cNvGrpSpPr/>
-          <p:nvPr/>
-        </p:nvGrpSpPr>
-        <p:grpSpPr>
-          <a:xfrm>
-            <a:off x="4898694" y="1862458"/>
-            <a:ext cx="1235676" cy="619060"/>
-            <a:chOff x="3846693" y="2134531"/>
-            <a:chExt cx="1235676" cy="619060"/>
-          </a:xfrm>
-        </p:grpSpPr>
-        <p:sp>
-          <p:nvSpPr>
-            <p:cNvPr id="11" name="Abgerundetes Rechteck 10"/>
-            <p:cNvSpPr/>
-            <p:nvPr/>
-          </p:nvSpPr>
-          <p:spPr>
-            <a:xfrm>
-              <a:off x="3846693" y="2134531"/>
-              <a:ext cx="1235676" cy="345989"/>
-            </a:xfrm>
-            <a:prstGeom prst="roundRect">
-              <a:avLst/>
-            </a:prstGeom>
-            <a:noFill/>
-          </p:spPr>
-          <p:style>
-            <a:lnRef idx="2">
-              <a:schemeClr val="accent1">
-                <a:shade val="50000"/>
-              </a:schemeClr>
-            </a:lnRef>
-            <a:fillRef idx="1">
-              <a:schemeClr val="accent1"/>
-            </a:fillRef>
-            <a:effectRef idx="0">
-              <a:schemeClr val="accent1"/>
-            </a:effectRef>
-            <a:fontRef idx="minor">
-              <a:schemeClr val="lt1"/>
-            </a:fontRef>
-          </p:style>
-          <p:txBody>
-            <a:bodyPr rtlCol="0" anchor="ctr"/>
-            <a:lstStyle/>
-            <a:p>
-              <a:pPr algn="ctr"/>
-              <a:endParaRPr lang="de-DE"/>
-            </a:p>
-          </p:txBody>
-        </p:sp>
-        <p:sp>
-          <p:nvSpPr>
-            <p:cNvPr id="17" name="Textfeld 16"/>
-            <p:cNvSpPr txBox="1"/>
-            <p:nvPr/>
-          </p:nvSpPr>
-          <p:spPr>
-            <a:xfrm>
-              <a:off x="3952500" y="2138038"/>
-              <a:ext cx="1024061" cy="615553"/>
-            </a:xfrm>
-            <a:prstGeom prst="rect">
-              <a:avLst/>
-            </a:prstGeom>
-            <a:noFill/>
-          </p:spPr>
-          <p:txBody>
-            <a:bodyPr wrap="square" rtlCol="0">
-              <a:spAutoFit/>
-            </a:bodyPr>
-            <a:lstStyle/>
-            <a:p>
-              <a:r>
-                <a:rPr lang="de-DE" dirty="0">
-                  <a:solidFill>
-                    <a:schemeClr val="bg1"/>
-                  </a:solidFill>
-                </a:rPr>
-                <a:t>Preis</a:t>
-              </a:r>
-              <a:r>
-                <a:rPr lang="de-DE" sz="1600" dirty="0" smtClean="0"/>
-                <a:t>  von</a:t>
-              </a:r>
-              <a:endParaRPr lang="de-DE" sz="1600" dirty="0"/>
-            </a:p>
-          </p:txBody>
-        </p:sp>
-      </p:grpSp>
-      <p:grpSp>
-        <p:nvGrpSpPr>
           <p:cNvPr id="27" name="Gruppieren 26"/>
           <p:cNvGrpSpPr/>
           <p:nvPr/>
         </p:nvGrpSpPr>
         <p:grpSpPr>
           <a:xfrm>
-            <a:off x="3435868" y="1852261"/>
+            <a:off x="7483396" y="1439799"/>
             <a:ext cx="1369982" cy="369332"/>
             <a:chOff x="6078375" y="2099342"/>
             <a:chExt cx="1369982" cy="369332"/>
@@ -6080,7 +5986,7 @@
         </p:nvGrpSpPr>
         <p:grpSpPr>
           <a:xfrm>
-            <a:off x="7555734" y="1825420"/>
+            <a:off x="2292073" y="1340481"/>
             <a:ext cx="1235676" cy="388111"/>
             <a:chOff x="7068442" y="2080739"/>
             <a:chExt cx="1235676" cy="388111"/>
@@ -6171,7 +6077,7 @@
         </p:nvGrpSpPr>
         <p:grpSpPr>
           <a:xfrm>
-            <a:off x="8884255" y="1825420"/>
+            <a:off x="3849514" y="1380969"/>
             <a:ext cx="1235676" cy="369332"/>
             <a:chOff x="8685930" y="2122860"/>
             <a:chExt cx="1235676" cy="369332"/>
@@ -6241,108 +6147,6 @@
             <a:lstStyle/>
             <a:p>
               <a:pPr algn="ctr"/>
-              <a:r>
-                <a:rPr lang="de-DE" dirty="0">
-                  <a:solidFill>
-                    <a:schemeClr val="bg1"/>
-                  </a:solidFill>
-                </a:rPr>
-                <a:t>bis</a:t>
-              </a:r>
-            </a:p>
-          </p:txBody>
-        </p:sp>
-      </p:grpSp>
-      <p:grpSp>
-        <p:nvGrpSpPr>
-          <p:cNvPr id="28" name="Gruppieren 27"/>
-          <p:cNvGrpSpPr/>
-          <p:nvPr/>
-        </p:nvGrpSpPr>
-        <p:grpSpPr>
-          <a:xfrm>
-            <a:off x="6227214" y="1825420"/>
-            <a:ext cx="1235676" cy="383027"/>
-            <a:chOff x="4804592" y="2084205"/>
-            <a:chExt cx="1235676" cy="383027"/>
-          </a:xfrm>
-          <a:noFill/>
-        </p:grpSpPr>
-        <p:sp>
-          <p:nvSpPr>
-            <p:cNvPr id="25" name="Abgerundetes Rechteck 24"/>
-            <p:cNvSpPr/>
-            <p:nvPr/>
-          </p:nvSpPr>
-          <p:spPr>
-            <a:xfrm>
-              <a:off x="4804592" y="2121243"/>
-              <a:ext cx="1235676" cy="345989"/>
-            </a:xfrm>
-            <a:prstGeom prst="roundRect">
-              <a:avLst/>
-            </a:prstGeom>
-            <a:grpFill/>
-          </p:spPr>
-          <p:style>
-            <a:lnRef idx="2">
-              <a:schemeClr val="accent1">
-                <a:shade val="50000"/>
-              </a:schemeClr>
-            </a:lnRef>
-            <a:fillRef idx="1">
-              <a:schemeClr val="accent1"/>
-            </a:fillRef>
-            <a:effectRef idx="0">
-              <a:schemeClr val="accent1"/>
-            </a:effectRef>
-            <a:fontRef idx="minor">
-              <a:schemeClr val="lt1"/>
-            </a:fontRef>
-          </p:style>
-          <p:txBody>
-            <a:bodyPr rtlCol="0" anchor="ctr"/>
-            <a:lstStyle/>
-            <a:p>
-              <a:pPr algn="ctr"/>
-              <a:endParaRPr lang="de-DE"/>
-            </a:p>
-          </p:txBody>
-        </p:sp>
-        <p:sp>
-          <p:nvSpPr>
-            <p:cNvPr id="26" name="Textfeld 25"/>
-            <p:cNvSpPr txBox="1"/>
-            <p:nvPr/>
-          </p:nvSpPr>
-          <p:spPr>
-            <a:xfrm>
-              <a:off x="4908356" y="2084205"/>
-              <a:ext cx="1092323" cy="369332"/>
-            </a:xfrm>
-            <a:prstGeom prst="rect">
-              <a:avLst/>
-            </a:prstGeom>
-            <a:grpFill/>
-          </p:spPr>
-          <p:txBody>
-            <a:bodyPr wrap="square" rtlCol="0">
-              <a:spAutoFit/>
-            </a:bodyPr>
-            <a:lstStyle/>
-            <a:p>
-              <a:r>
-                <a:rPr lang="de-DE" dirty="0">
-                  <a:solidFill>
-                    <a:schemeClr val="bg1"/>
-                  </a:solidFill>
-                </a:rPr>
-                <a:t>Preis</a:t>
-              </a:r>
-              <a:r>
-                <a:rPr lang="de-DE" dirty="0" smtClean="0"/>
-                <a:t> </a:t>
-              </a:r>
               <a:r>
                 <a:rPr lang="de-DE" dirty="0">
                   <a:solidFill>
@@ -9123,10 +8927,358 @@
           <a:chExt cx="0" cy="0"/>
         </a:xfrm>
       </p:grpSpPr>
+      <p:sp>
+        <p:nvSpPr>
+          <p:cNvPr id="2" name="Titel 1"/>
+          <p:cNvSpPr>
+            <a:spLocks noGrp="1"/>
+          </p:cNvSpPr>
+          <p:nvPr>
+            <p:ph type="title"/>
+          </p:nvPr>
+        </p:nvSpPr>
+        <p:spPr/>
+        <p:txBody>
+          <a:bodyPr/>
+          <a:lstStyle/>
+          <a:p>
+            <a:pPr algn="ctr"/>
+            <a:r>
+              <a:rPr lang="de-DE" dirty="0" smtClean="0"/>
+              <a:t>Raumanzeigen</a:t>
+            </a:r>
+            <a:endParaRPr lang="de-DE" dirty="0"/>
+          </a:p>
+        </p:txBody>
+      </p:sp>
+      <p:sp>
+        <p:nvSpPr>
+          <p:cNvPr id="3" name="Abgerundetes Rechteck 2"/>
+          <p:cNvSpPr/>
+          <p:nvPr/>
+        </p:nvSpPr>
+        <p:spPr>
+          <a:xfrm>
+            <a:off x="4366054" y="1968843"/>
+            <a:ext cx="3459892" cy="3921211"/>
+          </a:xfrm>
+          <a:prstGeom prst="roundRect">
+            <a:avLst/>
+          </a:prstGeom>
+          <a:solidFill>
+            <a:schemeClr val="bg1"/>
+          </a:solidFill>
+        </p:spPr>
+        <p:style>
+          <a:lnRef idx="2">
+            <a:schemeClr val="accent1">
+              <a:shade val="50000"/>
+            </a:schemeClr>
+          </a:lnRef>
+          <a:fillRef idx="1">
+            <a:schemeClr val="accent1"/>
+          </a:fillRef>
+          <a:effectRef idx="0">
+            <a:schemeClr val="accent1"/>
+          </a:effectRef>
+          <a:fontRef idx="minor">
+            <a:schemeClr val="lt1"/>
+          </a:fontRef>
+        </p:style>
+        <p:txBody>
+          <a:bodyPr rtlCol="0" anchor="ctr"/>
+          <a:lstStyle/>
+          <a:p>
+            <a:pPr algn="ctr"/>
+            <a:endParaRPr lang="de-DE"/>
+          </a:p>
+        </p:txBody>
+      </p:sp>
+      <p:sp>
+        <p:nvSpPr>
+          <p:cNvPr id="4" name="Abgerundetes Rechteck 3"/>
+          <p:cNvSpPr/>
+          <p:nvPr/>
+        </p:nvSpPr>
+        <p:spPr>
+          <a:xfrm>
+            <a:off x="8151341" y="1968842"/>
+            <a:ext cx="3459892" cy="3921211"/>
+          </a:xfrm>
+          <a:prstGeom prst="roundRect">
+            <a:avLst/>
+          </a:prstGeom>
+          <a:solidFill>
+            <a:schemeClr val="bg1"/>
+          </a:solidFill>
+        </p:spPr>
+        <p:style>
+          <a:lnRef idx="2">
+            <a:schemeClr val="accent1">
+              <a:shade val="50000"/>
+            </a:schemeClr>
+          </a:lnRef>
+          <a:fillRef idx="1">
+            <a:schemeClr val="accent1"/>
+          </a:fillRef>
+          <a:effectRef idx="0">
+            <a:schemeClr val="accent1"/>
+          </a:effectRef>
+          <a:fontRef idx="minor">
+            <a:schemeClr val="lt1"/>
+          </a:fontRef>
+        </p:style>
+        <p:txBody>
+          <a:bodyPr rtlCol="0" anchor="ctr"/>
+          <a:lstStyle/>
+          <a:p>
+            <a:pPr algn="ctr"/>
+            <a:endParaRPr lang="de-DE"/>
+          </a:p>
+        </p:txBody>
+      </p:sp>
+      <p:sp>
+        <p:nvSpPr>
+          <p:cNvPr id="5" name="Abgerundetes Rechteck 4"/>
+          <p:cNvSpPr/>
+          <p:nvPr/>
+        </p:nvSpPr>
+        <p:spPr>
+          <a:xfrm>
+            <a:off x="607884" y="1970884"/>
+            <a:ext cx="3459892" cy="3921211"/>
+          </a:xfrm>
+          <a:prstGeom prst="roundRect">
+            <a:avLst/>
+          </a:prstGeom>
+          <a:solidFill>
+            <a:schemeClr val="bg1"/>
+          </a:solidFill>
+        </p:spPr>
+        <p:style>
+          <a:lnRef idx="2">
+            <a:schemeClr val="accent1">
+              <a:shade val="50000"/>
+            </a:schemeClr>
+          </a:lnRef>
+          <a:fillRef idx="1">
+            <a:schemeClr val="accent1"/>
+          </a:fillRef>
+          <a:effectRef idx="0">
+            <a:schemeClr val="accent1"/>
+          </a:effectRef>
+          <a:fontRef idx="minor">
+            <a:schemeClr val="lt1"/>
+          </a:fontRef>
+        </p:style>
+        <p:txBody>
+          <a:bodyPr rtlCol="0" anchor="ctr"/>
+          <a:lstStyle/>
+          <a:p>
+            <a:pPr algn="ctr"/>
+            <a:endParaRPr lang="de-DE"/>
+          </a:p>
+        </p:txBody>
+      </p:sp>
+      <p:pic>
+        <p:nvPicPr>
+          <p:cNvPr id="6" name="Grafik 5"/>
+          <p:cNvPicPr>
+            <a:picLocks noChangeAspect="1"/>
+          </p:cNvPicPr>
+          <p:nvPr/>
+        </p:nvPicPr>
+        <p:blipFill>
+          <a:blip r:embed="rId2">
+            <a:extLst>
+              <a:ext uri="{28A0092B-C50C-407E-A947-70E740481C1C}">
+                <a14:useLocalDpi xmlns:a14="http://schemas.microsoft.com/office/drawing/2010/main" val="0"/>
+              </a:ext>
+            </a:extLst>
+          </a:blip>
+          <a:stretch>
+            <a:fillRect/>
+          </a:stretch>
+        </p:blipFill>
+        <p:spPr>
+          <a:xfrm>
+            <a:off x="851929" y="2281880"/>
+            <a:ext cx="2917568" cy="1843903"/>
+          </a:xfrm>
+          <a:prstGeom prst="roundRect">
+            <a:avLst>
+              <a:gd name="adj" fmla="val 16667"/>
+            </a:avLst>
+          </a:prstGeom>
+          <a:ln>
+            <a:noFill/>
+          </a:ln>
+          <a:effectLst>
+            <a:outerShdw blurRad="76200" dist="38100" dir="7800000" algn="tl" rotWithShape="0">
+              <a:srgbClr val="000000">
+                <a:alpha val="40000"/>
+              </a:srgbClr>
+            </a:outerShdw>
+          </a:effectLst>
+          <a:scene3d>
+            <a:camera prst="orthographicFront"/>
+            <a:lightRig rig="contrasting" dir="t">
+              <a:rot lat="0" lon="0" rev="4200000"/>
+            </a:lightRig>
+          </a:scene3d>
+          <a:sp3d prstMaterial="plastic">
+            <a:bevelT w="381000" h="114300" prst="relaxedInset"/>
+            <a:contourClr>
+              <a:srgbClr val="969696"/>
+            </a:contourClr>
+          </a:sp3d>
+        </p:spPr>
+      </p:pic>
+      <p:sp>
+        <p:nvSpPr>
+          <p:cNvPr id="8" name="Textfeld 7"/>
+          <p:cNvSpPr txBox="1"/>
+          <p:nvPr/>
+        </p:nvSpPr>
+        <p:spPr>
+          <a:xfrm>
+            <a:off x="824304" y="4194625"/>
+            <a:ext cx="3027052" cy="369332"/>
+          </a:xfrm>
+          <a:prstGeom prst="rect">
+            <a:avLst/>
+          </a:prstGeom>
+          <a:noFill/>
+        </p:spPr>
+        <p:txBody>
+          <a:bodyPr wrap="square" rtlCol="0">
+            <a:spAutoFit/>
+          </a:bodyPr>
+          <a:lstStyle/>
+          <a:p>
+            <a:pPr algn="ctr"/>
+            <a:r>
+              <a:rPr lang="de-DE" dirty="0" smtClean="0"/>
+              <a:t>Office</a:t>
+            </a:r>
+            <a:endParaRPr lang="de-DE" dirty="0"/>
+          </a:p>
+        </p:txBody>
+      </p:sp>
+      <p:sp>
+        <p:nvSpPr>
+          <p:cNvPr id="10" name="Textfeld 9"/>
+          <p:cNvSpPr txBox="1"/>
+          <p:nvPr/>
+        </p:nvSpPr>
+        <p:spPr>
+          <a:xfrm>
+            <a:off x="851929" y="4563957"/>
+            <a:ext cx="3040781" cy="646331"/>
+          </a:xfrm>
+          <a:prstGeom prst="rect">
+            <a:avLst/>
+          </a:prstGeom>
+          <a:noFill/>
+        </p:spPr>
+        <p:txBody>
+          <a:bodyPr wrap="square" rtlCol="0">
+            <a:spAutoFit/>
+          </a:bodyPr>
+          <a:lstStyle/>
+          <a:p>
+            <a:pPr algn="ctr"/>
+            <a:r>
+              <a:rPr lang="de-DE" dirty="0"/>
+              <a:t>Heller Raum mit Blick auf </a:t>
+            </a:r>
+            <a:r>
+              <a:rPr lang="de-DE" dirty="0" smtClean="0"/>
+              <a:t>Donau</a:t>
+            </a:r>
+            <a:endParaRPr lang="de-DE" dirty="0"/>
+          </a:p>
+        </p:txBody>
+      </p:sp>
+      <p:sp>
+        <p:nvSpPr>
+          <p:cNvPr id="11" name="Textfeld 10"/>
+          <p:cNvSpPr txBox="1"/>
+          <p:nvPr/>
+        </p:nvSpPr>
+        <p:spPr>
+          <a:xfrm>
+            <a:off x="1799615" y="5119110"/>
+            <a:ext cx="1145407" cy="369332"/>
+          </a:xfrm>
+          <a:prstGeom prst="rect">
+            <a:avLst/>
+          </a:prstGeom>
+          <a:noFill/>
+        </p:spPr>
+        <p:txBody>
+          <a:bodyPr wrap="square" rtlCol="0">
+            <a:spAutoFit/>
+          </a:bodyPr>
+          <a:lstStyle/>
+          <a:p>
+            <a:pPr algn="ctr"/>
+            <a:r>
+              <a:rPr lang="de-DE" dirty="0" smtClean="0"/>
+              <a:t>98,-</a:t>
+            </a:r>
+            <a:endParaRPr lang="de-DE" dirty="0"/>
+          </a:p>
+        </p:txBody>
+      </p:sp>
+      <p:sp>
+        <p:nvSpPr>
+          <p:cNvPr id="12" name="Abgerundetes Rechteck 11"/>
+          <p:cNvSpPr/>
+          <p:nvPr/>
+        </p:nvSpPr>
+        <p:spPr>
+          <a:xfrm>
+            <a:off x="1278066" y="5488442"/>
+            <a:ext cx="2092411" cy="342949"/>
+          </a:xfrm>
+          <a:prstGeom prst="roundRect">
+            <a:avLst/>
+          </a:prstGeom>
+        </p:spPr>
+        <p:style>
+          <a:lnRef idx="2">
+            <a:schemeClr val="accent1">
+              <a:shade val="50000"/>
+            </a:schemeClr>
+          </a:lnRef>
+          <a:fillRef idx="1">
+            <a:schemeClr val="accent1"/>
+          </a:fillRef>
+          <a:effectRef idx="0">
+            <a:schemeClr val="accent1"/>
+          </a:effectRef>
+          <a:fontRef idx="minor">
+            <a:schemeClr val="lt1"/>
+          </a:fontRef>
+        </p:style>
+        <p:txBody>
+          <a:bodyPr rtlCol="0" anchor="ctr"/>
+          <a:lstStyle/>
+          <a:p>
+            <a:pPr algn="ctr"/>
+            <a:r>
+              <a:rPr lang="de-DE" sz="1200" dirty="0" smtClean="0"/>
+              <a:t>Buchen</a:t>
+            </a:r>
+            <a:endParaRPr lang="de-DE" sz="1200" dirty="0"/>
+          </a:p>
+        </p:txBody>
+      </p:sp>
     </p:spTree>
     <p:extLst>
       <p:ext uri="{BB962C8B-B14F-4D97-AF65-F5344CB8AC3E}">
-        <p14:creationId xmlns:p14="http://schemas.microsoft.com/office/powerpoint/2010/main" val="294083124"/>
+        <p14:creationId xmlns:p14="http://schemas.microsoft.com/office/powerpoint/2010/main" val="2916256970"/>
       </p:ext>
     </p:extLst>
   </p:cSld>

</xml_diff>

<commit_message>
Fitlern ist fertig Räume kann man filtern und auswählen BuchungLogik ist fertig, View muss man noch erstellen
</commit_message>
<xml_diff>
--- a/Mockup.pptx
+++ b/Mockup.pptx
@@ -14,7 +14,7 @@
     <p:sldId id="263" r:id="rId8"/>
   </p:sldIdLst>
   <p:sldSz cx="12192000" cy="6858000"/>
-  <p:notesSz cx="6858000" cy="9144000"/>
+  <p:notesSz cx="6797675" cy="9874250"/>
   <p:defaultTextStyle>
     <a:defPPr>
       <a:defRPr lang="de-DE"/>
@@ -249,7 +249,7 @@
           <a:p>
             <a:fld id="{BF127077-7699-459F-B21B-8CE1187F5A25}" type="datetimeFigureOut">
               <a:rPr lang="de-DE" smtClean="0"/>
-              <a:t>28.02.2017</a:t>
+              <a:t>15.03.2017</a:t>
             </a:fld>
             <a:endParaRPr lang="de-DE"/>
           </a:p>
@@ -419,7 +419,7 @@
           <a:p>
             <a:fld id="{BF127077-7699-459F-B21B-8CE1187F5A25}" type="datetimeFigureOut">
               <a:rPr lang="de-DE" smtClean="0"/>
-              <a:t>28.02.2017</a:t>
+              <a:t>15.03.2017</a:t>
             </a:fld>
             <a:endParaRPr lang="de-DE"/>
           </a:p>
@@ -599,7 +599,7 @@
           <a:p>
             <a:fld id="{BF127077-7699-459F-B21B-8CE1187F5A25}" type="datetimeFigureOut">
               <a:rPr lang="de-DE" smtClean="0"/>
-              <a:t>28.02.2017</a:t>
+              <a:t>15.03.2017</a:t>
             </a:fld>
             <a:endParaRPr lang="de-DE"/>
           </a:p>
@@ -769,7 +769,7 @@
           <a:p>
             <a:fld id="{BF127077-7699-459F-B21B-8CE1187F5A25}" type="datetimeFigureOut">
               <a:rPr lang="de-DE" smtClean="0"/>
-              <a:t>28.02.2017</a:t>
+              <a:t>15.03.2017</a:t>
             </a:fld>
             <a:endParaRPr lang="de-DE"/>
           </a:p>
@@ -1015,7 +1015,7 @@
           <a:p>
             <a:fld id="{BF127077-7699-459F-B21B-8CE1187F5A25}" type="datetimeFigureOut">
               <a:rPr lang="de-DE" smtClean="0"/>
-              <a:t>28.02.2017</a:t>
+              <a:t>15.03.2017</a:t>
             </a:fld>
             <a:endParaRPr lang="de-DE"/>
           </a:p>
@@ -1247,7 +1247,7 @@
           <a:p>
             <a:fld id="{BF127077-7699-459F-B21B-8CE1187F5A25}" type="datetimeFigureOut">
               <a:rPr lang="de-DE" smtClean="0"/>
-              <a:t>28.02.2017</a:t>
+              <a:t>15.03.2017</a:t>
             </a:fld>
             <a:endParaRPr lang="de-DE"/>
           </a:p>
@@ -1614,7 +1614,7 @@
           <a:p>
             <a:fld id="{BF127077-7699-459F-B21B-8CE1187F5A25}" type="datetimeFigureOut">
               <a:rPr lang="de-DE" smtClean="0"/>
-              <a:t>28.02.2017</a:t>
+              <a:t>15.03.2017</a:t>
             </a:fld>
             <a:endParaRPr lang="de-DE"/>
           </a:p>
@@ -1732,7 +1732,7 @@
           <a:p>
             <a:fld id="{BF127077-7699-459F-B21B-8CE1187F5A25}" type="datetimeFigureOut">
               <a:rPr lang="de-DE" smtClean="0"/>
-              <a:t>28.02.2017</a:t>
+              <a:t>15.03.2017</a:t>
             </a:fld>
             <a:endParaRPr lang="de-DE"/>
           </a:p>
@@ -1827,7 +1827,7 @@
           <a:p>
             <a:fld id="{BF127077-7699-459F-B21B-8CE1187F5A25}" type="datetimeFigureOut">
               <a:rPr lang="de-DE" smtClean="0"/>
-              <a:t>28.02.2017</a:t>
+              <a:t>15.03.2017</a:t>
             </a:fld>
             <a:endParaRPr lang="de-DE"/>
           </a:p>
@@ -2104,7 +2104,7 @@
           <a:p>
             <a:fld id="{BF127077-7699-459F-B21B-8CE1187F5A25}" type="datetimeFigureOut">
               <a:rPr lang="de-DE" smtClean="0"/>
-              <a:t>28.02.2017</a:t>
+              <a:t>15.03.2017</a:t>
             </a:fld>
             <a:endParaRPr lang="de-DE"/>
           </a:p>
@@ -2357,7 +2357,7 @@
           <a:p>
             <a:fld id="{BF127077-7699-459F-B21B-8CE1187F5A25}" type="datetimeFigureOut">
               <a:rPr lang="de-DE" smtClean="0"/>
-              <a:t>28.02.2017</a:t>
+              <a:t>15.03.2017</a:t>
             </a:fld>
             <a:endParaRPr lang="de-DE"/>
           </a:p>
@@ -2570,7 +2570,7 @@
           <a:p>
             <a:fld id="{BF127077-7699-459F-B21B-8CE1187F5A25}" type="datetimeFigureOut">
               <a:rPr lang="de-DE" smtClean="0"/>
-              <a:t>28.02.2017</a:t>
+              <a:t>15.03.2017</a:t>
             </a:fld>
             <a:endParaRPr lang="de-DE"/>
           </a:p>
@@ -7695,13 +7695,13 @@
         </p:nvGrpSpPr>
         <p:grpSpPr>
           <a:xfrm>
-            <a:off x="2174675" y="2434020"/>
-            <a:ext cx="7966103" cy="1359284"/>
+            <a:off x="2184300" y="2445352"/>
+            <a:ext cx="7966103" cy="3736121"/>
             <a:chOff x="2051496" y="2543205"/>
             <a:chExt cx="8121374" cy="1408670"/>
           </a:xfrm>
           <a:solidFill>
-            <a:schemeClr val="accent4">
+            <a:schemeClr val="accent1">
               <a:lumMod val="20000"/>
               <a:lumOff val="80000"/>
             </a:schemeClr>
@@ -7756,8 +7756,8 @@
           </p:nvSpPr>
           <p:spPr>
             <a:xfrm>
-              <a:off x="2380969" y="2741427"/>
-              <a:ext cx="2067698" cy="646331"/>
+              <a:off x="5962488" y="2959596"/>
+              <a:ext cx="3678961" cy="139253"/>
             </a:xfrm>
             <a:prstGeom prst="rect">
               <a:avLst/>
@@ -7786,8 +7786,8 @@
           </p:nvSpPr>
           <p:spPr>
             <a:xfrm>
-              <a:off x="4566745" y="3013559"/>
-              <a:ext cx="1045577" cy="369332"/>
+              <a:off x="7419487" y="2772046"/>
+              <a:ext cx="987003" cy="139253"/>
             </a:xfrm>
             <a:prstGeom prst="rect">
               <a:avLst/>
@@ -7816,8 +7816,8 @@
           </p:nvSpPr>
           <p:spPr>
             <a:xfrm>
-              <a:off x="7399394" y="2674050"/>
-              <a:ext cx="1085353" cy="369332"/>
+              <a:off x="5959476" y="3581620"/>
+              <a:ext cx="959420" cy="139253"/>
             </a:xfrm>
             <a:prstGeom prst="rect">
               <a:avLst/>
@@ -7847,10 +7847,10 @@
         </p:nvGrpSpPr>
         <p:grpSpPr>
           <a:xfrm>
-            <a:off x="4560690" y="2559664"/>
-            <a:ext cx="5135245" cy="738664"/>
-            <a:chOff x="4560690" y="2559664"/>
-            <a:chExt cx="5135245" cy="738664"/>
+            <a:off x="5986555" y="3026598"/>
+            <a:ext cx="3663203" cy="2494036"/>
+            <a:chOff x="6003232" y="578169"/>
+            <a:chExt cx="3663203" cy="2494036"/>
           </a:xfrm>
         </p:grpSpPr>
         <p:sp>
@@ -7861,7 +7861,7 @@
           </p:nvSpPr>
           <p:spPr>
             <a:xfrm>
-              <a:off x="4560690" y="2559664"/>
+              <a:off x="6003232" y="578169"/>
               <a:ext cx="1322564" cy="369332"/>
             </a:xfrm>
             <a:prstGeom prst="rect">
@@ -7885,43 +7885,13 @@
         </p:sp>
         <p:sp>
           <p:nvSpPr>
-            <p:cNvPr id="18" name="Textfeld 17"/>
-            <p:cNvSpPr txBox="1"/>
-            <p:nvPr/>
-          </p:nvSpPr>
-          <p:spPr>
-            <a:xfrm>
-              <a:off x="5836208" y="2559664"/>
-              <a:ext cx="1084770" cy="369332"/>
-            </a:xfrm>
-            <a:prstGeom prst="rect">
-              <a:avLst/>
-            </a:prstGeom>
-            <a:noFill/>
-          </p:spPr>
-          <p:txBody>
-            <a:bodyPr wrap="square" rtlCol="0">
-              <a:spAutoFit/>
-            </a:bodyPr>
-            <a:lstStyle/>
-            <a:p>
-              <a:r>
-                <a:rPr lang="de-DE" dirty="0" smtClean="0"/>
-                <a:t>Buchung </a:t>
-              </a:r>
-              <a:endParaRPr lang="de-DE" dirty="0"/>
-            </a:p>
-          </p:txBody>
-        </p:sp>
-        <p:sp>
-          <p:nvSpPr>
             <p:cNvPr id="19" name="Textfeld 18"/>
             <p:cNvSpPr txBox="1"/>
             <p:nvPr/>
           </p:nvSpPr>
           <p:spPr>
             <a:xfrm>
-              <a:off x="5805792" y="2928996"/>
+              <a:off x="6024616" y="2489287"/>
               <a:ext cx="1580289" cy="369332"/>
             </a:xfrm>
             <a:prstGeom prst="rect">
@@ -7951,7 +7921,7 @@
           </p:nvSpPr>
           <p:spPr>
             <a:xfrm>
-              <a:off x="7400507" y="2912097"/>
+              <a:off x="6924561" y="2702873"/>
               <a:ext cx="1064304" cy="369332"/>
             </a:xfrm>
             <a:prstGeom prst="rect">
@@ -7981,7 +7951,7 @@
           </p:nvSpPr>
           <p:spPr>
             <a:xfrm>
-              <a:off x="8450385" y="2569148"/>
+              <a:off x="8420885" y="2376056"/>
               <a:ext cx="1245550" cy="653635"/>
             </a:xfrm>
             <a:prstGeom prst="roundRect">
@@ -8018,6 +7988,190 @@
           </p:txBody>
         </p:sp>
       </p:grpSp>
+      <p:pic>
+        <p:nvPicPr>
+          <p:cNvPr id="4" name="Grafik 3"/>
+          <p:cNvPicPr>
+            <a:picLocks noChangeAspect="1"/>
+          </p:cNvPicPr>
+          <p:nvPr/>
+        </p:nvPicPr>
+        <p:blipFill>
+          <a:blip r:embed="rId3">
+            <a:extLst>
+              <a:ext uri="{28A0092B-C50C-407E-A947-70E740481C1C}">
+                <a14:useLocalDpi xmlns:a14="http://schemas.microsoft.com/office/drawing/2010/main" val="0"/>
+              </a:ext>
+            </a:extLst>
+          </a:blip>
+          <a:stretch>
+            <a:fillRect/>
+          </a:stretch>
+        </p:blipFill>
+        <p:spPr>
+          <a:xfrm>
+            <a:off x="2706121" y="3064736"/>
+            <a:ext cx="2842178" cy="2497355"/>
+          </a:xfrm>
+          <a:prstGeom prst="rect">
+            <a:avLst/>
+          </a:prstGeom>
+        </p:spPr>
+      </p:pic>
+      <p:sp>
+        <p:nvSpPr>
+          <p:cNvPr id="11" name="Textfeld 10"/>
+          <p:cNvSpPr txBox="1"/>
+          <p:nvPr/>
+        </p:nvSpPr>
+        <p:spPr>
+          <a:xfrm>
+            <a:off x="6048955" y="4568384"/>
+            <a:ext cx="2019671" cy="369332"/>
+          </a:xfrm>
+          <a:prstGeom prst="rect">
+            <a:avLst/>
+          </a:prstGeom>
+          <a:noFill/>
+        </p:spPr>
+        <p:txBody>
+          <a:bodyPr wrap="square" rtlCol="0">
+            <a:spAutoFit/>
+          </a:bodyPr>
+          <a:lstStyle/>
+          <a:p>
+            <a:r>
+              <a:rPr lang="de-DE" dirty="0" err="1" smtClean="0"/>
+              <a:t>Grösse</a:t>
+            </a:r>
+            <a:r>
+              <a:rPr lang="de-DE" dirty="0" smtClean="0"/>
+              <a:t> : 32m²</a:t>
+            </a:r>
+            <a:endParaRPr lang="de-DE" dirty="0"/>
+          </a:p>
+        </p:txBody>
+      </p:sp>
+      <p:pic>
+        <p:nvPicPr>
+          <p:cNvPr id="12" name="Grafik 11"/>
+          <p:cNvPicPr>
+            <a:picLocks noChangeAspect="1"/>
+          </p:cNvPicPr>
+          <p:nvPr/>
+        </p:nvPicPr>
+        <p:blipFill>
+          <a:blip r:embed="rId4">
+            <a:extLst>
+              <a:ext uri="{28A0092B-C50C-407E-A947-70E740481C1C}">
+                <a14:useLocalDpi xmlns:a14="http://schemas.microsoft.com/office/drawing/2010/main" val="0"/>
+              </a:ext>
+            </a:extLst>
+          </a:blip>
+          <a:stretch>
+            <a:fillRect/>
+          </a:stretch>
+        </p:blipFill>
+        <p:spPr>
+          <a:xfrm>
+            <a:off x="6082138" y="3959419"/>
+            <a:ext cx="476250" cy="476250"/>
+          </a:xfrm>
+          <a:prstGeom prst="rect">
+            <a:avLst/>
+          </a:prstGeom>
+        </p:spPr>
+      </p:pic>
+      <p:pic>
+        <p:nvPicPr>
+          <p:cNvPr id="13" name="Grafik 12"/>
+          <p:cNvPicPr>
+            <a:picLocks noChangeAspect="1"/>
+          </p:cNvPicPr>
+          <p:nvPr/>
+        </p:nvPicPr>
+        <p:blipFill>
+          <a:blip r:embed="rId5">
+            <a:extLst>
+              <a:ext uri="{28A0092B-C50C-407E-A947-70E740481C1C}">
+                <a14:useLocalDpi xmlns:a14="http://schemas.microsoft.com/office/drawing/2010/main" val="0"/>
+              </a:ext>
+            </a:extLst>
+          </a:blip>
+          <a:stretch>
+            <a:fillRect/>
+          </a:stretch>
+        </p:blipFill>
+        <p:spPr>
+          <a:xfrm>
+            <a:off x="6735745" y="3931191"/>
+            <a:ext cx="518901" cy="518901"/>
+          </a:xfrm>
+          <a:prstGeom prst="rect">
+            <a:avLst/>
+          </a:prstGeom>
+        </p:spPr>
+      </p:pic>
+      <p:pic>
+        <p:nvPicPr>
+          <p:cNvPr id="16" name="Grafik 15"/>
+          <p:cNvPicPr>
+            <a:picLocks noChangeAspect="1"/>
+          </p:cNvPicPr>
+          <p:nvPr/>
+        </p:nvPicPr>
+        <p:blipFill>
+          <a:blip r:embed="rId6">
+            <a:extLst>
+              <a:ext uri="{28A0092B-C50C-407E-A947-70E740481C1C}">
+                <a14:useLocalDpi xmlns:a14="http://schemas.microsoft.com/office/drawing/2010/main" val="0"/>
+              </a:ext>
+            </a:extLst>
+          </a:blip>
+          <a:stretch>
+            <a:fillRect/>
+          </a:stretch>
+        </p:blipFill>
+        <p:spPr>
+          <a:xfrm>
+            <a:off x="7567918" y="3956685"/>
+            <a:ext cx="437443" cy="437443"/>
+          </a:xfrm>
+          <a:prstGeom prst="rect">
+            <a:avLst/>
+          </a:prstGeom>
+        </p:spPr>
+      </p:pic>
+      <p:pic>
+        <p:nvPicPr>
+          <p:cNvPr id="21" name="Grafik 20"/>
+          <p:cNvPicPr>
+            <a:picLocks noChangeAspect="1"/>
+          </p:cNvPicPr>
+          <p:nvPr/>
+        </p:nvPicPr>
+        <p:blipFill>
+          <a:blip r:embed="rId7">
+            <a:extLst>
+              <a:ext uri="{28A0092B-C50C-407E-A947-70E740481C1C}">
+                <a14:useLocalDpi xmlns:a14="http://schemas.microsoft.com/office/drawing/2010/main" val="0"/>
+              </a:ext>
+            </a:extLst>
+          </a:blip>
+          <a:stretch>
+            <a:fillRect/>
+          </a:stretch>
+        </p:blipFill>
+        <p:spPr>
+          <a:xfrm>
+            <a:off x="8267429" y="3978837"/>
+            <a:ext cx="471255" cy="471255"/>
+          </a:xfrm>
+          <a:prstGeom prst="rect">
+            <a:avLst/>
+          </a:prstGeom>
+        </p:spPr>
+      </p:pic>
     </p:spTree>
     <p:extLst>
       <p:ext uri="{BB962C8B-B14F-4D97-AF65-F5344CB8AC3E}">

</xml_diff>

<commit_message>
Mock-Up für Stornierungen erstellt
</commit_message>
<xml_diff>
--- a/Mockup.pptx
+++ b/Mockup.pptx
@@ -12,6 +12,7 @@
     <p:sldId id="260" r:id="rId6"/>
     <p:sldId id="262" r:id="rId7"/>
     <p:sldId id="263" r:id="rId8"/>
+    <p:sldId id="264" r:id="rId9"/>
   </p:sldIdLst>
   <p:sldSz cx="12192000" cy="6858000"/>
   <p:notesSz cx="6797675" cy="9874250"/>
@@ -9464,6 +9465,645 @@
 </p:sld>
 </file>
 
+<file path=ppt/slides/slide8.xml><?xml version="1.0" encoding="utf-8"?>
+<p:sld xmlns:a="http://schemas.openxmlformats.org/drawingml/2006/main" xmlns:r="http://schemas.openxmlformats.org/officeDocument/2006/relationships" xmlns:p="http://schemas.openxmlformats.org/presentationml/2006/main">
+  <p:cSld>
+    <p:spTree>
+      <p:nvGrpSpPr>
+        <p:cNvPr id="1" name=""/>
+        <p:cNvGrpSpPr/>
+        <p:nvPr/>
+      </p:nvGrpSpPr>
+      <p:grpSpPr>
+        <a:xfrm>
+          <a:off x="0" y="0"/>
+          <a:ext cx="0" cy="0"/>
+          <a:chOff x="0" y="0"/>
+          <a:chExt cx="0" cy="0"/>
+        </a:xfrm>
+      </p:grpSpPr>
+      <p:pic>
+        <p:nvPicPr>
+          <p:cNvPr id="2" name="Grafik 1"/>
+          <p:cNvPicPr>
+            <a:picLocks noChangeAspect="1"/>
+          </p:cNvPicPr>
+          <p:nvPr/>
+        </p:nvPicPr>
+        <p:blipFill>
+          <a:blip r:embed="rId2">
+            <a:extLst>
+              <a:ext uri="{28A0092B-C50C-407E-A947-70E740481C1C}">
+                <a14:useLocalDpi xmlns:a14="http://schemas.microsoft.com/office/drawing/2010/main" val="0"/>
+              </a:ext>
+            </a:extLst>
+          </a:blip>
+          <a:stretch>
+            <a:fillRect/>
+          </a:stretch>
+        </p:blipFill>
+        <p:spPr>
+          <a:xfrm>
+            <a:off x="756144" y="39819"/>
+            <a:ext cx="10058400" cy="6707364"/>
+          </a:xfrm>
+          <a:prstGeom prst="rect">
+            <a:avLst/>
+          </a:prstGeom>
+        </p:spPr>
+      </p:pic>
+      <p:sp>
+        <p:nvSpPr>
+          <p:cNvPr id="5" name="Textfeld 4"/>
+          <p:cNvSpPr txBox="1"/>
+          <p:nvPr/>
+        </p:nvSpPr>
+        <p:spPr>
+          <a:xfrm>
+            <a:off x="4969799" y="672167"/>
+            <a:ext cx="2257167" cy="369332"/>
+          </a:xfrm>
+          <a:prstGeom prst="rect">
+            <a:avLst/>
+          </a:prstGeom>
+          <a:noFill/>
+        </p:spPr>
+        <p:txBody>
+          <a:bodyPr wrap="square" rtlCol="0">
+            <a:spAutoFit/>
+          </a:bodyPr>
+          <a:lstStyle/>
+          <a:p>
+            <a:r>
+              <a:rPr lang="de-DE" dirty="0" smtClean="0">
+                <a:solidFill>
+                  <a:schemeClr val="bg1"/>
+                </a:solidFill>
+              </a:rPr>
+              <a:t>Innovation  4 Austria</a:t>
+            </a:r>
+            <a:endParaRPr lang="de-DE" dirty="0">
+              <a:solidFill>
+                <a:schemeClr val="bg1"/>
+              </a:solidFill>
+            </a:endParaRPr>
+          </a:p>
+        </p:txBody>
+      </p:sp>
+      <p:sp>
+        <p:nvSpPr>
+          <p:cNvPr id="6" name="Abgerundetes Rechteck 5"/>
+          <p:cNvSpPr/>
+          <p:nvPr/>
+        </p:nvSpPr>
+        <p:spPr>
+          <a:xfrm>
+            <a:off x="8600304" y="401858"/>
+            <a:ext cx="1869987" cy="271848"/>
+          </a:xfrm>
+          <a:prstGeom prst="roundRect">
+            <a:avLst/>
+          </a:prstGeom>
+          <a:solidFill>
+            <a:schemeClr val="bg1"/>
+          </a:solidFill>
+        </p:spPr>
+        <p:style>
+          <a:lnRef idx="2">
+            <a:schemeClr val="accent1">
+              <a:shade val="50000"/>
+            </a:schemeClr>
+          </a:lnRef>
+          <a:fillRef idx="1">
+            <a:schemeClr val="accent1"/>
+          </a:fillRef>
+          <a:effectRef idx="0">
+            <a:schemeClr val="accent1"/>
+          </a:effectRef>
+          <a:fontRef idx="minor">
+            <a:schemeClr val="lt1"/>
+          </a:fontRef>
+        </p:style>
+        <p:txBody>
+          <a:bodyPr rtlCol="0" anchor="ctr"/>
+          <a:lstStyle/>
+          <a:p>
+            <a:pPr algn="ctr"/>
+            <a:r>
+              <a:rPr lang="de-DE" dirty="0" smtClean="0">
+                <a:solidFill>
+                  <a:schemeClr val="tx1"/>
+                </a:solidFill>
+              </a:rPr>
+              <a:t>Übersicht</a:t>
+            </a:r>
+            <a:endParaRPr lang="de-DE" dirty="0">
+              <a:solidFill>
+                <a:schemeClr val="tx1"/>
+              </a:solidFill>
+            </a:endParaRPr>
+          </a:p>
+        </p:txBody>
+      </p:sp>
+      <p:sp>
+        <p:nvSpPr>
+          <p:cNvPr id="7" name="Abgerundetes Rechteck 6"/>
+          <p:cNvSpPr/>
+          <p:nvPr/>
+        </p:nvSpPr>
+        <p:spPr>
+          <a:xfrm>
+            <a:off x="9411730" y="824567"/>
+            <a:ext cx="1058561" cy="271848"/>
+          </a:xfrm>
+          <a:prstGeom prst="roundRect">
+            <a:avLst/>
+          </a:prstGeom>
+          <a:solidFill>
+            <a:schemeClr val="bg1"/>
+          </a:solidFill>
+        </p:spPr>
+        <p:style>
+          <a:lnRef idx="2">
+            <a:schemeClr val="accent1">
+              <a:shade val="50000"/>
+            </a:schemeClr>
+          </a:lnRef>
+          <a:fillRef idx="1">
+            <a:schemeClr val="accent1"/>
+          </a:fillRef>
+          <a:effectRef idx="0">
+            <a:schemeClr val="accent1"/>
+          </a:effectRef>
+          <a:fontRef idx="minor">
+            <a:schemeClr val="lt1"/>
+          </a:fontRef>
+        </p:style>
+        <p:txBody>
+          <a:bodyPr rtlCol="0" anchor="ctr"/>
+          <a:lstStyle/>
+          <a:p>
+            <a:pPr algn="ctr"/>
+            <a:r>
+              <a:rPr lang="de-DE" dirty="0" smtClean="0">
+                <a:solidFill>
+                  <a:schemeClr val="tx1"/>
+                </a:solidFill>
+              </a:rPr>
+              <a:t>Profil</a:t>
+            </a:r>
+            <a:endParaRPr lang="de-DE" dirty="0">
+              <a:solidFill>
+                <a:schemeClr val="tx1"/>
+              </a:solidFill>
+            </a:endParaRPr>
+          </a:p>
+        </p:txBody>
+      </p:sp>
+      <p:sp>
+        <p:nvSpPr>
+          <p:cNvPr id="8" name="Textfeld 7"/>
+          <p:cNvSpPr txBox="1"/>
+          <p:nvPr/>
+        </p:nvSpPr>
+        <p:spPr>
+          <a:xfrm>
+            <a:off x="4168346" y="1276865"/>
+            <a:ext cx="3690551" cy="369332"/>
+          </a:xfrm>
+          <a:prstGeom prst="rect">
+            <a:avLst/>
+          </a:prstGeom>
+          <a:noFill/>
+        </p:spPr>
+        <p:txBody>
+          <a:bodyPr wrap="square" rtlCol="0">
+            <a:spAutoFit/>
+          </a:bodyPr>
+          <a:lstStyle/>
+          <a:p>
+            <a:r>
+              <a:rPr lang="de-DE" dirty="0" smtClean="0">
+                <a:solidFill>
+                  <a:schemeClr val="bg1"/>
+                </a:solidFill>
+              </a:rPr>
+              <a:t>Stornierungen aus dem Vormonat</a:t>
+            </a:r>
+            <a:endParaRPr lang="de-DE" dirty="0">
+              <a:solidFill>
+                <a:schemeClr val="bg1"/>
+              </a:solidFill>
+            </a:endParaRPr>
+          </a:p>
+        </p:txBody>
+      </p:sp>
+      <p:sp>
+        <p:nvSpPr>
+          <p:cNvPr id="9" name="Textfeld 8"/>
+          <p:cNvSpPr txBox="1"/>
+          <p:nvPr/>
+        </p:nvSpPr>
+        <p:spPr>
+          <a:xfrm>
+            <a:off x="2636108" y="2318364"/>
+            <a:ext cx="2940908" cy="369332"/>
+          </a:xfrm>
+          <a:prstGeom prst="rect">
+            <a:avLst/>
+          </a:prstGeom>
+          <a:solidFill>
+            <a:schemeClr val="bg1"/>
+          </a:solidFill>
+        </p:spPr>
+        <p:txBody>
+          <a:bodyPr wrap="square" rtlCol="0">
+            <a:spAutoFit/>
+          </a:bodyPr>
+          <a:lstStyle/>
+          <a:p>
+            <a:r>
+              <a:rPr lang="de-DE" dirty="0" smtClean="0"/>
+              <a:t>Firmenname</a:t>
+            </a:r>
+            <a:endParaRPr lang="de-DE" dirty="0"/>
+          </a:p>
+        </p:txBody>
+      </p:sp>
+      <p:sp>
+        <p:nvSpPr>
+          <p:cNvPr id="10" name="Textfeld 9"/>
+          <p:cNvSpPr txBox="1"/>
+          <p:nvPr/>
+        </p:nvSpPr>
+        <p:spPr>
+          <a:xfrm>
+            <a:off x="2636108" y="3058954"/>
+            <a:ext cx="2940908" cy="369332"/>
+          </a:xfrm>
+          <a:prstGeom prst="rect">
+            <a:avLst/>
+          </a:prstGeom>
+          <a:solidFill>
+            <a:schemeClr val="bg1"/>
+          </a:solidFill>
+        </p:spPr>
+        <p:txBody>
+          <a:bodyPr wrap="square" rtlCol="0">
+            <a:spAutoFit/>
+          </a:bodyPr>
+          <a:lstStyle/>
+          <a:p>
+            <a:r>
+              <a:rPr lang="de-DE" dirty="0" smtClean="0"/>
+              <a:t>Firmenname</a:t>
+            </a:r>
+            <a:endParaRPr lang="de-DE" dirty="0"/>
+          </a:p>
+        </p:txBody>
+      </p:sp>
+      <p:sp>
+        <p:nvSpPr>
+          <p:cNvPr id="11" name="Textfeld 10"/>
+          <p:cNvSpPr txBox="1"/>
+          <p:nvPr/>
+        </p:nvSpPr>
+        <p:spPr>
+          <a:xfrm>
+            <a:off x="2697892" y="3773237"/>
+            <a:ext cx="2940908" cy="369332"/>
+          </a:xfrm>
+          <a:prstGeom prst="rect">
+            <a:avLst/>
+          </a:prstGeom>
+          <a:solidFill>
+            <a:schemeClr val="bg1"/>
+          </a:solidFill>
+        </p:spPr>
+        <p:txBody>
+          <a:bodyPr wrap="square" rtlCol="0">
+            <a:spAutoFit/>
+          </a:bodyPr>
+          <a:lstStyle/>
+          <a:p>
+            <a:r>
+              <a:rPr lang="de-DE" dirty="0" smtClean="0"/>
+              <a:t>Firmenname</a:t>
+            </a:r>
+            <a:endParaRPr lang="de-DE" dirty="0"/>
+          </a:p>
+        </p:txBody>
+      </p:sp>
+      <p:sp>
+        <p:nvSpPr>
+          <p:cNvPr id="12" name="Textfeld 11"/>
+          <p:cNvSpPr txBox="1"/>
+          <p:nvPr/>
+        </p:nvSpPr>
+        <p:spPr>
+          <a:xfrm>
+            <a:off x="2697892" y="4526017"/>
+            <a:ext cx="2940908" cy="369332"/>
+          </a:xfrm>
+          <a:prstGeom prst="rect">
+            <a:avLst/>
+          </a:prstGeom>
+          <a:solidFill>
+            <a:schemeClr val="bg1"/>
+          </a:solidFill>
+        </p:spPr>
+        <p:txBody>
+          <a:bodyPr wrap="square" rtlCol="0">
+            <a:spAutoFit/>
+          </a:bodyPr>
+          <a:lstStyle/>
+          <a:p>
+            <a:r>
+              <a:rPr lang="de-DE" dirty="0" smtClean="0"/>
+              <a:t>Firmenname</a:t>
+            </a:r>
+            <a:endParaRPr lang="de-DE" dirty="0"/>
+          </a:p>
+        </p:txBody>
+      </p:sp>
+      <p:sp>
+        <p:nvSpPr>
+          <p:cNvPr id="13" name="Textfeld 12"/>
+          <p:cNvSpPr txBox="1"/>
+          <p:nvPr/>
+        </p:nvSpPr>
+        <p:spPr>
+          <a:xfrm>
+            <a:off x="2965622" y="1646197"/>
+            <a:ext cx="2248929" cy="369332"/>
+          </a:xfrm>
+          <a:prstGeom prst="rect">
+            <a:avLst/>
+          </a:prstGeom>
+          <a:noFill/>
+        </p:spPr>
+        <p:txBody>
+          <a:bodyPr wrap="square" rtlCol="0">
+            <a:spAutoFit/>
+          </a:bodyPr>
+          <a:lstStyle/>
+          <a:p>
+            <a:r>
+              <a:rPr lang="de-DE" dirty="0" smtClean="0">
+                <a:solidFill>
+                  <a:schemeClr val="bg1"/>
+                </a:solidFill>
+              </a:rPr>
+              <a:t>Firmenname</a:t>
+            </a:r>
+            <a:endParaRPr lang="de-DE" dirty="0">
+              <a:solidFill>
+                <a:schemeClr val="bg1"/>
+              </a:solidFill>
+            </a:endParaRPr>
+          </a:p>
+        </p:txBody>
+      </p:sp>
+      <p:sp>
+        <p:nvSpPr>
+          <p:cNvPr id="14" name="Abgerundetes Rechteck 13"/>
+          <p:cNvSpPr/>
+          <p:nvPr/>
+        </p:nvSpPr>
+        <p:spPr>
+          <a:xfrm>
+            <a:off x="6607937" y="2278545"/>
+            <a:ext cx="1058561" cy="271848"/>
+          </a:xfrm>
+          <a:prstGeom prst="roundRect">
+            <a:avLst/>
+          </a:prstGeom>
+          <a:solidFill>
+            <a:schemeClr val="bg1"/>
+          </a:solidFill>
+        </p:spPr>
+        <p:style>
+          <a:lnRef idx="2">
+            <a:schemeClr val="accent1">
+              <a:shade val="50000"/>
+            </a:schemeClr>
+          </a:lnRef>
+          <a:fillRef idx="1">
+            <a:schemeClr val="accent1"/>
+          </a:fillRef>
+          <a:effectRef idx="0">
+            <a:schemeClr val="accent1"/>
+          </a:effectRef>
+          <a:fontRef idx="minor">
+            <a:schemeClr val="lt1"/>
+          </a:fontRef>
+        </p:style>
+        <p:txBody>
+          <a:bodyPr rtlCol="0" anchor="ctr"/>
+          <a:lstStyle/>
+          <a:p>
+            <a:pPr algn="ctr"/>
+            <a:r>
+              <a:rPr lang="de-DE" dirty="0" smtClean="0">
+                <a:solidFill>
+                  <a:schemeClr val="tx1"/>
+                </a:solidFill>
+              </a:rPr>
+              <a:t>4</a:t>
+            </a:r>
+            <a:endParaRPr lang="de-DE" dirty="0">
+              <a:solidFill>
+                <a:schemeClr val="tx1"/>
+              </a:solidFill>
+            </a:endParaRPr>
+          </a:p>
+        </p:txBody>
+      </p:sp>
+      <p:sp>
+        <p:nvSpPr>
+          <p:cNvPr id="15" name="Abgerundetes Rechteck 14"/>
+          <p:cNvSpPr/>
+          <p:nvPr/>
+        </p:nvSpPr>
+        <p:spPr>
+          <a:xfrm>
+            <a:off x="6607938" y="3055622"/>
+            <a:ext cx="1058561" cy="271848"/>
+          </a:xfrm>
+          <a:prstGeom prst="roundRect">
+            <a:avLst/>
+          </a:prstGeom>
+          <a:solidFill>
+            <a:schemeClr val="bg1"/>
+          </a:solidFill>
+        </p:spPr>
+        <p:style>
+          <a:lnRef idx="2">
+            <a:schemeClr val="accent1">
+              <a:shade val="50000"/>
+            </a:schemeClr>
+          </a:lnRef>
+          <a:fillRef idx="1">
+            <a:schemeClr val="accent1"/>
+          </a:fillRef>
+          <a:effectRef idx="0">
+            <a:schemeClr val="accent1"/>
+          </a:effectRef>
+          <a:fontRef idx="minor">
+            <a:schemeClr val="lt1"/>
+          </a:fontRef>
+        </p:style>
+        <p:txBody>
+          <a:bodyPr rtlCol="0" anchor="ctr"/>
+          <a:lstStyle/>
+          <a:p>
+            <a:pPr algn="ctr"/>
+            <a:r>
+              <a:rPr lang="de-DE" dirty="0" smtClean="0">
+                <a:solidFill>
+                  <a:schemeClr val="tx1"/>
+                </a:solidFill>
+              </a:rPr>
+              <a:t>2</a:t>
+            </a:r>
+            <a:endParaRPr lang="de-DE" dirty="0">
+              <a:solidFill>
+                <a:schemeClr val="tx1"/>
+              </a:solidFill>
+            </a:endParaRPr>
+          </a:p>
+        </p:txBody>
+      </p:sp>
+      <p:sp>
+        <p:nvSpPr>
+          <p:cNvPr id="16" name="Abgerundetes Rechteck 15"/>
+          <p:cNvSpPr/>
+          <p:nvPr/>
+        </p:nvSpPr>
+        <p:spPr>
+          <a:xfrm>
+            <a:off x="6639152" y="3765759"/>
+            <a:ext cx="1058561" cy="271848"/>
+          </a:xfrm>
+          <a:prstGeom prst="roundRect">
+            <a:avLst/>
+          </a:prstGeom>
+          <a:solidFill>
+            <a:schemeClr val="bg1"/>
+          </a:solidFill>
+        </p:spPr>
+        <p:style>
+          <a:lnRef idx="2">
+            <a:schemeClr val="accent1">
+              <a:shade val="50000"/>
+            </a:schemeClr>
+          </a:lnRef>
+          <a:fillRef idx="1">
+            <a:schemeClr val="accent1"/>
+          </a:fillRef>
+          <a:effectRef idx="0">
+            <a:schemeClr val="accent1"/>
+          </a:effectRef>
+          <a:fontRef idx="minor">
+            <a:schemeClr val="lt1"/>
+          </a:fontRef>
+        </p:style>
+        <p:txBody>
+          <a:bodyPr rtlCol="0" anchor="ctr"/>
+          <a:lstStyle/>
+          <a:p>
+            <a:pPr algn="ctr"/>
+            <a:r>
+              <a:rPr lang="de-DE" dirty="0" smtClean="0">
+                <a:solidFill>
+                  <a:schemeClr val="tx1"/>
+                </a:solidFill>
+              </a:rPr>
+              <a:t>1</a:t>
+            </a:r>
+            <a:endParaRPr lang="de-DE" dirty="0">
+              <a:solidFill>
+                <a:schemeClr val="tx1"/>
+              </a:solidFill>
+            </a:endParaRPr>
+          </a:p>
+        </p:txBody>
+      </p:sp>
+      <p:sp>
+        <p:nvSpPr>
+          <p:cNvPr id="17" name="Abgerundetes Rechteck 16"/>
+          <p:cNvSpPr/>
+          <p:nvPr/>
+        </p:nvSpPr>
+        <p:spPr>
+          <a:xfrm>
+            <a:off x="6638830" y="4546334"/>
+            <a:ext cx="1058561" cy="271848"/>
+          </a:xfrm>
+          <a:prstGeom prst="roundRect">
+            <a:avLst/>
+          </a:prstGeom>
+          <a:solidFill>
+            <a:schemeClr val="bg1"/>
+          </a:solidFill>
+        </p:spPr>
+        <p:style>
+          <a:lnRef idx="2">
+            <a:schemeClr val="accent1">
+              <a:shade val="50000"/>
+            </a:schemeClr>
+          </a:lnRef>
+          <a:fillRef idx="1">
+            <a:schemeClr val="accent1"/>
+          </a:fillRef>
+          <a:effectRef idx="0">
+            <a:schemeClr val="accent1"/>
+          </a:effectRef>
+          <a:fontRef idx="minor">
+            <a:schemeClr val="lt1"/>
+          </a:fontRef>
+        </p:style>
+        <p:txBody>
+          <a:bodyPr rtlCol="0" anchor="ctr"/>
+          <a:lstStyle/>
+          <a:p>
+            <a:pPr algn="ctr"/>
+            <a:r>
+              <a:rPr lang="de-DE" dirty="0" smtClean="0">
+                <a:solidFill>
+                  <a:schemeClr val="tx1"/>
+                </a:solidFill>
+              </a:rPr>
+              <a:t>8</a:t>
+            </a:r>
+            <a:endParaRPr lang="de-DE" dirty="0">
+              <a:solidFill>
+                <a:schemeClr val="tx1"/>
+              </a:solidFill>
+            </a:endParaRPr>
+          </a:p>
+        </p:txBody>
+      </p:sp>
+    </p:spTree>
+    <p:extLst>
+      <p:ext uri="{BB962C8B-B14F-4D97-AF65-F5344CB8AC3E}">
+        <p14:creationId xmlns:p14="http://schemas.microsoft.com/office/powerpoint/2010/main" val="2100163227"/>
+      </p:ext>
+    </p:extLst>
+  </p:cSld>
+  <p:clrMapOvr>
+    <a:masterClrMapping/>
+  </p:clrMapOvr>
+  <p:timing>
+    <p:tnLst>
+      <p:par>
+        <p:cTn id="1" dur="indefinite" restart="never" nodeType="tmRoot"/>
+      </p:par>
+    </p:tnLst>
+  </p:timing>
+</p:sld>
+</file>
+
 <file path=ppt/theme/theme1.xml><?xml version="1.0" encoding="utf-8"?>
 <a:theme xmlns:a="http://schemas.openxmlformats.org/drawingml/2006/main" name="Office Theme">
   <a:themeElements>

</xml_diff>